<commit_message>
rename python files, Powerpoint changes
</commit_message>
<xml_diff>
--- a/MNIST with Tensorflow.pptx
+++ b/MNIST with Tensorflow.pptx
@@ -15,14 +15,17 @@
     <p:sldId id="265" r:id="rId9"/>
     <p:sldId id="266" r:id="rId10"/>
     <p:sldId id="267" r:id="rId11"/>
-    <p:sldId id="271" r:id="rId12"/>
-    <p:sldId id="272" r:id="rId13"/>
-    <p:sldId id="273" r:id="rId14"/>
-    <p:sldId id="274" r:id="rId15"/>
-    <p:sldId id="275" r:id="rId16"/>
-    <p:sldId id="276" r:id="rId17"/>
-    <p:sldId id="277" r:id="rId18"/>
-    <p:sldId id="278" r:id="rId19"/>
+    <p:sldId id="279" r:id="rId12"/>
+    <p:sldId id="271" r:id="rId13"/>
+    <p:sldId id="272" r:id="rId14"/>
+    <p:sldId id="273" r:id="rId15"/>
+    <p:sldId id="274" r:id="rId16"/>
+    <p:sldId id="275" r:id="rId17"/>
+    <p:sldId id="276" r:id="rId18"/>
+    <p:sldId id="280" r:id="rId19"/>
+    <p:sldId id="277" r:id="rId20"/>
+    <p:sldId id="278" r:id="rId21"/>
+    <p:sldId id="281" r:id="rId22"/>
   </p:sldIdLst>
   <p:sldSz cx="12192000" cy="6858000"/>
   <p:notesSz cx="6858000" cy="9144000"/>
@@ -1350,6 +1353,30 @@
     </pc:docChg>
   </pc:docChgLst>
   <pc:docChgLst>
+    <pc:chgData name="gene olafsen" userId="e5f59384b4ca89d9" providerId="Windows Live" clId="Web-{69C08D9D-4C46-41E4-8825-4676C20D2C0C}"/>
+    <pc:docChg chg="modSld">
+      <pc:chgData name="gene olafsen" userId="e5f59384b4ca89d9" providerId="Windows Live" clId="Web-{69C08D9D-4C46-41E4-8825-4676C20D2C0C}" dt="2017-12-12T02:26:30.655" v="7"/>
+      <pc:docMkLst>
+        <pc:docMk/>
+      </pc:docMkLst>
+      <pc:sldChg chg="modSp">
+        <pc:chgData name="gene olafsen" userId="e5f59384b4ca89d9" providerId="Windows Live" clId="Web-{69C08D9D-4C46-41E4-8825-4676C20D2C0C}" dt="2017-12-12T02:26:30.640" v="6"/>
+        <pc:sldMkLst>
+          <pc:docMk/>
+          <pc:sldMk cId="205511767" sldId="280"/>
+        </pc:sldMkLst>
+        <pc:spChg chg="mod">
+          <ac:chgData name="gene olafsen" userId="e5f59384b4ca89d9" providerId="Windows Live" clId="Web-{69C08D9D-4C46-41E4-8825-4676C20D2C0C}" dt="2017-12-12T02:26:30.640" v="6"/>
+          <ac:spMkLst>
+            <pc:docMk/>
+            <pc:sldMk cId="205511767" sldId="280"/>
+            <ac:spMk id="3" creationId="{CA3F276F-9B78-4D09-99B2-452FB454DBC2}"/>
+          </ac:spMkLst>
+        </pc:spChg>
+      </pc:sldChg>
+    </pc:docChg>
+  </pc:docChgLst>
+  <pc:docChgLst>
     <pc:chgData name="gene olafsen" userId="e5f59384b4ca89d9" providerId="Windows Live" clId="Web-{012F0C47-D9DC-4623-B635-F171F43D9473}"/>
     <pc:docChg chg="addSld delSld modSld modSection">
       <pc:chgData name="gene olafsen" userId="e5f59384b4ca89d9" providerId="Windows Live" clId="Web-{012F0C47-D9DC-4623-B635-F171F43D9473}" dt="2017-12-12T02:17:27.518" v="157"/>
@@ -1418,30 +1445,6 @@
       </pc:sldChg>
     </pc:docChg>
   </pc:docChgLst>
-  <pc:docChgLst>
-    <pc:chgData name="gene olafsen" userId="e5f59384b4ca89d9" providerId="Windows Live" clId="Web-{69C08D9D-4C46-41E4-8825-4676C20D2C0C}"/>
-    <pc:docChg chg="modSld">
-      <pc:chgData name="gene olafsen" userId="e5f59384b4ca89d9" providerId="Windows Live" clId="Web-{69C08D9D-4C46-41E4-8825-4676C20D2C0C}" dt="2017-12-12T02:26:30.655" v="7"/>
-      <pc:docMkLst>
-        <pc:docMk/>
-      </pc:docMkLst>
-      <pc:sldChg chg="modSp">
-        <pc:chgData name="gene olafsen" userId="e5f59384b4ca89d9" providerId="Windows Live" clId="Web-{69C08D9D-4C46-41E4-8825-4676C20D2C0C}" dt="2017-12-12T02:26:30.640" v="6"/>
-        <pc:sldMkLst>
-          <pc:docMk/>
-          <pc:sldMk cId="205511767" sldId="280"/>
-        </pc:sldMkLst>
-        <pc:spChg chg="mod">
-          <ac:chgData name="gene olafsen" userId="e5f59384b4ca89d9" providerId="Windows Live" clId="Web-{69C08D9D-4C46-41E4-8825-4676C20D2C0C}" dt="2017-12-12T02:26:30.640" v="6"/>
-          <ac:spMkLst>
-            <pc:docMk/>
-            <pc:sldMk cId="205511767" sldId="280"/>
-            <ac:spMk id="3" creationId="{CA3F276F-9B78-4D09-99B2-452FB454DBC2}"/>
-          </ac:spMkLst>
-        </pc:spChg>
-      </pc:sldChg>
-    </pc:docChg>
-  </pc:docChgLst>
 </pc:chgInfo>
 </file>
 
@@ -1495,7 +1498,7 @@
           <a:noFill/>
           <a:extLst>
             <a:ext uri="{909E8E84-426E-40dd-AFC4-6F175D3DCCD1}">
-              <a14:hiddenFill xmlns:a14="http://schemas.microsoft.com/office/drawing/2010/main" xmlns="">
+              <a14:hiddenFill xmlns="" xmlns:a14="http://schemas.microsoft.com/office/drawing/2010/main">
                 <a:solidFill>
                   <a:srgbClr val="FFFFFF"/>
                 </a:solidFill>
@@ -1555,7 +1558,7 @@
             </a:ln>
             <a:extLst>
               <a:ext uri="{91240B29-F687-4f45-9708-019B960494DF}">
-                <a14:hiddenLine xmlns:a14="http://schemas.microsoft.com/office/drawing/2010/main" xmlns="" w="9525">
+                <a14:hiddenLine xmlns="" xmlns:a14="http://schemas.microsoft.com/office/drawing/2010/main" w="9525">
                   <a:solidFill>
                     <a:srgbClr val="000000"/>
                   </a:solidFill>
@@ -1645,7 +1648,7 @@
             </a:ln>
             <a:extLst>
               <a:ext uri="{91240B29-F687-4f45-9708-019B960494DF}">
-                <a14:hiddenLine xmlns:a14="http://schemas.microsoft.com/office/drawing/2010/main" xmlns="" w="9525">
+                <a14:hiddenLine xmlns="" xmlns:a14="http://schemas.microsoft.com/office/drawing/2010/main" w="9525">
                   <a:solidFill>
                     <a:srgbClr val="000000"/>
                   </a:solidFill>
@@ -1735,7 +1738,7 @@
             </a:ln>
             <a:extLst>
               <a:ext uri="{91240B29-F687-4f45-9708-019B960494DF}">
-                <a14:hiddenLine xmlns:a14="http://schemas.microsoft.com/office/drawing/2010/main" xmlns="" w="9525">
+                <a14:hiddenLine xmlns="" xmlns:a14="http://schemas.microsoft.com/office/drawing/2010/main" w="9525">
                   <a:solidFill>
                     <a:srgbClr val="000000"/>
                   </a:solidFill>
@@ -1769,7 +1772,7 @@
             </a:ln>
             <a:extLst>
               <a:ext uri="{91240B29-F687-4f45-9708-019B960494DF}">
-                <a14:hiddenLine xmlns:a14="http://schemas.microsoft.com/office/drawing/2010/main" xmlns="" w="9525">
+                <a14:hiddenLine xmlns="" xmlns:a14="http://schemas.microsoft.com/office/drawing/2010/main" w="9525">
                   <a:solidFill>
                     <a:srgbClr val="000000"/>
                   </a:solidFill>
@@ -1859,7 +1862,7 @@
             </a:ln>
             <a:extLst>
               <a:ext uri="{91240B29-F687-4f45-9708-019B960494DF}">
-                <a14:hiddenLine xmlns:a14="http://schemas.microsoft.com/office/drawing/2010/main" xmlns="" w="9525">
+                <a14:hiddenLine xmlns="" xmlns:a14="http://schemas.microsoft.com/office/drawing/2010/main" w="9525">
                   <a:solidFill>
                     <a:srgbClr val="000000"/>
                   </a:solidFill>
@@ -1921,7 +1924,7 @@
             </a:ln>
             <a:extLst>
               <a:ext uri="{91240B29-F687-4f45-9708-019B960494DF}">
-                <a14:hiddenLine xmlns:a14="http://schemas.microsoft.com/office/drawing/2010/main" xmlns="" w="9525">
+                <a14:hiddenLine xmlns="" xmlns:a14="http://schemas.microsoft.com/office/drawing/2010/main" w="9525">
                   <a:solidFill>
                     <a:srgbClr val="000000"/>
                   </a:solidFill>
@@ -1983,7 +1986,7 @@
             </a:ln>
             <a:extLst>
               <a:ext uri="{91240B29-F687-4f45-9708-019B960494DF}">
-                <a14:hiddenLine xmlns:a14="http://schemas.microsoft.com/office/drawing/2010/main" xmlns="" w="9525">
+                <a14:hiddenLine xmlns="" xmlns:a14="http://schemas.microsoft.com/office/drawing/2010/main" w="9525">
                   <a:solidFill>
                     <a:srgbClr val="000000"/>
                   </a:solidFill>
@@ -2073,7 +2076,7 @@
             </a:ln>
             <a:extLst>
               <a:ext uri="{91240B29-F687-4f45-9708-019B960494DF}">
-                <a14:hiddenLine xmlns:a14="http://schemas.microsoft.com/office/drawing/2010/main" xmlns="" w="9525">
+                <a14:hiddenLine xmlns="" xmlns:a14="http://schemas.microsoft.com/office/drawing/2010/main" w="9525">
                   <a:solidFill>
                     <a:srgbClr val="000000"/>
                   </a:solidFill>
@@ -2135,7 +2138,7 @@
             </a:ln>
             <a:extLst>
               <a:ext uri="{91240B29-F687-4f45-9708-019B960494DF}">
-                <a14:hiddenLine xmlns:a14="http://schemas.microsoft.com/office/drawing/2010/main" xmlns="" w="9525">
+                <a14:hiddenLine xmlns="" xmlns:a14="http://schemas.microsoft.com/office/drawing/2010/main" w="9525">
                   <a:solidFill>
                     <a:srgbClr val="000000"/>
                   </a:solidFill>
@@ -2197,7 +2200,7 @@
             </a:ln>
             <a:extLst>
               <a:ext uri="{91240B29-F687-4f45-9708-019B960494DF}">
-                <a14:hiddenLine xmlns:a14="http://schemas.microsoft.com/office/drawing/2010/main" xmlns="" w="9525">
+                <a14:hiddenLine xmlns="" xmlns:a14="http://schemas.microsoft.com/office/drawing/2010/main" w="9525">
                   <a:solidFill>
                     <a:srgbClr val="000000"/>
                   </a:solidFill>
@@ -2287,7 +2290,7 @@
             </a:ln>
             <a:extLst>
               <a:ext uri="{91240B29-F687-4f45-9708-019B960494DF}">
-                <a14:hiddenLine xmlns:a14="http://schemas.microsoft.com/office/drawing/2010/main" xmlns="" w="9525">
+                <a14:hiddenLine xmlns="" xmlns:a14="http://schemas.microsoft.com/office/drawing/2010/main" w="9525">
                   <a:solidFill>
                     <a:srgbClr val="000000"/>
                   </a:solidFill>
@@ -2377,7 +2380,7 @@
             </a:ln>
             <a:extLst>
               <a:ext uri="{91240B29-F687-4f45-9708-019B960494DF}">
-                <a14:hiddenLine xmlns:a14="http://schemas.microsoft.com/office/drawing/2010/main" xmlns="" w="9525">
+                <a14:hiddenLine xmlns="" xmlns:a14="http://schemas.microsoft.com/office/drawing/2010/main" w="9525">
                   <a:solidFill>
                     <a:srgbClr val="000000"/>
                   </a:solidFill>
@@ -2439,7 +2442,7 @@
             </a:ln>
             <a:extLst>
               <a:ext uri="{91240B29-F687-4f45-9708-019B960494DF}">
-                <a14:hiddenLine xmlns:a14="http://schemas.microsoft.com/office/drawing/2010/main" xmlns="" w="9525">
+                <a14:hiddenLine xmlns="" xmlns:a14="http://schemas.microsoft.com/office/drawing/2010/main" w="9525">
                   <a:solidFill>
                     <a:srgbClr val="000000"/>
                   </a:solidFill>
@@ -2549,7 +2552,7 @@
             </a:ln>
             <a:extLst>
               <a:ext uri="{91240B29-F687-4f45-9708-019B960494DF}">
-                <a14:hiddenLine xmlns:a14="http://schemas.microsoft.com/office/drawing/2010/main" xmlns="" w="9525">
+                <a14:hiddenLine xmlns="" xmlns:a14="http://schemas.microsoft.com/office/drawing/2010/main" w="9525">
                   <a:solidFill>
                     <a:srgbClr val="000000"/>
                   </a:solidFill>
@@ -2611,7 +2614,7 @@
             </a:ln>
             <a:extLst>
               <a:ext uri="{91240B29-F687-4f45-9708-019B960494DF}">
-                <a14:hiddenLine xmlns:a14="http://schemas.microsoft.com/office/drawing/2010/main" xmlns="" w="9525">
+                <a14:hiddenLine xmlns="" xmlns:a14="http://schemas.microsoft.com/office/drawing/2010/main" w="9525">
                   <a:solidFill>
                     <a:srgbClr val="000000"/>
                   </a:solidFill>
@@ -2701,7 +2704,7 @@
             </a:ln>
             <a:extLst>
               <a:ext uri="{91240B29-F687-4f45-9708-019B960494DF}">
-                <a14:hiddenLine xmlns:a14="http://schemas.microsoft.com/office/drawing/2010/main" xmlns="" w="9525">
+                <a14:hiddenLine xmlns="" xmlns:a14="http://schemas.microsoft.com/office/drawing/2010/main" w="9525">
                   <a:solidFill>
                     <a:srgbClr val="000000"/>
                   </a:solidFill>
@@ -2791,7 +2794,7 @@
             </a:ln>
             <a:extLst>
               <a:ext uri="{91240B29-F687-4f45-9708-019B960494DF}">
-                <a14:hiddenLine xmlns:a14="http://schemas.microsoft.com/office/drawing/2010/main" xmlns="" w="9525">
+                <a14:hiddenLine xmlns="" xmlns:a14="http://schemas.microsoft.com/office/drawing/2010/main" w="9525">
                   <a:solidFill>
                     <a:srgbClr val="000000"/>
                   </a:solidFill>
@@ -2853,7 +2856,7 @@
             </a:ln>
             <a:extLst>
               <a:ext uri="{91240B29-F687-4f45-9708-019B960494DF}">
-                <a14:hiddenLine xmlns:a14="http://schemas.microsoft.com/office/drawing/2010/main" xmlns="" w="9525">
+                <a14:hiddenLine xmlns="" xmlns:a14="http://schemas.microsoft.com/office/drawing/2010/main" w="9525">
                   <a:solidFill>
                     <a:srgbClr val="000000"/>
                   </a:solidFill>
@@ -2943,7 +2946,7 @@
             </a:ln>
             <a:extLst>
               <a:ext uri="{91240B29-F687-4f45-9708-019B960494DF}">
-                <a14:hiddenLine xmlns:a14="http://schemas.microsoft.com/office/drawing/2010/main" xmlns="" w="9525">
+                <a14:hiddenLine xmlns="" xmlns:a14="http://schemas.microsoft.com/office/drawing/2010/main" w="9525">
                   <a:solidFill>
                     <a:srgbClr val="000000"/>
                   </a:solidFill>
@@ -3033,7 +3036,7 @@
             </a:ln>
             <a:extLst>
               <a:ext uri="{91240B29-F687-4f45-9708-019B960494DF}">
-                <a14:hiddenLine xmlns:a14="http://schemas.microsoft.com/office/drawing/2010/main" xmlns="" w="9525">
+                <a14:hiddenLine xmlns="" xmlns:a14="http://schemas.microsoft.com/office/drawing/2010/main" w="9525">
                   <a:solidFill>
                     <a:srgbClr val="000000"/>
                   </a:solidFill>
@@ -3089,7 +3092,7 @@
             </a:ln>
             <a:extLst>
               <a:ext uri="{91240B29-F687-4f45-9708-019B960494DF}">
-                <a14:hiddenLine xmlns:a14="http://schemas.microsoft.com/office/drawing/2010/main" xmlns="" w="9525">
+                <a14:hiddenLine xmlns="" xmlns:a14="http://schemas.microsoft.com/office/drawing/2010/main" w="9525">
                   <a:solidFill>
                     <a:srgbClr val="000000"/>
                   </a:solidFill>
@@ -3179,7 +3182,7 @@
             </a:ln>
             <a:extLst>
               <a:ext uri="{91240B29-F687-4f45-9708-019B960494DF}">
-                <a14:hiddenLine xmlns:a14="http://schemas.microsoft.com/office/drawing/2010/main" xmlns="" w="9525">
+                <a14:hiddenLine xmlns="" xmlns:a14="http://schemas.microsoft.com/office/drawing/2010/main" w="9525">
                   <a:solidFill>
                     <a:srgbClr val="000000"/>
                   </a:solidFill>
@@ -3235,7 +3238,7 @@
             </a:ln>
             <a:extLst>
               <a:ext uri="{91240B29-F687-4f45-9708-019B960494DF}">
-                <a14:hiddenLine xmlns:a14="http://schemas.microsoft.com/office/drawing/2010/main" xmlns="" w="9525">
+                <a14:hiddenLine xmlns="" xmlns:a14="http://schemas.microsoft.com/office/drawing/2010/main" w="9525">
                   <a:solidFill>
                     <a:srgbClr val="000000"/>
                   </a:solidFill>
@@ -3325,7 +3328,7 @@
             </a:ln>
             <a:extLst>
               <a:ext uri="{91240B29-F687-4f45-9708-019B960494DF}">
-                <a14:hiddenLine xmlns:a14="http://schemas.microsoft.com/office/drawing/2010/main" xmlns="" w="9525">
+                <a14:hiddenLine xmlns="" xmlns:a14="http://schemas.microsoft.com/office/drawing/2010/main" w="9525">
                   <a:solidFill>
                     <a:srgbClr val="000000"/>
                   </a:solidFill>
@@ -3393,7 +3396,7 @@
             </a:ln>
             <a:extLst>
               <a:ext uri="{91240B29-F687-4f45-9708-019B960494DF}">
-                <a14:hiddenLine xmlns:a14="http://schemas.microsoft.com/office/drawing/2010/main" xmlns="" w="9525">
+                <a14:hiddenLine xmlns="" xmlns:a14="http://schemas.microsoft.com/office/drawing/2010/main" w="9525">
                   <a:solidFill>
                     <a:srgbClr val="000000"/>
                   </a:solidFill>
@@ -3483,7 +3486,7 @@
             </a:ln>
             <a:extLst>
               <a:ext uri="{91240B29-F687-4f45-9708-019B960494DF}">
-                <a14:hiddenLine xmlns:a14="http://schemas.microsoft.com/office/drawing/2010/main" xmlns="" w="9525">
+                <a14:hiddenLine xmlns="" xmlns:a14="http://schemas.microsoft.com/office/drawing/2010/main" w="9525">
                   <a:solidFill>
                     <a:srgbClr val="000000"/>
                   </a:solidFill>
@@ -3551,7 +3554,7 @@
             </a:ln>
             <a:extLst>
               <a:ext uri="{91240B29-F687-4f45-9708-019B960494DF}">
-                <a14:hiddenLine xmlns:a14="http://schemas.microsoft.com/office/drawing/2010/main" xmlns="" w="9525">
+                <a14:hiddenLine xmlns="" xmlns:a14="http://schemas.microsoft.com/office/drawing/2010/main" w="9525">
                   <a:solidFill>
                     <a:srgbClr val="000000"/>
                   </a:solidFill>
@@ -3641,7 +3644,7 @@
             </a:ln>
             <a:extLst>
               <a:ext uri="{91240B29-F687-4f45-9708-019B960494DF}">
-                <a14:hiddenLine xmlns:a14="http://schemas.microsoft.com/office/drawing/2010/main" xmlns="" w="9525">
+                <a14:hiddenLine xmlns="" xmlns:a14="http://schemas.microsoft.com/office/drawing/2010/main" w="9525">
                   <a:solidFill>
                     <a:srgbClr val="000000"/>
                   </a:solidFill>
@@ -3675,7 +3678,7 @@
             </a:ln>
             <a:extLst>
               <a:ext uri="{91240B29-F687-4f45-9708-019B960494DF}">
-                <a14:hiddenLine xmlns:a14="http://schemas.microsoft.com/office/drawing/2010/main" xmlns="" w="9525">
+                <a14:hiddenLine xmlns="" xmlns:a14="http://schemas.microsoft.com/office/drawing/2010/main" w="9525">
                   <a:solidFill>
                     <a:srgbClr val="000000"/>
                   </a:solidFill>
@@ -3765,7 +3768,7 @@
             </a:ln>
             <a:extLst>
               <a:ext uri="{91240B29-F687-4f45-9708-019B960494DF}">
-                <a14:hiddenLine xmlns:a14="http://schemas.microsoft.com/office/drawing/2010/main" xmlns="" w="9525">
+                <a14:hiddenLine xmlns="" xmlns:a14="http://schemas.microsoft.com/office/drawing/2010/main" w="9525">
                   <a:solidFill>
                     <a:srgbClr val="000000"/>
                   </a:solidFill>
@@ -3827,7 +3830,7 @@
             </a:ln>
             <a:extLst>
               <a:ext uri="{91240B29-F687-4f45-9708-019B960494DF}">
-                <a14:hiddenLine xmlns:a14="http://schemas.microsoft.com/office/drawing/2010/main" xmlns="" w="9525">
+                <a14:hiddenLine xmlns="" xmlns:a14="http://schemas.microsoft.com/office/drawing/2010/main" w="9525">
                   <a:solidFill>
                     <a:srgbClr val="000000"/>
                   </a:solidFill>
@@ -3889,7 +3892,7 @@
             </a:ln>
             <a:extLst>
               <a:ext uri="{91240B29-F687-4f45-9708-019B960494DF}">
-                <a14:hiddenLine xmlns:a14="http://schemas.microsoft.com/office/drawing/2010/main" xmlns="" w="9525">
+                <a14:hiddenLine xmlns="" xmlns:a14="http://schemas.microsoft.com/office/drawing/2010/main" w="9525">
                   <a:solidFill>
                     <a:srgbClr val="000000"/>
                   </a:solidFill>
@@ -3979,7 +3982,7 @@
             </a:ln>
             <a:extLst>
               <a:ext uri="{91240B29-F687-4f45-9708-019B960494DF}">
-                <a14:hiddenLine xmlns:a14="http://schemas.microsoft.com/office/drawing/2010/main" xmlns="" w="9525">
+                <a14:hiddenLine xmlns="" xmlns:a14="http://schemas.microsoft.com/office/drawing/2010/main" w="9525">
                   <a:solidFill>
                     <a:srgbClr val="000000"/>
                   </a:solidFill>
@@ -4047,7 +4050,7 @@
             </a:ln>
             <a:extLst>
               <a:ext uri="{91240B29-F687-4f45-9708-019B960494DF}">
-                <a14:hiddenLine xmlns:a14="http://schemas.microsoft.com/office/drawing/2010/main" xmlns="" w="9525">
+                <a14:hiddenLine xmlns="" xmlns:a14="http://schemas.microsoft.com/office/drawing/2010/main" w="9525">
                   <a:solidFill>
                     <a:srgbClr val="000000"/>
                   </a:solidFill>
@@ -4109,7 +4112,7 @@
             </a:ln>
             <a:extLst>
               <a:ext uri="{91240B29-F687-4f45-9708-019B960494DF}">
-                <a14:hiddenLine xmlns:a14="http://schemas.microsoft.com/office/drawing/2010/main" xmlns="" w="9525">
+                <a14:hiddenLine xmlns="" xmlns:a14="http://schemas.microsoft.com/office/drawing/2010/main" w="9525">
                   <a:solidFill>
                     <a:srgbClr val="000000"/>
                   </a:solidFill>
@@ -4199,7 +4202,7 @@
             </a:ln>
             <a:extLst>
               <a:ext uri="{91240B29-F687-4f45-9708-019B960494DF}">
-                <a14:hiddenLine xmlns:a14="http://schemas.microsoft.com/office/drawing/2010/main" xmlns="" w="9525">
+                <a14:hiddenLine xmlns="" xmlns:a14="http://schemas.microsoft.com/office/drawing/2010/main" w="9525">
                   <a:solidFill>
                     <a:srgbClr val="000000"/>
                   </a:solidFill>
@@ -4261,7 +4264,7 @@
             </a:ln>
             <a:extLst>
               <a:ext uri="{91240B29-F687-4f45-9708-019B960494DF}">
-                <a14:hiddenLine xmlns:a14="http://schemas.microsoft.com/office/drawing/2010/main" xmlns="" w="9525">
+                <a14:hiddenLine xmlns="" xmlns:a14="http://schemas.microsoft.com/office/drawing/2010/main" w="9525">
                   <a:solidFill>
                     <a:srgbClr val="000000"/>
                   </a:solidFill>
@@ -4351,7 +4354,7 @@
             </a:ln>
             <a:extLst>
               <a:ext uri="{91240B29-F687-4f45-9708-019B960494DF}">
-                <a14:hiddenLine xmlns:a14="http://schemas.microsoft.com/office/drawing/2010/main" xmlns="" w="9525">
+                <a14:hiddenLine xmlns="" xmlns:a14="http://schemas.microsoft.com/office/drawing/2010/main" w="9525">
                   <a:solidFill>
                     <a:srgbClr val="000000"/>
                   </a:solidFill>
@@ -4413,7 +4416,7 @@
             </a:ln>
             <a:extLst>
               <a:ext uri="{91240B29-F687-4f45-9708-019B960494DF}">
-                <a14:hiddenLine xmlns:a14="http://schemas.microsoft.com/office/drawing/2010/main" xmlns="" w="9525">
+                <a14:hiddenLine xmlns="" xmlns:a14="http://schemas.microsoft.com/office/drawing/2010/main" w="9525">
                   <a:solidFill>
                     <a:srgbClr val="000000"/>
                   </a:solidFill>
@@ -4503,7 +4506,7 @@
             </a:ln>
             <a:extLst>
               <a:ext uri="{91240B29-F687-4f45-9708-019B960494DF}">
-                <a14:hiddenLine xmlns:a14="http://schemas.microsoft.com/office/drawing/2010/main" xmlns="" w="9525">
+                <a14:hiddenLine xmlns="" xmlns:a14="http://schemas.microsoft.com/office/drawing/2010/main" w="9525">
                   <a:solidFill>
                     <a:srgbClr val="000000"/>
                   </a:solidFill>
@@ -4537,7 +4540,7 @@
             </a:ln>
             <a:extLst>
               <a:ext uri="{91240B29-F687-4f45-9708-019B960494DF}">
-                <a14:hiddenLine xmlns:a14="http://schemas.microsoft.com/office/drawing/2010/main" xmlns="" w="9525">
+                <a14:hiddenLine xmlns="" xmlns:a14="http://schemas.microsoft.com/office/drawing/2010/main" w="9525">
                   <a:solidFill>
                     <a:srgbClr val="000000"/>
                   </a:solidFill>
@@ -4602,7 +4605,7 @@
             </a:ln>
             <a:extLst>
               <a:ext uri="{91240B29-F687-4f45-9708-019B960494DF}">
-                <a14:hiddenLine xmlns:a14="http://schemas.microsoft.com/office/drawing/2010/main" xmlns="" w="9525">
+                <a14:hiddenLine xmlns="" xmlns:a14="http://schemas.microsoft.com/office/drawing/2010/main" w="9525">
                   <a:solidFill>
                     <a:srgbClr val="000000"/>
                   </a:solidFill>
@@ -4692,7 +4695,7 @@
             </a:ln>
             <a:extLst>
               <a:ext uri="{91240B29-F687-4f45-9708-019B960494DF}">
-                <a14:hiddenLine xmlns:a14="http://schemas.microsoft.com/office/drawing/2010/main" xmlns="" w="9525">
+                <a14:hiddenLine xmlns="" xmlns:a14="http://schemas.microsoft.com/office/drawing/2010/main" w="9525">
                   <a:solidFill>
                     <a:srgbClr val="000000"/>
                   </a:solidFill>
@@ -4754,7 +4757,7 @@
             </a:ln>
             <a:extLst>
               <a:ext uri="{91240B29-F687-4f45-9708-019B960494DF}">
-                <a14:hiddenLine xmlns:a14="http://schemas.microsoft.com/office/drawing/2010/main" xmlns="" w="9525">
+                <a14:hiddenLine xmlns="" xmlns:a14="http://schemas.microsoft.com/office/drawing/2010/main" w="9525">
                   <a:solidFill>
                     <a:srgbClr val="000000"/>
                   </a:solidFill>
@@ -4844,7 +4847,7 @@
             </a:ln>
             <a:extLst>
               <a:ext uri="{91240B29-F687-4f45-9708-019B960494DF}">
-                <a14:hiddenLine xmlns:a14="http://schemas.microsoft.com/office/drawing/2010/main" xmlns="" w="9525">
+                <a14:hiddenLine xmlns="" xmlns:a14="http://schemas.microsoft.com/office/drawing/2010/main" w="9525">
                   <a:solidFill>
                     <a:srgbClr val="000000"/>
                   </a:solidFill>
@@ -4934,7 +4937,7 @@
             </a:ln>
             <a:extLst>
               <a:ext uri="{91240B29-F687-4f45-9708-019B960494DF}">
-                <a14:hiddenLine xmlns:a14="http://schemas.microsoft.com/office/drawing/2010/main" xmlns="" w="9525">
+                <a14:hiddenLine xmlns="" xmlns:a14="http://schemas.microsoft.com/office/drawing/2010/main" w="9525">
                   <a:solidFill>
                     <a:srgbClr val="000000"/>
                   </a:solidFill>
@@ -4999,7 +5002,7 @@
             </a:ln>
             <a:extLst>
               <a:ext uri="{91240B29-F687-4f45-9708-019B960494DF}">
-                <a14:hiddenLine xmlns:a14="http://schemas.microsoft.com/office/drawing/2010/main" xmlns="" w="9525">
+                <a14:hiddenLine xmlns="" xmlns:a14="http://schemas.microsoft.com/office/drawing/2010/main" w="9525">
                   <a:solidFill>
                     <a:srgbClr val="000000"/>
                   </a:solidFill>
@@ -5061,7 +5064,7 @@
             </a:ln>
             <a:extLst>
               <a:ext uri="{91240B29-F687-4f45-9708-019B960494DF}">
-                <a14:hiddenLine xmlns:a14="http://schemas.microsoft.com/office/drawing/2010/main" xmlns="" w="9525">
+                <a14:hiddenLine xmlns="" xmlns:a14="http://schemas.microsoft.com/office/drawing/2010/main" w="9525">
                   <a:solidFill>
                     <a:srgbClr val="000000"/>
                   </a:solidFill>
@@ -5151,7 +5154,7 @@
             </a:ln>
             <a:extLst>
               <a:ext uri="{91240B29-F687-4f45-9708-019B960494DF}">
-                <a14:hiddenLine xmlns:a14="http://schemas.microsoft.com/office/drawing/2010/main" xmlns="" w="9525">
+                <a14:hiddenLine xmlns="" xmlns:a14="http://schemas.microsoft.com/office/drawing/2010/main" w="9525">
                   <a:solidFill>
                     <a:srgbClr val="000000"/>
                   </a:solidFill>
@@ -5241,7 +5244,7 @@
             </a:ln>
             <a:extLst>
               <a:ext uri="{91240B29-F687-4f45-9708-019B960494DF}">
-                <a14:hiddenLine xmlns:a14="http://schemas.microsoft.com/office/drawing/2010/main" xmlns="" w="9525">
+                <a14:hiddenLine xmlns="" xmlns:a14="http://schemas.microsoft.com/office/drawing/2010/main" w="9525">
                   <a:solidFill>
                     <a:srgbClr val="000000"/>
                   </a:solidFill>
@@ -5303,7 +5306,7 @@
             </a:ln>
             <a:extLst>
               <a:ext uri="{91240B29-F687-4f45-9708-019B960494DF}">
-                <a14:hiddenLine xmlns:a14="http://schemas.microsoft.com/office/drawing/2010/main" xmlns="" w="9525">
+                <a14:hiddenLine xmlns="" xmlns:a14="http://schemas.microsoft.com/office/drawing/2010/main" w="9525">
                   <a:solidFill>
                     <a:srgbClr val="000000"/>
                   </a:solidFill>
@@ -5423,7 +5426,7 @@
             </a:ln>
             <a:extLst>
               <a:ext uri="{91240B29-F687-4f45-9708-019B960494DF}">
-                <a14:hiddenLine xmlns:a14="http://schemas.microsoft.com/office/drawing/2010/main" xmlns="" w="9525">
+                <a14:hiddenLine xmlns="" xmlns:a14="http://schemas.microsoft.com/office/drawing/2010/main" w="9525">
                   <a:solidFill>
                     <a:srgbClr val="000000"/>
                   </a:solidFill>
@@ -5491,7 +5494,7 @@
             </a:ln>
             <a:extLst>
               <a:ext uri="{91240B29-F687-4f45-9708-019B960494DF}">
-                <a14:hiddenLine xmlns:a14="http://schemas.microsoft.com/office/drawing/2010/main" xmlns="" w="9525">
+                <a14:hiddenLine xmlns="" xmlns:a14="http://schemas.microsoft.com/office/drawing/2010/main" w="9525">
                   <a:solidFill>
                     <a:srgbClr val="000000"/>
                   </a:solidFill>
@@ -5581,7 +5584,7 @@
             </a:ln>
             <a:extLst>
               <a:ext uri="{91240B29-F687-4f45-9708-019B960494DF}">
-                <a14:hiddenLine xmlns:a14="http://schemas.microsoft.com/office/drawing/2010/main" xmlns="" w="9525">
+                <a14:hiddenLine xmlns="" xmlns:a14="http://schemas.microsoft.com/office/drawing/2010/main" w="9525">
                   <a:solidFill>
                     <a:srgbClr val="000000"/>
                   </a:solidFill>
@@ -5721,7 +5724,7 @@
           <a:p>
             <a:fld id="{48A87A34-81AB-432B-8DAE-1953F412C126}" type="datetimeFigureOut">
               <a:rPr lang="en-US" dirty="0"/>
-              <a:t>1/1/2018</a:t>
+              <a:t>1/2/2018</a:t>
             </a:fld>
             <a:endParaRPr lang="en-US" dirty="0"/>
           </a:p>
@@ -5983,7 +5986,7 @@
           <a:p>
             <a:fld id="{48A87A34-81AB-432B-8DAE-1953F412C126}" type="datetimeFigureOut">
               <a:rPr lang="en-US" dirty="0"/>
-              <a:t>1/1/2018</a:t>
+              <a:t>1/2/2018</a:t>
             </a:fld>
             <a:endParaRPr lang="en-US" dirty="0"/>
           </a:p>
@@ -6174,7 +6177,7 @@
           <a:p>
             <a:fld id="{48A87A34-81AB-432B-8DAE-1953F412C126}" type="datetimeFigureOut">
               <a:rPr lang="en-US" dirty="0"/>
-              <a:t>1/1/2018</a:t>
+              <a:t>1/2/2018</a:t>
             </a:fld>
             <a:endParaRPr lang="en-US" dirty="0"/>
           </a:p>
@@ -6432,7 +6435,7 @@
           <a:p>
             <a:fld id="{48A87A34-81AB-432B-8DAE-1953F412C126}" type="datetimeFigureOut">
               <a:rPr lang="en-US" dirty="0"/>
-              <a:t>1/1/2018</a:t>
+              <a:t>1/2/2018</a:t>
             </a:fld>
             <a:endParaRPr lang="en-US" dirty="0"/>
           </a:p>
@@ -6861,7 +6864,7 @@
           <a:p>
             <a:fld id="{48A87A34-81AB-432B-8DAE-1953F412C126}" type="datetimeFigureOut">
               <a:rPr lang="en-US" dirty="0"/>
-              <a:t>1/1/2018</a:t>
+              <a:t>1/2/2018</a:t>
             </a:fld>
             <a:endParaRPr lang="en-US" dirty="0"/>
           </a:p>
@@ -7402,7 +7405,7 @@
           <a:p>
             <a:fld id="{48A87A34-81AB-432B-8DAE-1953F412C126}" type="datetimeFigureOut">
               <a:rPr lang="en-US" dirty="0"/>
-              <a:t>1/1/2018</a:t>
+              <a:t>1/2/2018</a:t>
             </a:fld>
             <a:endParaRPr lang="en-US" dirty="0"/>
           </a:p>
@@ -8117,7 +8120,7 @@
           <a:p>
             <a:fld id="{48A87A34-81AB-432B-8DAE-1953F412C126}" type="datetimeFigureOut">
               <a:rPr lang="en-US" dirty="0"/>
-              <a:t>1/1/2018</a:t>
+              <a:t>1/2/2018</a:t>
             </a:fld>
             <a:endParaRPr lang="en-US" dirty="0"/>
           </a:p>
@@ -8282,7 +8285,7 @@
           <a:p>
             <a:fld id="{48A87A34-81AB-432B-8DAE-1953F412C126}" type="datetimeFigureOut">
               <a:rPr lang="en-US" dirty="0"/>
-              <a:t>1/1/2018</a:t>
+              <a:t>1/2/2018</a:t>
             </a:fld>
             <a:endParaRPr lang="en-US" dirty="0"/>
           </a:p>
@@ -8457,7 +8460,7 @@
           <a:p>
             <a:fld id="{48A87A34-81AB-432B-8DAE-1953F412C126}" type="datetimeFigureOut">
               <a:rPr lang="en-US" dirty="0"/>
-              <a:t>1/1/2018</a:t>
+              <a:t>1/2/2018</a:t>
             </a:fld>
             <a:endParaRPr lang="en-US" dirty="0"/>
           </a:p>
@@ -8622,7 +8625,7 @@
           <a:p>
             <a:fld id="{48A87A34-81AB-432B-8DAE-1953F412C126}" type="datetimeFigureOut">
               <a:rPr lang="en-US" dirty="0"/>
-              <a:t>1/1/2018</a:t>
+              <a:t>1/2/2018</a:t>
             </a:fld>
             <a:endParaRPr lang="en-US" dirty="0"/>
           </a:p>
@@ -8867,7 +8870,7 @@
           <a:p>
             <a:fld id="{48A87A34-81AB-432B-8DAE-1953F412C126}" type="datetimeFigureOut">
               <a:rPr lang="en-US" dirty="0"/>
-              <a:t>1/1/2018</a:t>
+              <a:t>1/2/2018</a:t>
             </a:fld>
             <a:endParaRPr lang="en-US" dirty="0"/>
           </a:p>
@@ -9094,7 +9097,7 @@
           <a:p>
             <a:fld id="{48A87A34-81AB-432B-8DAE-1953F412C126}" type="datetimeFigureOut">
               <a:rPr lang="en-US" dirty="0"/>
-              <a:t>1/1/2018</a:t>
+              <a:t>1/2/2018</a:t>
             </a:fld>
             <a:endParaRPr lang="en-US" dirty="0"/>
           </a:p>
@@ -9470,7 +9473,7 @@
           <a:p>
             <a:fld id="{48A87A34-81AB-432B-8DAE-1953F412C126}" type="datetimeFigureOut">
               <a:rPr lang="en-US" dirty="0"/>
-              <a:t>1/1/2018</a:t>
+              <a:t>1/2/2018</a:t>
             </a:fld>
             <a:endParaRPr lang="en-US" dirty="0"/>
           </a:p>
@@ -9583,7 +9586,7 @@
           <a:p>
             <a:fld id="{48A87A34-81AB-432B-8DAE-1953F412C126}" type="datetimeFigureOut">
               <a:rPr lang="en-US" dirty="0"/>
-              <a:t>1/1/2018</a:t>
+              <a:t>1/2/2018</a:t>
             </a:fld>
             <a:endParaRPr lang="en-US" dirty="0"/>
           </a:p>
@@ -9673,7 +9676,7 @@
           <a:p>
             <a:fld id="{48A87A34-81AB-432B-8DAE-1953F412C126}" type="datetimeFigureOut">
               <a:rPr lang="en-US" dirty="0"/>
-              <a:t>1/1/2018</a:t>
+              <a:t>1/2/2018</a:t>
             </a:fld>
             <a:endParaRPr lang="en-US" dirty="0"/>
           </a:p>
@@ -9917,7 +9920,7 @@
           <a:p>
             <a:fld id="{48A87A34-81AB-432B-8DAE-1953F412C126}" type="datetimeFigureOut">
               <a:rPr lang="en-US" dirty="0"/>
-              <a:t>1/1/2018</a:t>
+              <a:t>1/2/2018</a:t>
             </a:fld>
             <a:endParaRPr lang="en-US" dirty="0"/>
           </a:p>
@@ -10192,7 +10195,7 @@
           <a:p>
             <a:fld id="{48A87A34-81AB-432B-8DAE-1953F412C126}" type="datetimeFigureOut">
               <a:rPr lang="en-US" dirty="0"/>
-              <a:t>1/1/2018</a:t>
+              <a:t>1/2/2018</a:t>
             </a:fld>
             <a:endParaRPr lang="en-US" dirty="0"/>
           </a:p>
@@ -10303,7 +10306,7 @@
           <a:noFill/>
           <a:extLst>
             <a:ext uri="{909E8E84-426E-40dd-AFC4-6F175D3DCCD1}">
-              <a14:hiddenFill xmlns:a14="http://schemas.microsoft.com/office/drawing/2010/main" xmlns="">
+              <a14:hiddenFill xmlns="" xmlns:a14="http://schemas.microsoft.com/office/drawing/2010/main">
                 <a:solidFill>
                   <a:srgbClr val="FFFFFF"/>
                 </a:solidFill>
@@ -10377,7 +10380,7 @@
               </a:ln>
               <a:extLst>
                 <a:ext uri="{91240B29-F687-4f45-9708-019B960494DF}">
-                  <a14:hiddenLine xmlns:a14="http://schemas.microsoft.com/office/drawing/2010/main" xmlns="" w="9525">
+                  <a14:hiddenLine xmlns="" xmlns:a14="http://schemas.microsoft.com/office/drawing/2010/main" w="9525">
                     <a:solidFill>
                       <a:srgbClr val="000000"/>
                     </a:solidFill>
@@ -10467,7 +10470,7 @@
               </a:ln>
               <a:extLst>
                 <a:ext uri="{91240B29-F687-4f45-9708-019B960494DF}">
-                  <a14:hiddenLine xmlns:a14="http://schemas.microsoft.com/office/drawing/2010/main" xmlns="" w="9525">
+                  <a14:hiddenLine xmlns="" xmlns:a14="http://schemas.microsoft.com/office/drawing/2010/main" w="9525">
                     <a:solidFill>
                       <a:srgbClr val="000000"/>
                     </a:solidFill>
@@ -10557,7 +10560,7 @@
               </a:ln>
               <a:extLst>
                 <a:ext uri="{91240B29-F687-4f45-9708-019B960494DF}">
-                  <a14:hiddenLine xmlns:a14="http://schemas.microsoft.com/office/drawing/2010/main" xmlns="" w="9525">
+                  <a14:hiddenLine xmlns="" xmlns:a14="http://schemas.microsoft.com/office/drawing/2010/main" w="9525">
                     <a:solidFill>
                       <a:srgbClr val="000000"/>
                     </a:solidFill>
@@ -10619,7 +10622,7 @@
               </a:ln>
               <a:extLst>
                 <a:ext uri="{91240B29-F687-4f45-9708-019B960494DF}">
-                  <a14:hiddenLine xmlns:a14="http://schemas.microsoft.com/office/drawing/2010/main" xmlns="" w="9525">
+                  <a14:hiddenLine xmlns="" xmlns:a14="http://schemas.microsoft.com/office/drawing/2010/main" w="9525">
                     <a:solidFill>
                       <a:srgbClr val="000000"/>
                     </a:solidFill>
@@ -10709,7 +10712,7 @@
               </a:ln>
               <a:extLst>
                 <a:ext uri="{91240B29-F687-4f45-9708-019B960494DF}">
-                  <a14:hiddenLine xmlns:a14="http://schemas.microsoft.com/office/drawing/2010/main" xmlns="" w="9525">
+                  <a14:hiddenLine xmlns="" xmlns:a14="http://schemas.microsoft.com/office/drawing/2010/main" w="9525">
                     <a:solidFill>
                       <a:srgbClr val="000000"/>
                     </a:solidFill>
@@ -10771,7 +10774,7 @@
               </a:ln>
               <a:extLst>
                 <a:ext uri="{91240B29-F687-4f45-9708-019B960494DF}">
-                  <a14:hiddenLine xmlns:a14="http://schemas.microsoft.com/office/drawing/2010/main" xmlns="" w="9525">
+                  <a14:hiddenLine xmlns="" xmlns:a14="http://schemas.microsoft.com/office/drawing/2010/main" w="9525">
                     <a:solidFill>
                       <a:srgbClr val="000000"/>
                     </a:solidFill>
@@ -10833,7 +10836,7 @@
               </a:ln>
               <a:extLst>
                 <a:ext uri="{91240B29-F687-4f45-9708-019B960494DF}">
-                  <a14:hiddenLine xmlns:a14="http://schemas.microsoft.com/office/drawing/2010/main" xmlns="" w="9525">
+                  <a14:hiddenLine xmlns="" xmlns:a14="http://schemas.microsoft.com/office/drawing/2010/main" w="9525">
                     <a:solidFill>
                       <a:srgbClr val="000000"/>
                     </a:solidFill>
@@ -10923,7 +10926,7 @@
               </a:ln>
               <a:extLst>
                 <a:ext uri="{91240B29-F687-4f45-9708-019B960494DF}">
-                  <a14:hiddenLine xmlns:a14="http://schemas.microsoft.com/office/drawing/2010/main" xmlns="" w="9525">
+                  <a14:hiddenLine xmlns="" xmlns:a14="http://schemas.microsoft.com/office/drawing/2010/main" w="9525">
                     <a:solidFill>
                       <a:srgbClr val="000000"/>
                     </a:solidFill>
@@ -11013,7 +11016,7 @@
               </a:ln>
               <a:extLst>
                 <a:ext uri="{91240B29-F687-4f45-9708-019B960494DF}">
-                  <a14:hiddenLine xmlns:a14="http://schemas.microsoft.com/office/drawing/2010/main" xmlns="" w="9525">
+                  <a14:hiddenLine xmlns="" xmlns:a14="http://schemas.microsoft.com/office/drawing/2010/main" w="9525">
                     <a:solidFill>
                       <a:srgbClr val="000000"/>
                     </a:solidFill>
@@ -11075,7 +11078,7 @@
               </a:ln>
               <a:extLst>
                 <a:ext uri="{91240B29-F687-4f45-9708-019B960494DF}">
-                  <a14:hiddenLine xmlns:a14="http://schemas.microsoft.com/office/drawing/2010/main" xmlns="" w="9525">
+                  <a14:hiddenLine xmlns="" xmlns:a14="http://schemas.microsoft.com/office/drawing/2010/main" w="9525">
                     <a:solidFill>
                       <a:srgbClr val="000000"/>
                     </a:solidFill>
@@ -11185,7 +11188,7 @@
               </a:ln>
               <a:extLst>
                 <a:ext uri="{91240B29-F687-4f45-9708-019B960494DF}">
-                  <a14:hiddenLine xmlns:a14="http://schemas.microsoft.com/office/drawing/2010/main" xmlns="" w="9525">
+                  <a14:hiddenLine xmlns="" xmlns:a14="http://schemas.microsoft.com/office/drawing/2010/main" w="9525">
                     <a:solidFill>
                       <a:srgbClr val="000000"/>
                     </a:solidFill>
@@ -11269,7 +11272,7 @@
               </a:ln>
               <a:extLst>
                 <a:ext uri="{91240B29-F687-4f45-9708-019B960494DF}">
-                  <a14:hiddenLine xmlns:a14="http://schemas.microsoft.com/office/drawing/2010/main" xmlns="" w="9525">
+                  <a14:hiddenLine xmlns="" xmlns:a14="http://schemas.microsoft.com/office/drawing/2010/main" w="9525">
                     <a:solidFill>
                       <a:srgbClr val="000000"/>
                     </a:solidFill>
@@ -11331,7 +11334,7 @@
               </a:ln>
               <a:extLst>
                 <a:ext uri="{91240B29-F687-4f45-9708-019B960494DF}">
-                  <a14:hiddenLine xmlns:a14="http://schemas.microsoft.com/office/drawing/2010/main" xmlns="" w="9525">
+                  <a14:hiddenLine xmlns="" xmlns:a14="http://schemas.microsoft.com/office/drawing/2010/main" w="9525">
                     <a:solidFill>
                       <a:srgbClr val="000000"/>
                     </a:solidFill>
@@ -11393,7 +11396,7 @@
               </a:ln>
               <a:extLst>
                 <a:ext uri="{91240B29-F687-4f45-9708-019B960494DF}">
-                  <a14:hiddenLine xmlns:a14="http://schemas.microsoft.com/office/drawing/2010/main" xmlns="" w="9525">
+                  <a14:hiddenLine xmlns="" xmlns:a14="http://schemas.microsoft.com/office/drawing/2010/main" w="9525">
                     <a:solidFill>
                       <a:srgbClr val="000000"/>
                     </a:solidFill>
@@ -11483,7 +11486,7 @@
               </a:ln>
               <a:extLst>
                 <a:ext uri="{91240B29-F687-4f45-9708-019B960494DF}">
-                  <a14:hiddenLine xmlns:a14="http://schemas.microsoft.com/office/drawing/2010/main" xmlns="" w="9525">
+                  <a14:hiddenLine xmlns="" xmlns:a14="http://schemas.microsoft.com/office/drawing/2010/main" w="9525">
                     <a:solidFill>
                       <a:srgbClr val="000000"/>
                     </a:solidFill>
@@ -11517,7 +11520,7 @@
               </a:ln>
               <a:extLst>
                 <a:ext uri="{91240B29-F687-4f45-9708-019B960494DF}">
-                  <a14:hiddenLine xmlns:a14="http://schemas.microsoft.com/office/drawing/2010/main" xmlns="" w="9525">
+                  <a14:hiddenLine xmlns="" xmlns:a14="http://schemas.microsoft.com/office/drawing/2010/main" w="9525">
                     <a:solidFill>
                       <a:srgbClr val="000000"/>
                     </a:solidFill>
@@ -11582,7 +11585,7 @@
               </a:ln>
               <a:extLst>
                 <a:ext uri="{91240B29-F687-4f45-9708-019B960494DF}">
-                  <a14:hiddenLine xmlns:a14="http://schemas.microsoft.com/office/drawing/2010/main" xmlns="" w="9525">
+                  <a14:hiddenLine xmlns="" xmlns:a14="http://schemas.microsoft.com/office/drawing/2010/main" w="9525">
                     <a:solidFill>
                       <a:srgbClr val="000000"/>
                     </a:solidFill>
@@ -11672,7 +11675,7 @@
               </a:ln>
               <a:extLst>
                 <a:ext uri="{91240B29-F687-4f45-9708-019B960494DF}">
-                  <a14:hiddenLine xmlns:a14="http://schemas.microsoft.com/office/drawing/2010/main" xmlns="" w="9525">
+                  <a14:hiddenLine xmlns="" xmlns:a14="http://schemas.microsoft.com/office/drawing/2010/main" w="9525">
                     <a:solidFill>
                       <a:srgbClr val="000000"/>
                     </a:solidFill>
@@ -11734,7 +11737,7 @@
               </a:ln>
               <a:extLst>
                 <a:ext uri="{91240B29-F687-4f45-9708-019B960494DF}">
-                  <a14:hiddenLine xmlns:a14="http://schemas.microsoft.com/office/drawing/2010/main" xmlns="" w="9525">
+                  <a14:hiddenLine xmlns="" xmlns:a14="http://schemas.microsoft.com/office/drawing/2010/main" w="9525">
                     <a:solidFill>
                       <a:srgbClr val="000000"/>
                     </a:solidFill>
@@ -11824,7 +11827,7 @@
               </a:ln>
               <a:extLst>
                 <a:ext uri="{91240B29-F687-4f45-9708-019B960494DF}">
-                  <a14:hiddenLine xmlns:a14="http://schemas.microsoft.com/office/drawing/2010/main" xmlns="" w="9525">
+                  <a14:hiddenLine xmlns="" xmlns:a14="http://schemas.microsoft.com/office/drawing/2010/main" w="9525">
                     <a:solidFill>
                       <a:srgbClr val="000000"/>
                     </a:solidFill>
@@ -11889,7 +11892,7 @@
               </a:ln>
               <a:extLst>
                 <a:ext uri="{91240B29-F687-4f45-9708-019B960494DF}">
-                  <a14:hiddenLine xmlns:a14="http://schemas.microsoft.com/office/drawing/2010/main" xmlns="" w="9525">
+                  <a14:hiddenLine xmlns="" xmlns:a14="http://schemas.microsoft.com/office/drawing/2010/main" w="9525">
                     <a:solidFill>
                       <a:srgbClr val="000000"/>
                     </a:solidFill>
@@ -11951,7 +11954,7 @@
               </a:ln>
               <a:extLst>
                 <a:ext uri="{91240B29-F687-4f45-9708-019B960494DF}">
-                  <a14:hiddenLine xmlns:a14="http://schemas.microsoft.com/office/drawing/2010/main" xmlns="" w="9525">
+                  <a14:hiddenLine xmlns="" xmlns:a14="http://schemas.microsoft.com/office/drawing/2010/main" w="9525">
                     <a:solidFill>
                       <a:srgbClr val="000000"/>
                     </a:solidFill>
@@ -12041,7 +12044,7 @@
               </a:ln>
               <a:extLst>
                 <a:ext uri="{91240B29-F687-4f45-9708-019B960494DF}">
-                  <a14:hiddenLine xmlns:a14="http://schemas.microsoft.com/office/drawing/2010/main" xmlns="" w="9525">
+                  <a14:hiddenLine xmlns="" xmlns:a14="http://schemas.microsoft.com/office/drawing/2010/main" w="9525">
                     <a:solidFill>
                       <a:srgbClr val="000000"/>
                     </a:solidFill>
@@ -12131,7 +12134,7 @@
               </a:ln>
               <a:extLst>
                 <a:ext uri="{91240B29-F687-4f45-9708-019B960494DF}">
-                  <a14:hiddenLine xmlns:a14="http://schemas.microsoft.com/office/drawing/2010/main" xmlns="" w="9525">
+                  <a14:hiddenLine xmlns="" xmlns:a14="http://schemas.microsoft.com/office/drawing/2010/main" w="9525">
                     <a:solidFill>
                       <a:srgbClr val="000000"/>
                     </a:solidFill>
@@ -12196,7 +12199,7 @@
               </a:ln>
               <a:extLst>
                 <a:ext uri="{91240B29-F687-4f45-9708-019B960494DF}">
-                  <a14:hiddenLine xmlns:a14="http://schemas.microsoft.com/office/drawing/2010/main" xmlns="" w="9525">
+                  <a14:hiddenLine xmlns="" xmlns:a14="http://schemas.microsoft.com/office/drawing/2010/main" w="9525">
                     <a:solidFill>
                       <a:srgbClr val="000000"/>
                     </a:solidFill>
@@ -12316,7 +12319,7 @@
               </a:ln>
               <a:extLst>
                 <a:ext uri="{91240B29-F687-4f45-9708-019B960494DF}">
-                  <a14:hiddenLine xmlns:a14="http://schemas.microsoft.com/office/drawing/2010/main" xmlns="" w="9525">
+                  <a14:hiddenLine xmlns="" xmlns:a14="http://schemas.microsoft.com/office/drawing/2010/main" w="9525">
                     <a:solidFill>
                       <a:srgbClr val="000000"/>
                     </a:solidFill>
@@ -12414,7 +12417,7 @@
               </a:ln>
               <a:extLst>
                 <a:ext uri="{91240B29-F687-4f45-9708-019B960494DF}">
-                  <a14:hiddenLine xmlns:a14="http://schemas.microsoft.com/office/drawing/2010/main" xmlns="" w="9525">
+                  <a14:hiddenLine xmlns="" xmlns:a14="http://schemas.microsoft.com/office/drawing/2010/main" w="9525">
                     <a:solidFill>
                       <a:srgbClr val="000000"/>
                     </a:solidFill>
@@ -12529,7 +12532,7 @@
               </a:ln>
               <a:extLst>
                 <a:ext uri="{91240B29-F687-4f45-9708-019B960494DF}">
-                  <a14:hiddenLine xmlns:a14="http://schemas.microsoft.com/office/drawing/2010/main" xmlns="" w="9525">
+                  <a14:hiddenLine xmlns="" xmlns:a14="http://schemas.microsoft.com/office/drawing/2010/main" w="9525">
                     <a:solidFill>
                       <a:srgbClr val="000000"/>
                     </a:solidFill>
@@ -12619,7 +12622,7 @@
               </a:ln>
               <a:extLst>
                 <a:ext uri="{91240B29-F687-4f45-9708-019B960494DF}">
-                  <a14:hiddenLine xmlns:a14="http://schemas.microsoft.com/office/drawing/2010/main" xmlns="" w="9525">
+                  <a14:hiddenLine xmlns="" xmlns:a14="http://schemas.microsoft.com/office/drawing/2010/main" w="9525">
                     <a:solidFill>
                       <a:srgbClr val="000000"/>
                     </a:solidFill>
@@ -12684,7 +12687,7 @@
               </a:ln>
               <a:extLst>
                 <a:ext uri="{91240B29-F687-4f45-9708-019B960494DF}">
-                  <a14:hiddenLine xmlns:a14="http://schemas.microsoft.com/office/drawing/2010/main" xmlns="" w="9525">
+                  <a14:hiddenLine xmlns="" xmlns:a14="http://schemas.microsoft.com/office/drawing/2010/main" w="9525">
                     <a:solidFill>
                       <a:srgbClr val="000000"/>
                     </a:solidFill>
@@ -12774,7 +12777,7 @@
               </a:ln>
               <a:extLst>
                 <a:ext uri="{91240B29-F687-4f45-9708-019B960494DF}">
-                  <a14:hiddenLine xmlns:a14="http://schemas.microsoft.com/office/drawing/2010/main" xmlns="" w="9525">
+                  <a14:hiddenLine xmlns="" xmlns:a14="http://schemas.microsoft.com/office/drawing/2010/main" w="9525">
                     <a:solidFill>
                       <a:srgbClr val="000000"/>
                     </a:solidFill>
@@ -12842,7 +12845,7 @@
               </a:ln>
               <a:extLst>
                 <a:ext uri="{91240B29-F687-4f45-9708-019B960494DF}">
-                  <a14:hiddenLine xmlns:a14="http://schemas.microsoft.com/office/drawing/2010/main" xmlns="" w="9525">
+                  <a14:hiddenLine xmlns="" xmlns:a14="http://schemas.microsoft.com/office/drawing/2010/main" w="9525">
                     <a:solidFill>
                       <a:srgbClr val="000000"/>
                     </a:solidFill>
@@ -12932,7 +12935,7 @@
               </a:ln>
               <a:extLst>
                 <a:ext uri="{91240B29-F687-4f45-9708-019B960494DF}">
-                  <a14:hiddenLine xmlns:a14="http://schemas.microsoft.com/office/drawing/2010/main" xmlns="" w="9525">
+                  <a14:hiddenLine xmlns="" xmlns:a14="http://schemas.microsoft.com/office/drawing/2010/main" w="9525">
                     <a:solidFill>
                       <a:srgbClr val="000000"/>
                     </a:solidFill>
@@ -13000,7 +13003,7 @@
               </a:ln>
               <a:extLst>
                 <a:ext uri="{91240B29-F687-4f45-9708-019B960494DF}">
-                  <a14:hiddenLine xmlns:a14="http://schemas.microsoft.com/office/drawing/2010/main" xmlns="" w="9525">
+                  <a14:hiddenLine xmlns="" xmlns:a14="http://schemas.microsoft.com/office/drawing/2010/main" w="9525">
                     <a:solidFill>
                       <a:srgbClr val="000000"/>
                     </a:solidFill>
@@ -13090,7 +13093,7 @@
               </a:ln>
               <a:extLst>
                 <a:ext uri="{91240B29-F687-4f45-9708-019B960494DF}">
-                  <a14:hiddenLine xmlns:a14="http://schemas.microsoft.com/office/drawing/2010/main" xmlns="" w="9525">
+                  <a14:hiddenLine xmlns="" xmlns:a14="http://schemas.microsoft.com/office/drawing/2010/main" w="9525">
                     <a:solidFill>
                       <a:srgbClr val="000000"/>
                     </a:solidFill>
@@ -13124,7 +13127,7 @@
               </a:ln>
               <a:extLst>
                 <a:ext uri="{91240B29-F687-4f45-9708-019B960494DF}">
-                  <a14:hiddenLine xmlns:a14="http://schemas.microsoft.com/office/drawing/2010/main" xmlns="" w="9525">
+                  <a14:hiddenLine xmlns="" xmlns:a14="http://schemas.microsoft.com/office/drawing/2010/main" w="9525">
                     <a:solidFill>
                       <a:srgbClr val="000000"/>
                     </a:solidFill>
@@ -13265,7 +13268,7 @@
             <a:fld id="{48A87A34-81AB-432B-8DAE-1953F412C126}" type="datetimeFigureOut">
               <a:rPr lang="en-US" dirty="0"/>
               <a:pPr/>
-              <a:t>1/1/2018</a:t>
+              <a:t>1/2/2018</a:t>
             </a:fld>
             <a:endParaRPr lang="en-US" dirty="0"/>
           </a:p>
@@ -14074,218 +14077,106 @@
           <a:p>
             <a:r>
               <a:rPr lang="en-US" b="1" dirty="0"/>
-              <a:t>phase 3</a:t>
-            </a:r>
-            <a:r>
-              <a:rPr lang="en-US" dirty="0"/>
-              <a:t>: Create </a:t>
-            </a:r>
-            <a:r>
-              <a:rPr lang="en-US" dirty="0" err="1"/>
-              <a:t>tensorflow</a:t>
-            </a:r>
-            <a:r>
-              <a:rPr lang="en-US" dirty="0"/>
-              <a:t> model</a:t>
+              <a:t>phase 2</a:t>
+            </a:r>
+            <a:r>
+              <a:rPr lang="en-US" dirty="0"/>
+              <a:t>: Dataset preparation</a:t>
             </a:r>
             <a:br>
               <a:rPr lang="en-US" dirty="0"/>
             </a:br>
             <a:r>
-              <a:rPr lang="en-US" sz="1600" dirty="0" err="1"/>
-              <a:t>tensorflow</a:t>
+              <a:rPr lang="en-US" sz="2000" cap="none" dirty="0"/>
+              <a:t>executing</a:t>
             </a:r>
             <a:r>
               <a:rPr lang="en-US" dirty="0"/>
               <a:t> </a:t>
             </a:r>
             <a:r>
-              <a:rPr lang="en-US" sz="1600" b="1" i="1" dirty="0"/>
-              <a:t>Placeholders</a:t>
-            </a:r>
-            <a:r>
-              <a:rPr lang="en-US" sz="1600" dirty="0"/>
-              <a:t> for training data</a:t>
-            </a:r>
-          </a:p>
-        </p:txBody>
-      </p:sp>
-      <p:sp>
-        <p:nvSpPr>
-          <p:cNvPr id="101" name="TextBox 100">
+              <a:rPr lang="en-US" sz="2000" cap="none" dirty="0"/>
+              <a:t>dataPrep.py</a:t>
+            </a:r>
+          </a:p>
+        </p:txBody>
+      </p:sp>
+      <p:sp>
+        <p:nvSpPr>
+          <p:cNvPr id="4" name="Content Placeholder 2">
             <a:extLst>
               <a:ext uri="{FF2B5EF4-FFF2-40B4-BE49-F238E27FC236}">
-                <a16:creationId xmlns:a16="http://schemas.microsoft.com/office/drawing/2014/main" id="{7E5FA93A-E4F5-4DBF-90F7-C99F40568C42}"/>
+                <a16:creationId xmlns:a16="http://schemas.microsoft.com/office/drawing/2014/main" id="{11D8CF02-7F4D-418A-8C38-895918DDB03E}"/>
               </a:ext>
             </a:extLst>
           </p:cNvPr>
-          <p:cNvSpPr txBox="1"/>
-          <p:nvPr/>
-        </p:nvSpPr>
-        <p:spPr>
-          <a:xfrm>
-            <a:off x="1784195" y="2720898"/>
-            <a:ext cx="8976732" cy="2862322"/>
-          </a:xfrm>
-          <a:prstGeom prst="rect">
-            <a:avLst/>
-          </a:prstGeom>
-          <a:noFill/>
-        </p:spPr>
-        <p:txBody>
-          <a:bodyPr wrap="square" rtlCol="0">
-            <a:spAutoFit/>
+          <p:cNvSpPr>
+            <a:spLocks noGrp="1"/>
+          </p:cNvSpPr>
+          <p:nvPr>
+            <p:ph idx="1"/>
+          </p:nvPr>
+        </p:nvSpPr>
+        <p:spPr>
+          <a:xfrm>
+            <a:off x="1141412" y="2249487"/>
+            <a:ext cx="9905999" cy="3541714"/>
+          </a:xfrm>
+        </p:spPr>
+        <p:txBody>
+          <a:bodyPr vert="horz" lIns="91440" tIns="45720" rIns="91440" bIns="45720" rtlCol="0" anchor="t">
+            <a:normAutofit fontScale="85000" lnSpcReduction="20000"/>
           </a:bodyPr>
           <a:lstStyle/>
           <a:p>
             <a:r>
-              <a:rPr lang="en-US" dirty="0" err="1"/>
-              <a:t>featureVectorLength</a:t>
-            </a:r>
-            <a:r>
-              <a:rPr lang="en-US" dirty="0"/>
-              <a:t> = </a:t>
-            </a:r>
-            <a:r>
-              <a:rPr lang="en-US" dirty="0" err="1"/>
-              <a:t>len</a:t>
-            </a:r>
-            <a:r>
-              <a:rPr lang="en-US" dirty="0"/>
-              <a:t>(</a:t>
-            </a:r>
-            <a:r>
-              <a:rPr lang="en-US" dirty="0" err="1"/>
-              <a:t>trainFeatures</a:t>
-            </a:r>
-            <a:r>
-              <a:rPr lang="en-US" dirty="0"/>
-              <a:t>[0])</a:t>
-            </a:r>
-          </a:p>
-          <a:p>
-            <a:r>
-              <a:rPr lang="en-US" dirty="0" err="1"/>
-              <a:t>labelVectorLength</a:t>
-            </a:r>
-            <a:r>
-              <a:rPr lang="en-US" dirty="0"/>
-              <a:t> = </a:t>
-            </a:r>
-            <a:r>
-              <a:rPr lang="en-US" dirty="0" err="1"/>
-              <a:t>len</a:t>
-            </a:r>
-            <a:r>
-              <a:rPr lang="en-US" dirty="0"/>
-              <a:t>(</a:t>
-            </a:r>
-            <a:r>
-              <a:rPr lang="en-US" dirty="0" err="1"/>
-              <a:t>trainLabels</a:t>
-            </a:r>
-            <a:r>
-              <a:rPr lang="en-US" dirty="0"/>
-              <a:t>[0])</a:t>
-            </a:r>
-          </a:p>
-          <a:p>
-            <a:endParaRPr lang="en-US" dirty="0"/>
-          </a:p>
-          <a:p>
-            <a:r>
-              <a:rPr lang="en-US" dirty="0"/>
-              <a:t># create the </a:t>
-            </a:r>
-            <a:r>
-              <a:rPr lang="en-US" dirty="0" err="1"/>
-              <a:t>TensorFlow</a:t>
-            </a:r>
-            <a:r>
-              <a:rPr lang="en-US" dirty="0"/>
-              <a:t> feature tensor</a:t>
-            </a:r>
-          </a:p>
-          <a:p>
-            <a:r>
-              <a:rPr lang="en-US" dirty="0"/>
-              <a:t># (None is used because training and testing data are of different sizes)</a:t>
-            </a:r>
-          </a:p>
-          <a:p>
-            <a:r>
-              <a:rPr lang="en-US" dirty="0"/>
-              <a:t>features = </a:t>
-            </a:r>
-            <a:r>
-              <a:rPr lang="en-US" dirty="0" err="1"/>
-              <a:t>tf.placeholder</a:t>
-            </a:r>
-            <a:r>
-              <a:rPr lang="en-US" dirty="0"/>
-              <a:t>(tf.float32, [None, </a:t>
-            </a:r>
-            <a:r>
-              <a:rPr lang="en-US" dirty="0" err="1"/>
-              <a:t>featureVectorLength</a:t>
-            </a:r>
-            <a:r>
-              <a:rPr lang="en-US" dirty="0"/>
-              <a:t>], name=</a:t>
-            </a:r>
-            <a:r>
-              <a:rPr lang="en-US" i="1" dirty="0"/>
-              <a:t>'features')</a:t>
-            </a:r>
-          </a:p>
-          <a:p>
-            <a:endParaRPr lang="en-US" dirty="0"/>
-          </a:p>
-          <a:p>
-            <a:r>
-              <a:rPr lang="en-US" dirty="0"/>
-              <a:t># create the </a:t>
-            </a:r>
-            <a:r>
-              <a:rPr lang="en-US" dirty="0" err="1"/>
-              <a:t>TensorFlow</a:t>
-            </a:r>
-            <a:r>
-              <a:rPr lang="en-US" dirty="0"/>
-              <a:t> label tensor</a:t>
-            </a:r>
-          </a:p>
-          <a:p>
-            <a:r>
-              <a:rPr lang="en-US" dirty="0"/>
-              <a:t># (None is used because training and testing data are of different sizes)</a:t>
-            </a:r>
-          </a:p>
-          <a:p>
-            <a:r>
-              <a:rPr lang="en-US" dirty="0"/>
-              <a:t>labels = </a:t>
-            </a:r>
-            <a:r>
-              <a:rPr lang="en-US" dirty="0" err="1"/>
-              <a:t>tf.placeholder</a:t>
-            </a:r>
-            <a:r>
-              <a:rPr lang="en-US" dirty="0"/>
-              <a:t>(tf.float32, [None, </a:t>
-            </a:r>
-            <a:r>
-              <a:rPr lang="en-US" dirty="0" err="1"/>
-              <a:t>labelVectorLength</a:t>
-            </a:r>
-            <a:r>
-              <a:rPr lang="en-US" dirty="0"/>
-              <a:t>], name=</a:t>
-            </a:r>
-            <a:r>
-              <a:rPr lang="en-US" i="1" dirty="0"/>
-              <a:t>'labels')</a:t>
-            </a:r>
+              <a:rPr lang="en-US" dirty="0"/>
+              <a:t>Fetch raw dataset</a:t>
+            </a:r>
+          </a:p>
+          <a:p>
+            <a:r>
+              <a:rPr lang="en-US" dirty="0"/>
+              <a:t>Print unprocessed dataset statistics</a:t>
+            </a:r>
+          </a:p>
+          <a:p>
+            <a:r>
+              <a:rPr lang="en-US" dirty="0"/>
+              <a:t>Split dataset into training and testing datasets</a:t>
+            </a:r>
+          </a:p>
+          <a:p>
+            <a:r>
+              <a:rPr lang="en-US" dirty="0"/>
+              <a:t>Convert labels to “one-hot” format</a:t>
+            </a:r>
+          </a:p>
+          <a:p>
+            <a:r>
+              <a:rPr lang="en-US" dirty="0"/>
+              <a:t>Randomize training dataset order</a:t>
+            </a:r>
+          </a:p>
+          <a:p>
+            <a:r>
+              <a:rPr lang="en-US" dirty="0"/>
+              <a:t>Print processed dataset statistics</a:t>
+            </a:r>
+          </a:p>
+          <a:p>
+            <a:r>
+              <a:rPr lang="en-US" dirty="0"/>
+              <a:t>Render a sample image and corresponding “one-hot” label</a:t>
+            </a:r>
+          </a:p>
+          <a:p>
+            <a:r>
+              <a:rPr lang="en-US" dirty="0"/>
+              <a:t>Save processed dataset to disk file</a:t>
+            </a:r>
+          </a:p>
+          <a:p>
             <a:endParaRPr lang="en-US" dirty="0"/>
           </a:p>
         </p:txBody>
@@ -14293,7 +14184,7 @@
     </p:spTree>
     <p:extLst>
       <p:ext uri="{BB962C8B-B14F-4D97-AF65-F5344CB8AC3E}">
-        <p14:creationId xmlns:p14="http://schemas.microsoft.com/office/powerpoint/2010/main" val="889624517"/>
+        <p14:creationId xmlns:p14="http://schemas.microsoft.com/office/powerpoint/2010/main" val="289825662"/>
       </p:ext>
     </p:extLst>
   </p:cSld>
@@ -14375,11 +14266,11 @@
             </a:r>
             <a:r>
               <a:rPr lang="en-US" sz="1600" b="1" i="1" dirty="0"/>
-              <a:t>variables</a:t>
+              <a:t>Placeholders</a:t>
             </a:r>
             <a:r>
               <a:rPr lang="en-US" sz="1600" dirty="0"/>
-              <a:t> for trainable variables</a:t>
+              <a:t> for training data</a:t>
             </a:r>
           </a:p>
         </p:txBody>
@@ -14399,7 +14290,7 @@
         <p:spPr>
           <a:xfrm>
             <a:off x="1784195" y="2720898"/>
-            <a:ext cx="8976732" cy="2308324"/>
+            <a:ext cx="8976732" cy="2862322"/>
           </a:xfrm>
           <a:prstGeom prst="rect">
             <a:avLst/>
@@ -14469,29 +14360,35 @@
           <a:p>
             <a:r>
               <a:rPr lang="en-US" dirty="0"/>
-              <a:t># each weight initialized to zero and will be adjusted as algorithm learns.  </a:t>
-            </a:r>
-          </a:p>
-          <a:p>
-            <a:r>
-              <a:rPr lang="en-US" dirty="0"/>
-              <a:t>weights = </a:t>
+              <a:t># create the </a:t>
             </a:r>
             <a:r>
               <a:rPr lang="en-US" dirty="0" err="1"/>
-              <a:t>tf.Variable</a:t>
-            </a:r>
-            <a:r>
-              <a:rPr lang="en-US" dirty="0"/>
-              <a:t>(</a:t>
+              <a:t>TensorFlow</a:t>
+            </a:r>
+            <a:r>
+              <a:rPr lang="en-US" dirty="0"/>
+              <a:t> feature tensor</a:t>
+            </a:r>
+          </a:p>
+          <a:p>
+            <a:r>
+              <a:rPr lang="en-US" dirty="0"/>
+              <a:t># (None is used because training and testing data are of different sizes)</a:t>
+            </a:r>
+          </a:p>
+          <a:p>
+            <a:r>
+              <a:rPr lang="en-US" dirty="0"/>
+              <a:t>features = </a:t>
             </a:r>
             <a:r>
               <a:rPr lang="en-US" dirty="0" err="1"/>
-              <a:t>tf.zeros</a:t>
-            </a:r>
-            <a:r>
-              <a:rPr lang="en-US" dirty="0"/>
-              <a:t>([</a:t>
+              <a:t>tf.placeholder</a:t>
+            </a:r>
+            <a:r>
+              <a:rPr lang="en-US" dirty="0"/>
+              <a:t>(tf.float32, [None, </a:t>
             </a:r>
             <a:r>
               <a:rPr lang="en-US" dirty="0" err="1"/>
@@ -14499,7 +14396,48 @@
             </a:r>
             <a:r>
               <a:rPr lang="en-US" dirty="0"/>
-              <a:t>, </a:t>
+              <a:t>], name=</a:t>
+            </a:r>
+            <a:r>
+              <a:rPr lang="en-US" i="1" dirty="0"/>
+              <a:t>'features')</a:t>
+            </a:r>
+          </a:p>
+          <a:p>
+            <a:endParaRPr lang="en-US" dirty="0"/>
+          </a:p>
+          <a:p>
+            <a:r>
+              <a:rPr lang="en-US" dirty="0"/>
+              <a:t># create the </a:t>
+            </a:r>
+            <a:r>
+              <a:rPr lang="en-US" dirty="0" err="1"/>
+              <a:t>TensorFlow</a:t>
+            </a:r>
+            <a:r>
+              <a:rPr lang="en-US" dirty="0"/>
+              <a:t> label tensor</a:t>
+            </a:r>
+          </a:p>
+          <a:p>
+            <a:r>
+              <a:rPr lang="en-US" dirty="0"/>
+              <a:t># (None is used because training and testing data are of different sizes)</a:t>
+            </a:r>
+          </a:p>
+          <a:p>
+            <a:r>
+              <a:rPr lang="en-US" dirty="0"/>
+              <a:t>labels = </a:t>
+            </a:r>
+            <a:r>
+              <a:rPr lang="en-US" dirty="0" err="1"/>
+              <a:t>tf.placeholder</a:t>
+            </a:r>
+            <a:r>
+              <a:rPr lang="en-US" dirty="0"/>
+              <a:t>(tf.float32, [None, </a:t>
             </a:r>
             <a:r>
               <a:rPr lang="en-US" dirty="0" err="1"/>
@@ -14507,54 +14445,11 @@
             </a:r>
             <a:r>
               <a:rPr lang="en-US" dirty="0"/>
-              <a:t>]), name=</a:t>
+              <a:t>], name=</a:t>
             </a:r>
             <a:r>
               <a:rPr lang="en-US" i="1" dirty="0"/>
-              <a:t>'weights')</a:t>
-            </a:r>
-          </a:p>
-          <a:p>
-            <a:endParaRPr lang="en-US" dirty="0"/>
-          </a:p>
-          <a:p>
-            <a:r>
-              <a:rPr lang="en-US" dirty="0"/>
-              <a:t># each bias initialized to zero and will be adjusted as algorithm learns.</a:t>
-            </a:r>
-          </a:p>
-          <a:p>
-            <a:r>
-              <a:rPr lang="en-US" dirty="0"/>
-              <a:t>biases = </a:t>
-            </a:r>
-            <a:r>
-              <a:rPr lang="en-US" dirty="0" err="1"/>
-              <a:t>tf.Variable</a:t>
-            </a:r>
-            <a:r>
-              <a:rPr lang="en-US" dirty="0"/>
-              <a:t>(</a:t>
-            </a:r>
-            <a:r>
-              <a:rPr lang="en-US" dirty="0" err="1"/>
-              <a:t>tf.zeros</a:t>
-            </a:r>
-            <a:r>
-              <a:rPr lang="en-US" dirty="0"/>
-              <a:t>([</a:t>
-            </a:r>
-            <a:r>
-              <a:rPr lang="en-US" dirty="0" err="1"/>
-              <a:t>labelVectorLength</a:t>
-            </a:r>
-            <a:r>
-              <a:rPr lang="en-US" dirty="0"/>
-              <a:t>], name=</a:t>
-            </a:r>
-            <a:r>
-              <a:rPr lang="en-US" i="1" dirty="0"/>
-              <a:t>'biases'))</a:t>
+              <a:t>'labels')</a:t>
             </a:r>
             <a:endParaRPr lang="en-US" dirty="0"/>
           </a:p>
@@ -14563,7 +14458,7 @@
     </p:spTree>
     <p:extLst>
       <p:ext uri="{BB962C8B-B14F-4D97-AF65-F5344CB8AC3E}">
-        <p14:creationId xmlns:p14="http://schemas.microsoft.com/office/powerpoint/2010/main" val="3783566530"/>
+        <p14:creationId xmlns:p14="http://schemas.microsoft.com/office/powerpoint/2010/main" val="889624517"/>
       </p:ext>
     </p:extLst>
   </p:cSld>
@@ -14636,16 +14531,20 @@
               <a:rPr lang="en-US" dirty="0"/>
             </a:br>
             <a:r>
-              <a:rPr lang="en-US" sz="1600" dirty="0"/>
-              <a:t>Use placeholders and variables in </a:t>
-            </a:r>
-            <a:r>
               <a:rPr lang="en-US" sz="1600" dirty="0" err="1"/>
               <a:t>tensorflow</a:t>
             </a:r>
             <a:r>
+              <a:rPr lang="en-US" dirty="0"/>
+              <a:t> </a:t>
+            </a:r>
+            <a:r>
+              <a:rPr lang="en-US" sz="1600" b="1" i="1" dirty="0"/>
+              <a:t>variables</a:t>
+            </a:r>
+            <a:r>
               <a:rPr lang="en-US" sz="1600" dirty="0"/>
-              <a:t> model</a:t>
+              <a:t> for trainable variables</a:t>
             </a:r>
           </a:p>
         </p:txBody>
@@ -14665,7 +14564,7 @@
         <p:spPr>
           <a:xfrm>
             <a:off x="1784195" y="2720898"/>
-            <a:ext cx="8976732" cy="646331"/>
+            <a:ext cx="8976732" cy="2308324"/>
           </a:xfrm>
           <a:prstGeom prst="rect">
             <a:avLst/>
@@ -14679,14 +14578,8 @@
           <a:lstStyle/>
           <a:p>
             <a:r>
-              <a:rPr lang="en-US" dirty="0"/>
-              <a:t># define how our predicted outputs are calculated using our model</a:t>
-            </a:r>
-          </a:p>
-          <a:p>
-            <a:r>
               <a:rPr lang="en-US" dirty="0" err="1"/>
-              <a:t>predictedLabels</a:t>
+              <a:t>featureVectorLength</a:t>
             </a:r>
             <a:r>
               <a:rPr lang="en-US" dirty="0"/>
@@ -14694,7 +14587,7 @@
             </a:r>
             <a:r>
               <a:rPr lang="en-US" dirty="0" err="1"/>
-              <a:t>tf.nn.softmax</a:t>
+              <a:t>len</a:t>
             </a:r>
             <a:r>
               <a:rPr lang="en-US" dirty="0"/>
@@ -14702,19 +14595,140 @@
             </a:r>
             <a:r>
               <a:rPr lang="en-US" dirty="0" err="1"/>
-              <a:t>tf.matmul</a:t>
-            </a:r>
-            <a:r>
-              <a:rPr lang="en-US" dirty="0"/>
-              <a:t>(features, weights) + biases)</a:t>
-            </a:r>
+              <a:t>trainFeatures</a:t>
+            </a:r>
+            <a:r>
+              <a:rPr lang="en-US" dirty="0"/>
+              <a:t>[0])</a:t>
+            </a:r>
+          </a:p>
+          <a:p>
+            <a:r>
+              <a:rPr lang="en-US" dirty="0" err="1"/>
+              <a:t>labelVectorLength</a:t>
+            </a:r>
+            <a:r>
+              <a:rPr lang="en-US" dirty="0"/>
+              <a:t> = </a:t>
+            </a:r>
+            <a:r>
+              <a:rPr lang="en-US" dirty="0" err="1"/>
+              <a:t>len</a:t>
+            </a:r>
+            <a:r>
+              <a:rPr lang="en-US" dirty="0"/>
+              <a:t>(</a:t>
+            </a:r>
+            <a:r>
+              <a:rPr lang="en-US" dirty="0" err="1"/>
+              <a:t>trainLabels</a:t>
+            </a:r>
+            <a:r>
+              <a:rPr lang="en-US" dirty="0"/>
+              <a:t>[0])</a:t>
+            </a:r>
+          </a:p>
+          <a:p>
+            <a:endParaRPr lang="en-US" dirty="0"/>
+          </a:p>
+          <a:p>
+            <a:r>
+              <a:rPr lang="en-US" dirty="0"/>
+              <a:t># each weight initialized to zero and will be adjusted as algorithm learns.  </a:t>
+            </a:r>
+          </a:p>
+          <a:p>
+            <a:r>
+              <a:rPr lang="en-US" dirty="0"/>
+              <a:t>weights = </a:t>
+            </a:r>
+            <a:r>
+              <a:rPr lang="en-US" dirty="0" err="1"/>
+              <a:t>tf.Variable</a:t>
+            </a:r>
+            <a:r>
+              <a:rPr lang="en-US" dirty="0"/>
+              <a:t>(</a:t>
+            </a:r>
+            <a:r>
+              <a:rPr lang="en-US" dirty="0" err="1"/>
+              <a:t>tf.zeros</a:t>
+            </a:r>
+            <a:r>
+              <a:rPr lang="en-US" dirty="0"/>
+              <a:t>([</a:t>
+            </a:r>
+            <a:r>
+              <a:rPr lang="en-US" dirty="0" err="1"/>
+              <a:t>featureVectorLength</a:t>
+            </a:r>
+            <a:r>
+              <a:rPr lang="en-US" dirty="0"/>
+              <a:t>, </a:t>
+            </a:r>
+            <a:r>
+              <a:rPr lang="en-US" dirty="0" err="1"/>
+              <a:t>labelVectorLength</a:t>
+            </a:r>
+            <a:r>
+              <a:rPr lang="en-US" dirty="0"/>
+              <a:t>]), name=</a:t>
+            </a:r>
+            <a:r>
+              <a:rPr lang="en-US" i="1" dirty="0"/>
+              <a:t>'weights')</a:t>
+            </a:r>
+          </a:p>
+          <a:p>
+            <a:endParaRPr lang="en-US" dirty="0"/>
+          </a:p>
+          <a:p>
+            <a:r>
+              <a:rPr lang="en-US" dirty="0"/>
+              <a:t># each bias initialized to zero and will be adjusted as algorithm learns.</a:t>
+            </a:r>
+          </a:p>
+          <a:p>
+            <a:r>
+              <a:rPr lang="en-US" dirty="0"/>
+              <a:t>biases = </a:t>
+            </a:r>
+            <a:r>
+              <a:rPr lang="en-US" dirty="0" err="1"/>
+              <a:t>tf.Variable</a:t>
+            </a:r>
+            <a:r>
+              <a:rPr lang="en-US" dirty="0"/>
+              <a:t>(</a:t>
+            </a:r>
+            <a:r>
+              <a:rPr lang="en-US" dirty="0" err="1"/>
+              <a:t>tf.zeros</a:t>
+            </a:r>
+            <a:r>
+              <a:rPr lang="en-US" dirty="0"/>
+              <a:t>([</a:t>
+            </a:r>
+            <a:r>
+              <a:rPr lang="en-US" dirty="0" err="1"/>
+              <a:t>labelVectorLength</a:t>
+            </a:r>
+            <a:r>
+              <a:rPr lang="en-US" dirty="0"/>
+              <a:t>], name=</a:t>
+            </a:r>
+            <a:r>
+              <a:rPr lang="en-US" i="1" dirty="0"/>
+              <a:t>'biases'))</a:t>
+            </a:r>
+            <a:endParaRPr lang="en-US" dirty="0"/>
           </a:p>
         </p:txBody>
       </p:sp>
     </p:spTree>
     <p:extLst>
       <p:ext uri="{BB962C8B-B14F-4D97-AF65-F5344CB8AC3E}">
-        <p14:creationId xmlns:p14="http://schemas.microsoft.com/office/powerpoint/2010/main" val="800426870"/>
+        <p14:creationId xmlns:p14="http://schemas.microsoft.com/office/powerpoint/2010/main" val="3783566530"/>
       </p:ext>
     </p:extLst>
   </p:cSld>
@@ -14788,7 +14802,15 @@
             </a:br>
             <a:r>
               <a:rPr lang="en-US" sz="1600" dirty="0"/>
-              <a:t>define how accuracy will be characterized</a:t>
+              <a:t>Use placeholders and variables in </a:t>
+            </a:r>
+            <a:r>
+              <a:rPr lang="en-US" sz="1600" dirty="0" err="1"/>
+              <a:t>tensorflow</a:t>
+            </a:r>
+            <a:r>
+              <a:rPr lang="en-US" sz="1600" dirty="0"/>
+              <a:t> model</a:t>
             </a:r>
           </a:p>
         </p:txBody>
@@ -14807,8 +14829,8 @@
         </p:nvSpPr>
         <p:spPr>
           <a:xfrm>
-            <a:off x="1141412" y="2720898"/>
-            <a:ext cx="10266285" cy="923330"/>
+            <a:off x="1784195" y="2720898"/>
+            <a:ext cx="8976732" cy="646331"/>
           </a:xfrm>
           <a:prstGeom prst="rect">
             <a:avLst/>
@@ -14823,47 +14845,33 @@
           <a:p>
             <a:r>
               <a:rPr lang="en-US" dirty="0"/>
-              <a:t># cross entropy tells us how well our predicted probability distribution matches the true probability distribution </a:t>
-            </a:r>
-          </a:p>
-          <a:p>
-            <a:r>
-              <a:rPr lang="en-US" dirty="0"/>
-              <a:t># (1e-10 is added to prevent NANs)</a:t>
-            </a:r>
-          </a:p>
-          <a:p>
-            <a:r>
-              <a:rPr lang="en-US" dirty="0" err="1"/>
-              <a:t>crossEntropy</a:t>
-            </a:r>
-            <a:r>
-              <a:rPr lang="en-US" dirty="0"/>
-              <a:t> = </a:t>
-            </a:r>
-            <a:r>
-              <a:rPr lang="en-US" dirty="0" err="1"/>
-              <a:t>tf.reduce_mean</a:t>
-            </a:r>
-            <a:r>
-              <a:rPr lang="en-US" dirty="0"/>
-              <a:t>(-</a:t>
-            </a:r>
-            <a:r>
-              <a:rPr lang="en-US" dirty="0" err="1"/>
-              <a:t>tf.reduce_sum</a:t>
-            </a:r>
-            <a:r>
-              <a:rPr lang="en-US" dirty="0"/>
-              <a:t>(labels * tf.log(</a:t>
-            </a:r>
+              <a:t># define how our predicted outputs are calculated using our model</a:t>
+            </a:r>
+          </a:p>
+          <a:p>
             <a:r>
               <a:rPr lang="en-US" dirty="0" err="1"/>
               <a:t>predictedLabels</a:t>
             </a:r>
             <a:r>
               <a:rPr lang="en-US" dirty="0"/>
-              <a:t> + 1e-10), axis=[1]))</a:t>
+              <a:t> = </a:t>
+            </a:r>
+            <a:r>
+              <a:rPr lang="en-US" dirty="0" err="1"/>
+              <a:t>tf.nn.softmax</a:t>
+            </a:r>
+            <a:r>
+              <a:rPr lang="en-US" dirty="0"/>
+              <a:t>(</a:t>
+            </a:r>
+            <a:r>
+              <a:rPr lang="en-US" dirty="0" err="1"/>
+              <a:t>tf.matmul</a:t>
+            </a:r>
+            <a:r>
+              <a:rPr lang="en-US" dirty="0"/>
+              <a:t>(features, weights) + biases)</a:t>
             </a:r>
           </a:p>
         </p:txBody>
@@ -14871,7 +14879,7 @@
     </p:spTree>
     <p:extLst>
       <p:ext uri="{BB962C8B-B14F-4D97-AF65-F5344CB8AC3E}">
-        <p14:creationId xmlns:p14="http://schemas.microsoft.com/office/powerpoint/2010/main" val="578536108"/>
+        <p14:creationId xmlns:p14="http://schemas.microsoft.com/office/powerpoint/2010/main" val="800426870"/>
       </p:ext>
     </p:extLst>
   </p:cSld>
@@ -14926,11 +14934,11 @@
           <a:p>
             <a:r>
               <a:rPr lang="en-US" b="1" dirty="0"/>
-              <a:t>phase 4</a:t>
-            </a:r>
-            <a:r>
-              <a:rPr lang="en-US" dirty="0"/>
-              <a:t>: train </a:t>
+              <a:t>phase 3</a:t>
+            </a:r>
+            <a:r>
+              <a:rPr lang="en-US" dirty="0"/>
+              <a:t>: Create </a:t>
             </a:r>
             <a:r>
               <a:rPr lang="en-US" dirty="0" err="1"/>
@@ -14945,7 +14953,7 @@
             </a:br>
             <a:r>
               <a:rPr lang="en-US" sz="1600" dirty="0"/>
-              <a:t>create a session and arrange to save resultant model</a:t>
+              <a:t>define how accuracy will be characterized</a:t>
             </a:r>
           </a:p>
         </p:txBody>
@@ -14964,8 +14972,8 @@
         </p:nvSpPr>
         <p:spPr>
           <a:xfrm>
-            <a:off x="1141412" y="2141036"/>
-            <a:ext cx="10266285" cy="4247317"/>
+            <a:off x="1141412" y="2720898"/>
+            <a:ext cx="10266285" cy="923330"/>
           </a:xfrm>
           <a:prstGeom prst="rect">
             <a:avLst/>
@@ -14980,13 +14988,19 @@
           <a:p>
             <a:r>
               <a:rPr lang="en-US" dirty="0"/>
-              <a:t># we want to be able to save the results of our trained model</a:t>
+              <a:t># cross entropy tells us how well our predicted probability distribution matches the true probability distribution </a:t>
+            </a:r>
+          </a:p>
+          <a:p>
+            <a:r>
+              <a:rPr lang="en-US" dirty="0"/>
+              <a:t># (1e-10 is added to prevent NANs)</a:t>
             </a:r>
           </a:p>
           <a:p>
             <a:r>
               <a:rPr lang="en-US" dirty="0" err="1"/>
-              <a:t>modelSaver</a:t>
+              <a:t>crossEntropy</a:t>
             </a:r>
             <a:r>
               <a:rPr lang="en-US" dirty="0"/>
@@ -14994,145 +15008,27 @@
             </a:r>
             <a:r>
               <a:rPr lang="en-US" dirty="0" err="1"/>
-              <a:t>tf.train.Saver</a:t>
-            </a:r>
-            <a:r>
-              <a:rPr lang="en-US" dirty="0"/>
-              <a:t>()</a:t>
-            </a:r>
-          </a:p>
-          <a:p>
-            <a:endParaRPr lang="en-US" dirty="0"/>
-          </a:p>
-          <a:p>
-            <a:r>
-              <a:rPr lang="en-US" dirty="0"/>
-              <a:t># we need a session in which we can execute our model</a:t>
-            </a:r>
-          </a:p>
-          <a:p>
-            <a:r>
-              <a:rPr lang="en-US" dirty="0"/>
-              <a:t>session = </a:t>
+              <a:t>tf.reduce_mean</a:t>
+            </a:r>
+            <a:r>
+              <a:rPr lang="en-US" dirty="0"/>
+              <a:t>(-</a:t>
             </a:r>
             <a:r>
               <a:rPr lang="en-US" dirty="0" err="1"/>
-              <a:t>tf.InteractiveSession</a:t>
-            </a:r>
-            <a:r>
-              <a:rPr lang="en-US" dirty="0"/>
-              <a:t>()</a:t>
-            </a:r>
-          </a:p>
-          <a:p>
-            <a:endParaRPr lang="en-US" dirty="0"/>
-          </a:p>
-          <a:p>
-            <a:r>
-              <a:rPr lang="en-US" i="1" dirty="0">
-                <a:solidFill>
-                  <a:srgbClr val="FFFF00"/>
-                </a:solidFill>
-              </a:rPr>
-              <a:t>&lt; PERFORM MODEL TRAINING HERE&gt;</a:t>
-            </a:r>
-          </a:p>
-          <a:p>
-            <a:endParaRPr lang="en-US" dirty="0"/>
-          </a:p>
-          <a:p>
-            <a:r>
-              <a:rPr lang="en-US" dirty="0"/>
-              <a:t># save trained model to disk</a:t>
-            </a:r>
-          </a:p>
-          <a:p>
-            <a:r>
-              <a:rPr lang="en-US" dirty="0"/>
-              <a:t>directory = </a:t>
-            </a:r>
-            <a:r>
-              <a:rPr lang="en-US" i="1" dirty="0"/>
-              <a:t>"</a:t>
-            </a:r>
-            <a:r>
-              <a:rPr lang="en-US" i="1" dirty="0" err="1"/>
-              <a:t>modelExport</a:t>
-            </a:r>
-            <a:r>
-              <a:rPr lang="en-US" i="1" dirty="0"/>
-              <a:t>"</a:t>
-            </a:r>
-          </a:p>
-          <a:p>
-            <a:r>
-              <a:rPr lang="en-US" dirty="0"/>
-              <a:t>if not </a:t>
+              <a:t>tf.reduce_sum</a:t>
+            </a:r>
+            <a:r>
+              <a:rPr lang="en-US" dirty="0"/>
+              <a:t>(labels * tf.log(</a:t>
             </a:r>
             <a:r>
               <a:rPr lang="en-US" dirty="0" err="1"/>
-              <a:t>os.path.exists</a:t>
-            </a:r>
-            <a:r>
-              <a:rPr lang="en-US" dirty="0"/>
-              <a:t>(directory):</a:t>
-            </a:r>
-          </a:p>
-          <a:p>
-            <a:r>
-              <a:rPr lang="en-US" dirty="0"/>
-              <a:t>    </a:t>
-            </a:r>
-            <a:r>
-              <a:rPr lang="en-US" dirty="0" err="1"/>
-              <a:t>os.makedirs</a:t>
-            </a:r>
-            <a:r>
-              <a:rPr lang="en-US" dirty="0"/>
-              <a:t>(directory)</a:t>
-            </a:r>
-          </a:p>
-          <a:p>
-            <a:r>
-              <a:rPr lang="en-US" dirty="0" err="1"/>
-              <a:t>modelSaver.save</a:t>
-            </a:r>
-            <a:r>
-              <a:rPr lang="en-US" dirty="0"/>
-              <a:t>(session, </a:t>
-            </a:r>
-            <a:r>
-              <a:rPr lang="en-US" i="1" dirty="0"/>
-              <a:t>'</a:t>
-            </a:r>
-            <a:r>
-              <a:rPr lang="en-US" i="1" dirty="0" err="1"/>
-              <a:t>modelExport</a:t>
-            </a:r>
-            <a:r>
-              <a:rPr lang="en-US" i="1" dirty="0"/>
-              <a:t>/</a:t>
-            </a:r>
-            <a:r>
-              <a:rPr lang="en-US" i="1" dirty="0" err="1"/>
-              <a:t>MNISTmodel</a:t>
-            </a:r>
-            <a:r>
-              <a:rPr lang="en-US" i="1" dirty="0"/>
-              <a:t>')</a:t>
-            </a:r>
-          </a:p>
-          <a:p>
-            <a:endParaRPr lang="en-US" dirty="0"/>
-          </a:p>
-          <a:p>
-            <a:r>
-              <a:rPr lang="en-US" dirty="0" err="1"/>
-              <a:t>session.close</a:t>
-            </a:r>
-            <a:r>
-              <a:rPr lang="en-US" dirty="0"/>
-              <a:t>()</a:t>
+              <a:t>predictedLabels</a:t>
+            </a:r>
+            <a:r>
+              <a:rPr lang="en-US" dirty="0"/>
+              <a:t> + 1e-10), axis=[1]))</a:t>
             </a:r>
           </a:p>
         </p:txBody>
@@ -15140,7 +15036,7 @@
     </p:spTree>
     <p:extLst>
       <p:ext uri="{BB962C8B-B14F-4D97-AF65-F5344CB8AC3E}">
-        <p14:creationId xmlns:p14="http://schemas.microsoft.com/office/powerpoint/2010/main" val="3548032399"/>
+        <p14:creationId xmlns:p14="http://schemas.microsoft.com/office/powerpoint/2010/main" val="578536108"/>
       </p:ext>
     </p:extLst>
   </p:cSld>
@@ -15214,7 +15110,7 @@
             </a:br>
             <a:r>
               <a:rPr lang="en-US" sz="1600" dirty="0"/>
-              <a:t>perform model training within the session</a:t>
+              <a:t>create a session and arrange to save resultant model</a:t>
             </a:r>
           </a:p>
         </p:txBody>
@@ -15233,8 +15129,8 @@
         </p:nvSpPr>
         <p:spPr>
           <a:xfrm>
-            <a:off x="1141412" y="1895711"/>
-            <a:ext cx="10901905" cy="4801314"/>
+            <a:off x="1141412" y="2141036"/>
+            <a:ext cx="10266285" cy="4247317"/>
           </a:xfrm>
           <a:prstGeom prst="rect">
             <a:avLst/>
@@ -15249,25 +15145,25 @@
           <a:p>
             <a:r>
               <a:rPr lang="en-US" dirty="0"/>
-              <a:t># we are </a:t>
-            </a:r>
-            <a:r>
-              <a:rPr lang="en-US" u="sng" dirty="0" err="1"/>
-              <a:t>gonna</a:t>
-            </a:r>
-            <a:r>
-              <a:rPr lang="en-US" u="sng" dirty="0"/>
-              <a:t> train with random subsets of training data, to speed up gradient descent</a:t>
+              <a:t># we want to be able to save the results of our trained model</a:t>
             </a:r>
           </a:p>
           <a:p>
             <a:r>
               <a:rPr lang="en-US" dirty="0" err="1"/>
-              <a:t>numFeatureBatches</a:t>
-            </a:r>
-            <a:r>
-              <a:rPr lang="en-US" dirty="0"/>
-              <a:t> = 20</a:t>
+              <a:t>modelSaver</a:t>
+            </a:r>
+            <a:r>
+              <a:rPr lang="en-US" dirty="0"/>
+              <a:t> = </a:t>
+            </a:r>
+            <a:r>
+              <a:rPr lang="en-US" dirty="0" err="1"/>
+              <a:t>tf.train.Saver</a:t>
+            </a:r>
+            <a:r>
+              <a:rPr lang="en-US" dirty="0"/>
+              <a:t>()</a:t>
             </a:r>
           </a:p>
           <a:p>
@@ -15276,298 +15172,140 @@
           <a:p>
             <a:r>
               <a:rPr lang="en-US" dirty="0"/>
-              <a:t># perform the algorithm training (need to batch for really large data sets but we aren't here)</a:t>
-            </a:r>
-          </a:p>
-          <a:p>
+              <a:t># we need a session in which we can execute our model</a:t>
+            </a:r>
+          </a:p>
+          <a:p>
+            <a:r>
+              <a:rPr lang="en-US" dirty="0"/>
+              <a:t>session = </a:t>
+            </a:r>
             <a:r>
               <a:rPr lang="en-US" dirty="0" err="1"/>
-              <a:t>learningRate</a:t>
-            </a:r>
-            <a:r>
-              <a:rPr lang="en-US" dirty="0"/>
-              <a:t> = 0.5</a:t>
-            </a:r>
-          </a:p>
-          <a:p>
+              <a:t>tf.InteractiveSession</a:t>
+            </a:r>
+            <a:r>
+              <a:rPr lang="en-US" dirty="0"/>
+              <a:t>()</a:t>
+            </a:r>
+          </a:p>
+          <a:p>
+            <a:endParaRPr lang="en-US" dirty="0"/>
+          </a:p>
+          <a:p>
+            <a:r>
+              <a:rPr lang="en-US" i="1" dirty="0">
+                <a:solidFill>
+                  <a:srgbClr val="FFFF00"/>
+                </a:solidFill>
+              </a:rPr>
+              <a:t>&lt; PERFORM MODEL TRAINING HERE&gt;</a:t>
+            </a:r>
+          </a:p>
+          <a:p>
+            <a:endParaRPr lang="en-US" dirty="0"/>
+          </a:p>
+          <a:p>
+            <a:r>
+              <a:rPr lang="en-US" dirty="0"/>
+              <a:t># save trained model to disk</a:t>
+            </a:r>
+          </a:p>
+          <a:p>
+            <a:r>
+              <a:rPr lang="en-US" dirty="0"/>
+              <a:t>directory = </a:t>
+            </a:r>
+            <a:r>
+              <a:rPr lang="en-US" i="1" dirty="0"/>
+              <a:t>"</a:t>
+            </a:r>
+            <a:r>
+              <a:rPr lang="en-US" i="1" dirty="0" err="1"/>
+              <a:t>modelExport</a:t>
+            </a:r>
+            <a:r>
+              <a:rPr lang="en-US" i="1" dirty="0"/>
+              <a:t>"</a:t>
+            </a:r>
+          </a:p>
+          <a:p>
+            <a:r>
+              <a:rPr lang="en-US" dirty="0"/>
+              <a:t>if not </a:t>
+            </a:r>
             <a:r>
               <a:rPr lang="en-US" dirty="0" err="1"/>
-              <a:t>accuracyGoal</a:t>
-            </a:r>
-            <a:r>
-              <a:rPr lang="en-US" dirty="0"/>
-              <a:t> = .90</a:t>
-            </a:r>
-          </a:p>
-          <a:p>
-            <a:r>
-              <a:rPr lang="en-US" dirty="0"/>
-              <a:t>for count in range(0, 1001):</a:t>
-            </a:r>
-          </a:p>
-          <a:p>
-            <a:r>
-              <a:rPr lang="en-US" dirty="0"/>
-              <a:t>    training = </a:t>
+              <a:t>os.path.exists</a:t>
+            </a:r>
+            <a:r>
+              <a:rPr lang="en-US" dirty="0"/>
+              <a:t>(directory):</a:t>
+            </a:r>
+          </a:p>
+          <a:p>
+            <a:r>
+              <a:rPr lang="en-US" dirty="0"/>
+              <a:t>    </a:t>
             </a:r>
             <a:r>
               <a:rPr lang="en-US" dirty="0" err="1"/>
-              <a:t>tf.train.GradientDescentOptimizer</a:t>
-            </a:r>
-            <a:r>
-              <a:rPr lang="en-US" dirty="0"/>
-              <a:t>(</a:t>
-            </a:r>
+              <a:t>os.makedirs</a:t>
+            </a:r>
+            <a:r>
+              <a:rPr lang="en-US" dirty="0"/>
+              <a:t>(directory)</a:t>
+            </a:r>
+          </a:p>
+          <a:p>
             <a:r>
               <a:rPr lang="en-US" dirty="0" err="1"/>
-              <a:t>learningRate</a:t>
-            </a:r>
-            <a:r>
-              <a:rPr lang="en-US" dirty="0"/>
-              <a:t>).minimize(</a:t>
-            </a:r>
+              <a:t>modelSaver.save</a:t>
+            </a:r>
+            <a:r>
+              <a:rPr lang="en-US" dirty="0"/>
+              <a:t>(session, </a:t>
+            </a:r>
+            <a:r>
+              <a:rPr lang="en-US" i="1" dirty="0"/>
+              <a:t>'</a:t>
+            </a:r>
+            <a:r>
+              <a:rPr lang="en-US" i="1" dirty="0" err="1"/>
+              <a:t>modelExport</a:t>
+            </a:r>
+            <a:r>
+              <a:rPr lang="en-US" i="1" dirty="0"/>
+              <a:t>/</a:t>
+            </a:r>
+            <a:r>
+              <a:rPr lang="en-US" i="1" dirty="0" err="1"/>
+              <a:t>MNISTmodel</a:t>
+            </a:r>
+            <a:r>
+              <a:rPr lang="en-US" i="1" dirty="0"/>
+              <a:t>')</a:t>
+            </a:r>
+          </a:p>
+          <a:p>
+            <a:endParaRPr lang="en-US" dirty="0"/>
+          </a:p>
+          <a:p>
             <a:r>
               <a:rPr lang="en-US" dirty="0" err="1"/>
-              <a:t>crossEntropy</a:t>
-            </a:r>
-            <a:r>
-              <a:rPr lang="en-US" dirty="0"/>
-              <a:t>)</a:t>
-            </a:r>
-          </a:p>
-          <a:p>
-            <a:r>
-              <a:rPr lang="en-US" dirty="0"/>
-              <a:t>    </a:t>
-            </a:r>
-            <a:r>
-              <a:rPr lang="en-US" dirty="0" err="1"/>
-              <a:t>batchTrainFeatures</a:t>
-            </a:r>
-            <a:r>
-              <a:rPr lang="en-US" dirty="0"/>
-              <a:t>, </a:t>
-            </a:r>
-            <a:r>
-              <a:rPr lang="en-US" dirty="0" err="1"/>
-              <a:t>batchTrainLabels</a:t>
-            </a:r>
-            <a:r>
-              <a:rPr lang="en-US" dirty="0"/>
-              <a:t> = </a:t>
-            </a:r>
-            <a:r>
-              <a:rPr lang="en-US" dirty="0" err="1"/>
-              <a:t>randomTrainingDataSubset</a:t>
-            </a:r>
-            <a:r>
-              <a:rPr lang="en-US" dirty="0"/>
-              <a:t>(</a:t>
-            </a:r>
-            <a:r>
-              <a:rPr lang="en-US" dirty="0" err="1"/>
-              <a:t>trainFeatures</a:t>
-            </a:r>
-            <a:r>
-              <a:rPr lang="en-US" dirty="0"/>
-              <a:t>, </a:t>
-            </a:r>
-            <a:r>
-              <a:rPr lang="en-US" dirty="0" err="1"/>
-              <a:t>trainLabels</a:t>
-            </a:r>
-            <a:r>
-              <a:rPr lang="en-US" dirty="0"/>
-              <a:t>, </a:t>
-            </a:r>
-            <a:r>
-              <a:rPr lang="en-US" dirty="0" err="1"/>
-              <a:t>numFeatureBatches</a:t>
-            </a:r>
-            <a:r>
-              <a:rPr lang="en-US" dirty="0"/>
-              <a:t>)</a:t>
-            </a:r>
-          </a:p>
-          <a:p>
-            <a:r>
-              <a:rPr lang="en-US" dirty="0"/>
-              <a:t>    </a:t>
-            </a:r>
-            <a:r>
-              <a:rPr lang="en-US" dirty="0" err="1"/>
-              <a:t>session.run</a:t>
-            </a:r>
-            <a:r>
-              <a:rPr lang="en-US" dirty="0"/>
-              <a:t>([training], </a:t>
-            </a:r>
-            <a:r>
-              <a:rPr lang="en-US" dirty="0" err="1"/>
-              <a:t>feed_dict</a:t>
-            </a:r>
-            <a:r>
-              <a:rPr lang="en-US" dirty="0"/>
-              <a:t>={features: </a:t>
-            </a:r>
-            <a:r>
-              <a:rPr lang="en-US" dirty="0" err="1"/>
-              <a:t>batchTrainFeatures</a:t>
-            </a:r>
-            <a:r>
-              <a:rPr lang="en-US" dirty="0"/>
-              <a:t>, labels: </a:t>
-            </a:r>
-            <a:r>
-              <a:rPr lang="en-US" dirty="0" err="1"/>
-              <a:t>batchTrainLabels</a:t>
-            </a:r>
-            <a:r>
-              <a:rPr lang="en-US" dirty="0"/>
-              <a:t>})</a:t>
-            </a:r>
-          </a:p>
-          <a:p>
-            <a:r>
-              <a:rPr lang="en-US" dirty="0"/>
-              <a:t>    </a:t>
-            </a:r>
-          </a:p>
-          <a:p>
-            <a:r>
-              <a:rPr lang="en-US" dirty="0"/>
-              <a:t># check the accuracy of our model (on test data) as we iterate</a:t>
-            </a:r>
-          </a:p>
-          <a:p>
-            <a:r>
-              <a:rPr lang="en-US" dirty="0"/>
-              <a:t>    if count%25 == 0:</a:t>
-            </a:r>
-          </a:p>
-          <a:p>
-            <a:r>
-              <a:rPr lang="en-US" dirty="0"/>
-              <a:t>        </a:t>
-            </a:r>
-            <a:r>
-              <a:rPr lang="en-US" dirty="0" err="1"/>
-              <a:t>correctPrediction</a:t>
-            </a:r>
-            <a:r>
-              <a:rPr lang="en-US" dirty="0"/>
-              <a:t> = </a:t>
-            </a:r>
-            <a:r>
-              <a:rPr lang="en-US" dirty="0" err="1"/>
-              <a:t>tf.equal</a:t>
-            </a:r>
-            <a:r>
-              <a:rPr lang="en-US" dirty="0"/>
-              <a:t>(</a:t>
-            </a:r>
-            <a:r>
-              <a:rPr lang="en-US" dirty="0" err="1"/>
-              <a:t>tf.argmax</a:t>
-            </a:r>
-            <a:r>
-              <a:rPr lang="en-US" dirty="0"/>
-              <a:t>(predictedLabels,1), </a:t>
-            </a:r>
-            <a:r>
-              <a:rPr lang="en-US" dirty="0" err="1"/>
-              <a:t>tf.argmax</a:t>
-            </a:r>
-            <a:r>
-              <a:rPr lang="en-US" dirty="0"/>
-              <a:t>(labels,1))</a:t>
-            </a:r>
-          </a:p>
-          <a:p>
-            <a:r>
-              <a:rPr lang="en-US" dirty="0"/>
-              <a:t>        accuracy = </a:t>
-            </a:r>
-            <a:r>
-              <a:rPr lang="en-US" dirty="0" err="1"/>
-              <a:t>tf.reduce_mean</a:t>
-            </a:r>
-            <a:r>
-              <a:rPr lang="en-US" dirty="0"/>
-              <a:t>(</a:t>
-            </a:r>
-            <a:r>
-              <a:rPr lang="en-US" dirty="0" err="1"/>
-              <a:t>tf.cast</a:t>
-            </a:r>
-            <a:r>
-              <a:rPr lang="en-US" dirty="0"/>
-              <a:t>(</a:t>
-            </a:r>
-            <a:r>
-              <a:rPr lang="en-US" dirty="0" err="1"/>
-              <a:t>correctPrediction</a:t>
-            </a:r>
-            <a:r>
-              <a:rPr lang="en-US" dirty="0"/>
-              <a:t>, tf.float32))</a:t>
-            </a:r>
-          </a:p>
-          <a:p>
-            <a:r>
-              <a:rPr lang="en-US" dirty="0"/>
-              <a:t>        accuracy = </a:t>
-            </a:r>
-            <a:r>
-              <a:rPr lang="en-US" dirty="0" err="1"/>
-              <a:t>session.run</a:t>
-            </a:r>
-            <a:r>
-              <a:rPr lang="en-US" dirty="0"/>
-              <a:t>(accuracy, </a:t>
-            </a:r>
-            <a:r>
-              <a:rPr lang="en-US" dirty="0" err="1"/>
-              <a:t>feed_dict</a:t>
-            </a:r>
-            <a:r>
-              <a:rPr lang="en-US" dirty="0"/>
-              <a:t>={features: </a:t>
-            </a:r>
-            <a:r>
-              <a:rPr lang="en-US" dirty="0" err="1"/>
-              <a:t>testFeatures</a:t>
-            </a:r>
-            <a:r>
-              <a:rPr lang="en-US" dirty="0"/>
-              <a:t>, labels: </a:t>
-            </a:r>
-            <a:r>
-              <a:rPr lang="en-US" dirty="0" err="1"/>
-              <a:t>testLabels</a:t>
-            </a:r>
-            <a:r>
-              <a:rPr lang="en-US" dirty="0"/>
-              <a:t>})</a:t>
-            </a:r>
-          </a:p>
-          <a:p>
-            <a:r>
-              <a:rPr lang="en-US" dirty="0"/>
-              <a:t>        print(</a:t>
-            </a:r>
-            <a:r>
-              <a:rPr lang="en-US" i="1" dirty="0"/>
-              <a:t>"iteration %4d: training accuracy = %5.4f" % (count, accuracy))</a:t>
-            </a:r>
-            <a:endParaRPr lang="en-US" dirty="0"/>
+              <a:t>session.close</a:t>
+            </a:r>
+            <a:r>
+              <a:rPr lang="en-US" dirty="0"/>
+              <a:t>()</a:t>
+            </a:r>
           </a:p>
         </p:txBody>
       </p:sp>
     </p:spTree>
     <p:extLst>
       <p:ext uri="{BB962C8B-B14F-4D97-AF65-F5344CB8AC3E}">
-        <p14:creationId xmlns:p14="http://schemas.microsoft.com/office/powerpoint/2010/main" val="3761487816"/>
+        <p14:creationId xmlns:p14="http://schemas.microsoft.com/office/powerpoint/2010/main" val="3548032399"/>
       </p:ext>
     </p:extLst>
   </p:cSld>
@@ -15622,11 +15360,11 @@
           <a:p>
             <a:r>
               <a:rPr lang="en-US" b="1" dirty="0"/>
-              <a:t>phase 5</a:t>
-            </a:r>
-            <a:r>
-              <a:rPr lang="en-US" dirty="0"/>
-              <a:t>: test </a:t>
+              <a:t>phase 4</a:t>
+            </a:r>
+            <a:r>
+              <a:rPr lang="en-US" dirty="0"/>
+              <a:t>: train </a:t>
             </a:r>
             <a:r>
               <a:rPr lang="en-US" dirty="0" err="1"/>
@@ -15641,7 +15379,7 @@
             </a:br>
             <a:r>
               <a:rPr lang="en-US" sz="1600" dirty="0"/>
-              <a:t>create a session and read saved model</a:t>
+              <a:t>perform model training within the session</a:t>
             </a:r>
           </a:p>
         </p:txBody>
@@ -15661,7 +15399,7 @@
         <p:spPr>
           <a:xfrm>
             <a:off x="1141412" y="1895711"/>
-            <a:ext cx="10901905" cy="3970318"/>
+            <a:ext cx="10901905" cy="4801314"/>
           </a:xfrm>
           <a:prstGeom prst="rect">
             <a:avLst/>
@@ -15676,21 +15414,25 @@
           <a:p>
             <a:r>
               <a:rPr lang="en-US" dirty="0"/>
-              <a:t># we need a session in which we can execute our model</a:t>
-            </a:r>
-          </a:p>
-          <a:p>
-            <a:r>
-              <a:rPr lang="en-US" dirty="0"/>
-              <a:t>session = </a:t>
-            </a:r>
+              <a:t># we are </a:t>
+            </a:r>
+            <a:r>
+              <a:rPr lang="en-US" u="sng" dirty="0" err="1"/>
+              <a:t>gonna</a:t>
+            </a:r>
+            <a:r>
+              <a:rPr lang="en-US" u="sng" dirty="0"/>
+              <a:t> train with random subsets of training data, to speed up gradient descent</a:t>
+            </a:r>
+          </a:p>
+          <a:p>
             <a:r>
               <a:rPr lang="en-US" dirty="0" err="1"/>
-              <a:t>tf.InteractiveSession</a:t>
-            </a:r>
-            <a:r>
-              <a:rPr lang="en-US" dirty="0"/>
-              <a:t>()</a:t>
+              <a:t>numFeatureBatches</a:t>
+            </a:r>
+            <a:r>
+              <a:rPr lang="en-US" dirty="0"/>
+              <a:t> = 20</a:t>
             </a:r>
           </a:p>
           <a:p>
@@ -15699,127 +15441,298 @@
           <a:p>
             <a:r>
               <a:rPr lang="en-US" dirty="0"/>
-              <a:t># read the model files to create the model</a:t>
-            </a:r>
-          </a:p>
-          <a:p>
-            <a:r>
-              <a:rPr lang="en-US" dirty="0"/>
-              <a:t>directory = </a:t>
+              <a:t># perform the algorithm training (need to batch for really large data sets but we aren't here)</a:t>
+            </a:r>
+          </a:p>
+          <a:p>
+            <a:r>
+              <a:rPr lang="en-US" dirty="0" err="1"/>
+              <a:t>learningRate</a:t>
+            </a:r>
+            <a:r>
+              <a:rPr lang="en-US" dirty="0"/>
+              <a:t> = 0.5</a:t>
+            </a:r>
+          </a:p>
+          <a:p>
+            <a:r>
+              <a:rPr lang="en-US" dirty="0" err="1"/>
+              <a:t>accuracyGoal</a:t>
+            </a:r>
+            <a:r>
+              <a:rPr lang="en-US" dirty="0"/>
+              <a:t> = .90</a:t>
+            </a:r>
+          </a:p>
+          <a:p>
+            <a:r>
+              <a:rPr lang="en-US" dirty="0"/>
+              <a:t>for count in range(0, 1001):</a:t>
+            </a:r>
+          </a:p>
+          <a:p>
+            <a:r>
+              <a:rPr lang="en-US" dirty="0"/>
+              <a:t>    training = </a:t>
+            </a:r>
+            <a:r>
+              <a:rPr lang="en-US" dirty="0" err="1"/>
+              <a:t>tf.train.GradientDescentOptimizer</a:t>
+            </a:r>
+            <a:r>
+              <a:rPr lang="en-US" dirty="0"/>
+              <a:t>(</a:t>
+            </a:r>
+            <a:r>
+              <a:rPr lang="en-US" dirty="0" err="1"/>
+              <a:t>learningRate</a:t>
+            </a:r>
+            <a:r>
+              <a:rPr lang="en-US" dirty="0"/>
+              <a:t>).minimize(</a:t>
+            </a:r>
+            <a:r>
+              <a:rPr lang="en-US" dirty="0" err="1"/>
+              <a:t>crossEntropy</a:t>
+            </a:r>
+            <a:r>
+              <a:rPr lang="en-US" dirty="0"/>
+              <a:t>)</a:t>
+            </a:r>
+          </a:p>
+          <a:p>
+            <a:r>
+              <a:rPr lang="en-US" dirty="0"/>
+              <a:t>    </a:t>
+            </a:r>
+            <a:r>
+              <a:rPr lang="en-US" dirty="0" err="1"/>
+              <a:t>batchTrainFeatures</a:t>
+            </a:r>
+            <a:r>
+              <a:rPr lang="en-US" dirty="0"/>
+              <a:t>, </a:t>
+            </a:r>
+            <a:r>
+              <a:rPr lang="en-US" dirty="0" err="1"/>
+              <a:t>batchTrainLabels</a:t>
+            </a:r>
+            <a:r>
+              <a:rPr lang="en-US" dirty="0"/>
+              <a:t> = </a:t>
+            </a:r>
+            <a:r>
+              <a:rPr lang="en-US" dirty="0" err="1"/>
+              <a:t>randomTrainingDataSubset</a:t>
+            </a:r>
+            <a:r>
+              <a:rPr lang="en-US" dirty="0"/>
+              <a:t>(</a:t>
+            </a:r>
+            <a:r>
+              <a:rPr lang="en-US" dirty="0" err="1"/>
+              <a:t>trainFeatures</a:t>
+            </a:r>
+            <a:r>
+              <a:rPr lang="en-US" dirty="0"/>
+              <a:t>, </a:t>
+            </a:r>
+            <a:r>
+              <a:rPr lang="en-US" dirty="0" err="1"/>
+              <a:t>trainLabels</a:t>
+            </a:r>
+            <a:r>
+              <a:rPr lang="en-US" dirty="0"/>
+              <a:t>, </a:t>
+            </a:r>
+            <a:r>
+              <a:rPr lang="en-US" dirty="0" err="1"/>
+              <a:t>numFeatureBatches</a:t>
+            </a:r>
+            <a:r>
+              <a:rPr lang="en-US" dirty="0"/>
+              <a:t>)</a:t>
+            </a:r>
+          </a:p>
+          <a:p>
+            <a:r>
+              <a:rPr lang="en-US" dirty="0"/>
+              <a:t>    </a:t>
+            </a:r>
+            <a:r>
+              <a:rPr lang="en-US" dirty="0" err="1"/>
+              <a:t>session.run</a:t>
+            </a:r>
+            <a:r>
+              <a:rPr lang="en-US" dirty="0"/>
+              <a:t>([training], </a:t>
+            </a:r>
+            <a:r>
+              <a:rPr lang="en-US" dirty="0" err="1"/>
+              <a:t>feed_dict</a:t>
+            </a:r>
+            <a:r>
+              <a:rPr lang="en-US" dirty="0"/>
+              <a:t>={features: </a:t>
+            </a:r>
+            <a:r>
+              <a:rPr lang="en-US" dirty="0" err="1"/>
+              <a:t>batchTrainFeatures</a:t>
+            </a:r>
+            <a:r>
+              <a:rPr lang="en-US" dirty="0"/>
+              <a:t>, labels: </a:t>
+            </a:r>
+            <a:r>
+              <a:rPr lang="en-US" dirty="0" err="1"/>
+              <a:t>batchTrainLabels</a:t>
+            </a:r>
+            <a:r>
+              <a:rPr lang="en-US" dirty="0"/>
+              <a:t>})</a:t>
+            </a:r>
+          </a:p>
+          <a:p>
+            <a:r>
+              <a:rPr lang="en-US" dirty="0"/>
+              <a:t>    </a:t>
+            </a:r>
+          </a:p>
+          <a:p>
+            <a:r>
+              <a:rPr lang="en-US" dirty="0"/>
+              <a:t># check the accuracy of our model (on test data) as we iterate</a:t>
+            </a:r>
+          </a:p>
+          <a:p>
+            <a:r>
+              <a:rPr lang="en-US" dirty="0"/>
+              <a:t>    if count%25 == 0:</a:t>
+            </a:r>
+          </a:p>
+          <a:p>
+            <a:r>
+              <a:rPr lang="en-US" dirty="0"/>
+              <a:t>        </a:t>
+            </a:r>
+            <a:r>
+              <a:rPr lang="en-US" dirty="0" err="1"/>
+              <a:t>correctPrediction</a:t>
+            </a:r>
+            <a:r>
+              <a:rPr lang="en-US" dirty="0"/>
+              <a:t> = </a:t>
+            </a:r>
+            <a:r>
+              <a:rPr lang="en-US" dirty="0" err="1"/>
+              <a:t>tf.equal</a:t>
+            </a:r>
+            <a:r>
+              <a:rPr lang="en-US" dirty="0"/>
+              <a:t>(</a:t>
+            </a:r>
+            <a:r>
+              <a:rPr lang="en-US" dirty="0" err="1"/>
+              <a:t>tf.argmax</a:t>
+            </a:r>
+            <a:r>
+              <a:rPr lang="en-US" dirty="0"/>
+              <a:t>(predictedLabels,1), </a:t>
+            </a:r>
+            <a:r>
+              <a:rPr lang="en-US" dirty="0" err="1"/>
+              <a:t>tf.argmax</a:t>
+            </a:r>
+            <a:r>
+              <a:rPr lang="en-US" dirty="0"/>
+              <a:t>(labels,1))</a:t>
+            </a:r>
+          </a:p>
+          <a:p>
+            <a:r>
+              <a:rPr lang="en-US" dirty="0"/>
+              <a:t>        accuracy = </a:t>
+            </a:r>
+            <a:r>
+              <a:rPr lang="en-US" dirty="0" err="1"/>
+              <a:t>tf.reduce_mean</a:t>
+            </a:r>
+            <a:r>
+              <a:rPr lang="en-US" dirty="0"/>
+              <a:t>(</a:t>
+            </a:r>
+            <a:r>
+              <a:rPr lang="en-US" dirty="0" err="1"/>
+              <a:t>tf.cast</a:t>
+            </a:r>
+            <a:r>
+              <a:rPr lang="en-US" dirty="0"/>
+              <a:t>(</a:t>
+            </a:r>
+            <a:r>
+              <a:rPr lang="en-US" dirty="0" err="1"/>
+              <a:t>correctPrediction</a:t>
+            </a:r>
+            <a:r>
+              <a:rPr lang="en-US" dirty="0"/>
+              <a:t>, tf.float32))</a:t>
+            </a:r>
+          </a:p>
+          <a:p>
+            <a:r>
+              <a:rPr lang="en-US" dirty="0"/>
+              <a:t>        accuracy = </a:t>
+            </a:r>
+            <a:r>
+              <a:rPr lang="en-US" dirty="0" err="1"/>
+              <a:t>session.run</a:t>
+            </a:r>
+            <a:r>
+              <a:rPr lang="en-US" dirty="0"/>
+              <a:t>(accuracy, </a:t>
+            </a:r>
+            <a:r>
+              <a:rPr lang="en-US" dirty="0" err="1"/>
+              <a:t>feed_dict</a:t>
+            </a:r>
+            <a:r>
+              <a:rPr lang="en-US" dirty="0"/>
+              <a:t>={features: </a:t>
+            </a:r>
+            <a:r>
+              <a:rPr lang="en-US" dirty="0" err="1"/>
+              <a:t>testFeatures</a:t>
+            </a:r>
+            <a:r>
+              <a:rPr lang="en-US" dirty="0"/>
+              <a:t>, labels: </a:t>
+            </a:r>
+            <a:r>
+              <a:rPr lang="en-US" dirty="0" err="1"/>
+              <a:t>testLabels</a:t>
+            </a:r>
+            <a:r>
+              <a:rPr lang="en-US" dirty="0"/>
+              <a:t>})</a:t>
+            </a:r>
+          </a:p>
+          <a:p>
+            <a:r>
+              <a:rPr lang="en-US" dirty="0"/>
+              <a:t>        print(</a:t>
             </a:r>
             <a:r>
               <a:rPr lang="en-US" i="1" dirty="0"/>
-              <a:t>'</a:t>
-            </a:r>
-            <a:r>
-              <a:rPr lang="en-US" i="1" dirty="0" err="1"/>
-              <a:t>modelExport</a:t>
-            </a:r>
-            <a:r>
-              <a:rPr lang="en-US" i="1" dirty="0"/>
-              <a:t>'</a:t>
-            </a:r>
-          </a:p>
-          <a:p>
-            <a:r>
-              <a:rPr lang="en-US" dirty="0" err="1"/>
-              <a:t>modelSaver</a:t>
-            </a:r>
-            <a:r>
-              <a:rPr lang="en-US" dirty="0"/>
-              <a:t> = </a:t>
-            </a:r>
-            <a:r>
-              <a:rPr lang="en-US" dirty="0" err="1"/>
-              <a:t>tf.train.import_meta_graph</a:t>
-            </a:r>
-            <a:r>
-              <a:rPr lang="en-US" dirty="0"/>
-              <a:t>(directory + </a:t>
-            </a:r>
-            <a:r>
-              <a:rPr lang="en-US" i="1" dirty="0"/>
-              <a:t>'/</a:t>
-            </a:r>
-            <a:r>
-              <a:rPr lang="en-US" i="1" dirty="0" err="1"/>
-              <a:t>MNISTmodel.meta</a:t>
-            </a:r>
-            <a:r>
-              <a:rPr lang="en-US" i="1" dirty="0"/>
-              <a:t>')</a:t>
-            </a:r>
-          </a:p>
-          <a:p>
-            <a:r>
-              <a:rPr lang="en-US" dirty="0" err="1"/>
-              <a:t>modelSaver.restore</a:t>
-            </a:r>
-            <a:r>
-              <a:rPr lang="en-US" dirty="0"/>
-              <a:t>(session, </a:t>
-            </a:r>
-            <a:r>
-              <a:rPr lang="en-US" dirty="0" err="1"/>
-              <a:t>tf.train.latest_checkpoint</a:t>
-            </a:r>
-            <a:r>
-              <a:rPr lang="en-US" dirty="0"/>
-              <a:t>(directory + </a:t>
-            </a:r>
-            <a:r>
-              <a:rPr lang="en-US" i="1" dirty="0"/>
-              <a:t>'/'))</a:t>
-            </a:r>
-          </a:p>
-          <a:p>
+              <a:t>"iteration %4d: training accuracy = %5.4f" % (count, accuracy))</a:t>
+            </a:r>
             <a:endParaRPr lang="en-US" dirty="0"/>
-          </a:p>
-          <a:p>
-            <a:r>
-              <a:rPr lang="en-US" dirty="0"/>
-              <a:t># get the model graph object</a:t>
-            </a:r>
-          </a:p>
-          <a:p>
-            <a:r>
-              <a:rPr lang="de-DE" dirty="0"/>
-              <a:t>graph = tf.get_default_graph()</a:t>
-            </a:r>
-          </a:p>
-          <a:p>
-            <a:endParaRPr lang="de-DE" dirty="0"/>
-          </a:p>
-          <a:p>
-            <a:r>
-              <a:rPr lang="en-US" i="1" dirty="0">
-                <a:solidFill>
-                  <a:srgbClr val="FFFF00"/>
-                </a:solidFill>
-              </a:rPr>
-              <a:t>&lt; USE TRAINED MODEL HERE&gt;</a:t>
-            </a:r>
-            <a:endParaRPr lang="de-DE" dirty="0"/>
-          </a:p>
-          <a:p>
-            <a:endParaRPr lang="de-DE" dirty="0"/>
-          </a:p>
-          <a:p>
-            <a:r>
-              <a:rPr lang="en-US" dirty="0" err="1"/>
-              <a:t>session.close</a:t>
-            </a:r>
-            <a:r>
-              <a:rPr lang="en-US" dirty="0"/>
-              <a:t>()</a:t>
-            </a:r>
           </a:p>
         </p:txBody>
       </p:sp>
     </p:spTree>
     <p:extLst>
       <p:ext uri="{BB962C8B-B14F-4D97-AF65-F5344CB8AC3E}">
-        <p14:creationId xmlns:p14="http://schemas.microsoft.com/office/powerpoint/2010/main" val="4008254515"/>
+        <p14:creationId xmlns:p14="http://schemas.microsoft.com/office/powerpoint/2010/main" val="3761487816"/>
       </p:ext>
     </p:extLst>
   </p:cSld>
@@ -15874,11 +15787,11 @@
           <a:p>
             <a:r>
               <a:rPr lang="en-US" b="1" dirty="0"/>
-              <a:t>phase 5</a:t>
-            </a:r>
-            <a:r>
-              <a:rPr lang="en-US" dirty="0"/>
-              <a:t>: test </a:t>
+              <a:t>phase 3/4</a:t>
+            </a:r>
+            <a:r>
+              <a:rPr lang="en-US" dirty="0"/>
+              <a:t>: create/train </a:t>
             </a:r>
             <a:r>
               <a:rPr lang="en-US" dirty="0" err="1"/>
@@ -15892,8 +15805,168 @@
               <a:rPr lang="en-US" dirty="0"/>
             </a:br>
             <a:r>
+              <a:rPr lang="en-US" sz="2000" cap="none" dirty="0"/>
+              <a:t>executing</a:t>
+            </a:r>
+            <a:r>
+              <a:rPr lang="en-US" dirty="0"/>
+              <a:t> </a:t>
+            </a:r>
+            <a:r>
+              <a:rPr lang="en-US" sz="2000" cap="none" dirty="0"/>
+              <a:t>trainModel.py</a:t>
+            </a:r>
+          </a:p>
+        </p:txBody>
+      </p:sp>
+      <p:sp>
+        <p:nvSpPr>
+          <p:cNvPr id="4" name="Content Placeholder 2">
+            <a:extLst>
+              <a:ext uri="{FF2B5EF4-FFF2-40B4-BE49-F238E27FC236}">
+                <a16:creationId xmlns:a16="http://schemas.microsoft.com/office/drawing/2014/main" id="{B835F9F3-D3A4-41BE-A2FF-FDB080BBB1C3}"/>
+              </a:ext>
+            </a:extLst>
+          </p:cNvPr>
+          <p:cNvSpPr>
+            <a:spLocks noGrp="1"/>
+          </p:cNvSpPr>
+          <p:nvPr>
+            <p:ph idx="1"/>
+          </p:nvPr>
+        </p:nvSpPr>
+        <p:spPr>
+          <a:xfrm>
+            <a:off x="1141412" y="2249487"/>
+            <a:ext cx="9905999" cy="3541714"/>
+          </a:xfrm>
+        </p:spPr>
+        <p:txBody>
+          <a:bodyPr vert="horz" lIns="91440" tIns="45720" rIns="91440" bIns="45720" rtlCol="0" anchor="t">
+            <a:normAutofit/>
+          </a:bodyPr>
+          <a:lstStyle/>
+          <a:p>
+            <a:r>
+              <a:rPr lang="en-US" dirty="0"/>
+              <a:t>Fetch processed dataset (training &amp; testing) from disk file</a:t>
+            </a:r>
+          </a:p>
+          <a:p>
+            <a:r>
+              <a:rPr lang="en-US" dirty="0"/>
+              <a:t>Print processed dataset statistics</a:t>
+            </a:r>
+          </a:p>
+          <a:p>
+            <a:r>
+              <a:rPr lang="en-US" dirty="0"/>
+              <a:t>Create </a:t>
+            </a:r>
+            <a:r>
+              <a:rPr lang="en-US" dirty="0" err="1"/>
+              <a:t>TensorFlow</a:t>
+            </a:r>
+            <a:r>
+              <a:rPr lang="en-US" dirty="0"/>
+              <a:t> model</a:t>
+            </a:r>
+          </a:p>
+          <a:p>
+            <a:r>
+              <a:rPr lang="en-US" dirty="0"/>
+              <a:t>Train the model until 90% accuracy achieved</a:t>
+            </a:r>
+          </a:p>
+          <a:p>
+            <a:r>
+              <a:rPr lang="en-US" dirty="0"/>
+              <a:t>Save the trained model to disk file</a:t>
+            </a:r>
+          </a:p>
+          <a:p>
+            <a:endParaRPr lang="en-US" dirty="0"/>
+          </a:p>
+        </p:txBody>
+      </p:sp>
+    </p:spTree>
+    <p:extLst>
+      <p:ext uri="{BB962C8B-B14F-4D97-AF65-F5344CB8AC3E}">
+        <p14:creationId xmlns:p14="http://schemas.microsoft.com/office/powerpoint/2010/main" val="1090502382"/>
+      </p:ext>
+    </p:extLst>
+  </p:cSld>
+  <p:clrMapOvr>
+    <a:masterClrMapping/>
+  </p:clrMapOvr>
+</p:sld>
+</file>
+
+<file path=ppt/slides/slide19.xml><?xml version="1.0" encoding="utf-8"?>
+<p:sld xmlns:a="http://schemas.openxmlformats.org/drawingml/2006/main" xmlns:r="http://schemas.openxmlformats.org/officeDocument/2006/relationships" xmlns:p="http://schemas.openxmlformats.org/presentationml/2006/main">
+  <p:cSld>
+    <p:spTree>
+      <p:nvGrpSpPr>
+        <p:cNvPr id="1" name=""/>
+        <p:cNvGrpSpPr/>
+        <p:nvPr/>
+      </p:nvGrpSpPr>
+      <p:grpSpPr>
+        <a:xfrm>
+          <a:off x="0" y="0"/>
+          <a:ext cx="0" cy="0"/>
+          <a:chOff x="0" y="0"/>
+          <a:chExt cx="0" cy="0"/>
+        </a:xfrm>
+      </p:grpSpPr>
+      <p:sp>
+        <p:nvSpPr>
+          <p:cNvPr id="2" name="Title 1">
+            <a:extLst>
+              <a:ext uri="{FF2B5EF4-FFF2-40B4-BE49-F238E27FC236}">
+                <a16:creationId xmlns:a16="http://schemas.microsoft.com/office/drawing/2014/main" id="{AA243B50-4CCD-456E-8D60-A64C77C89BAC}"/>
+              </a:ext>
+            </a:extLst>
+          </p:cNvPr>
+          <p:cNvSpPr>
+            <a:spLocks noGrp="1"/>
+          </p:cNvSpPr>
+          <p:nvPr>
+            <p:ph type="title"/>
+          </p:nvPr>
+        </p:nvSpPr>
+        <p:spPr>
+          <a:xfrm>
+            <a:off x="1141413" y="618518"/>
+            <a:ext cx="9905998" cy="1478570"/>
+          </a:xfrm>
+        </p:spPr>
+        <p:txBody>
+          <a:bodyPr/>
+          <a:lstStyle/>
+          <a:p>
+            <a:r>
+              <a:rPr lang="en-US" b="1" dirty="0"/>
+              <a:t>phase 5</a:t>
+            </a:r>
+            <a:r>
+              <a:rPr lang="en-US" dirty="0"/>
+              <a:t>: test </a:t>
+            </a:r>
+            <a:r>
+              <a:rPr lang="en-US" dirty="0" err="1"/>
+              <a:t>tensorflow</a:t>
+            </a:r>
+            <a:r>
+              <a:rPr lang="en-US" dirty="0"/>
+              <a:t> model</a:t>
+            </a:r>
+            <a:br>
+              <a:rPr lang="en-US" dirty="0"/>
+            </a:br>
+            <a:r>
               <a:rPr lang="en-US" sz="1600" dirty="0"/>
-              <a:t>use the model</a:t>
+              <a:t>create a session and read saved model</a:t>
             </a:r>
           </a:p>
         </p:txBody>
@@ -15913,7 +15986,7 @@
         <p:spPr>
           <a:xfrm>
             <a:off x="1141412" y="1895711"/>
-            <a:ext cx="10901905" cy="3139321"/>
+            <a:ext cx="10901905" cy="3970318"/>
           </a:xfrm>
           <a:prstGeom prst="rect">
             <a:avLst/>
@@ -15928,6 +16001,108 @@
           <a:p>
             <a:r>
               <a:rPr lang="en-US" dirty="0"/>
+              <a:t># we need a session in which we can execute our model</a:t>
+            </a:r>
+          </a:p>
+          <a:p>
+            <a:r>
+              <a:rPr lang="en-US" dirty="0"/>
+              <a:t>session = </a:t>
+            </a:r>
+            <a:r>
+              <a:rPr lang="en-US" dirty="0" err="1"/>
+              <a:t>tf.InteractiveSession</a:t>
+            </a:r>
+            <a:r>
+              <a:rPr lang="en-US" dirty="0"/>
+              <a:t>()</a:t>
+            </a:r>
+          </a:p>
+          <a:p>
+            <a:endParaRPr lang="en-US" dirty="0"/>
+          </a:p>
+          <a:p>
+            <a:r>
+              <a:rPr lang="en-US" dirty="0"/>
+              <a:t># read the model files to create the model</a:t>
+            </a:r>
+          </a:p>
+          <a:p>
+            <a:r>
+              <a:rPr lang="en-US" dirty="0"/>
+              <a:t>directory = </a:t>
+            </a:r>
+            <a:r>
+              <a:rPr lang="en-US" i="1" dirty="0"/>
+              <a:t>'</a:t>
+            </a:r>
+            <a:r>
+              <a:rPr lang="en-US" i="1" dirty="0" err="1"/>
+              <a:t>modelExport</a:t>
+            </a:r>
+            <a:r>
+              <a:rPr lang="en-US" i="1" dirty="0"/>
+              <a:t>'</a:t>
+            </a:r>
+          </a:p>
+          <a:p>
+            <a:r>
+              <a:rPr lang="en-US" dirty="0" err="1"/>
+              <a:t>modelSaver</a:t>
+            </a:r>
+            <a:r>
+              <a:rPr lang="en-US" dirty="0"/>
+              <a:t> = </a:t>
+            </a:r>
+            <a:r>
+              <a:rPr lang="en-US" dirty="0" err="1"/>
+              <a:t>tf.train.import_meta_graph</a:t>
+            </a:r>
+            <a:r>
+              <a:rPr lang="en-US" dirty="0"/>
+              <a:t>(directory + </a:t>
+            </a:r>
+            <a:r>
+              <a:rPr lang="en-US" i="1" dirty="0"/>
+              <a:t>'/</a:t>
+            </a:r>
+            <a:r>
+              <a:rPr lang="en-US" i="1" dirty="0" err="1"/>
+              <a:t>MNISTmodel.meta</a:t>
+            </a:r>
+            <a:r>
+              <a:rPr lang="en-US" i="1" dirty="0"/>
+              <a:t>')</a:t>
+            </a:r>
+          </a:p>
+          <a:p>
+            <a:r>
+              <a:rPr lang="en-US" dirty="0" err="1"/>
+              <a:t>modelSaver.restore</a:t>
+            </a:r>
+            <a:r>
+              <a:rPr lang="en-US" dirty="0"/>
+              <a:t>(session, </a:t>
+            </a:r>
+            <a:r>
+              <a:rPr lang="en-US" dirty="0" err="1"/>
+              <a:t>tf.train.latest_checkpoint</a:t>
+            </a:r>
+            <a:r>
+              <a:rPr lang="en-US" dirty="0"/>
+              <a:t>(directory + </a:t>
+            </a:r>
+            <a:r>
+              <a:rPr lang="en-US" i="1" dirty="0"/>
+              <a:t>'/'))</a:t>
+            </a:r>
+          </a:p>
+          <a:p>
+            <a:endParaRPr lang="en-US" dirty="0"/>
+          </a:p>
+          <a:p>
+            <a:r>
+              <a:rPr lang="en-US" dirty="0"/>
               <a:t># get the model graph object</a:t>
             </a:r>
           </a:p>
@@ -15938,132 +16113,26 @@
             </a:r>
           </a:p>
           <a:p>
-            <a:endParaRPr lang="en-US" dirty="0"/>
-          </a:p>
-          <a:p>
-            <a:r>
-              <a:rPr lang="en-US" dirty="0"/>
-              <a:t># get some tensor handles</a:t>
-            </a:r>
-          </a:p>
-          <a:p>
-            <a:r>
-              <a:rPr lang="en-US" dirty="0"/>
-              <a:t>features = </a:t>
-            </a:r>
+            <a:endParaRPr lang="de-DE" dirty="0"/>
+          </a:p>
+          <a:p>
+            <a:r>
+              <a:rPr lang="en-US" i="1" dirty="0">
+                <a:solidFill>
+                  <a:srgbClr val="FFFF00"/>
+                </a:solidFill>
+              </a:rPr>
+              <a:t>&lt; USE TRAINED MODEL HERE&gt;</a:t>
+            </a:r>
+            <a:endParaRPr lang="de-DE" dirty="0"/>
+          </a:p>
+          <a:p>
+            <a:endParaRPr lang="de-DE" dirty="0"/>
+          </a:p>
+          <a:p>
             <a:r>
               <a:rPr lang="en-US" dirty="0" err="1"/>
-              <a:t>graph.get_tensor_by_name</a:t>
-            </a:r>
-            <a:r>
-              <a:rPr lang="en-US" dirty="0"/>
-              <a:t>(</a:t>
-            </a:r>
-            <a:r>
-              <a:rPr lang="en-US" i="1" dirty="0"/>
-              <a:t>"features:0")</a:t>
-            </a:r>
-          </a:p>
-          <a:p>
-            <a:r>
-              <a:rPr lang="en-US" dirty="0" err="1"/>
-              <a:t>predictedLabels</a:t>
-            </a:r>
-            <a:r>
-              <a:rPr lang="en-US" dirty="0"/>
-              <a:t> = </a:t>
-            </a:r>
-            <a:r>
-              <a:rPr lang="en-US" dirty="0" err="1"/>
-              <a:t>graph.get_tensor_by_name</a:t>
-            </a:r>
-            <a:r>
-              <a:rPr lang="en-US" dirty="0"/>
-              <a:t>(</a:t>
-            </a:r>
-            <a:r>
-              <a:rPr lang="en-US" i="1" dirty="0"/>
-              <a:t>"</a:t>
-            </a:r>
-            <a:r>
-              <a:rPr lang="en-US" i="1" u="sng" dirty="0"/>
-              <a:t>Softmax:0")</a:t>
-            </a:r>
-          </a:p>
-          <a:p>
-            <a:endParaRPr lang="en-US" dirty="0"/>
-          </a:p>
-          <a:p>
-            <a:r>
-              <a:rPr lang="en-US" dirty="0"/>
-              <a:t># give test data to model</a:t>
-            </a:r>
-          </a:p>
-          <a:p>
-            <a:r>
-              <a:rPr lang="en-US" dirty="0" err="1"/>
-              <a:t>feed_dictionary</a:t>
-            </a:r>
-            <a:r>
-              <a:rPr lang="en-US" dirty="0"/>
-              <a:t> = {features: </a:t>
-            </a:r>
-            <a:r>
-              <a:rPr lang="en-US" dirty="0" err="1"/>
-              <a:t>testFeatures</a:t>
-            </a:r>
-            <a:r>
-              <a:rPr lang="en-US" dirty="0"/>
-              <a:t>}</a:t>
-            </a:r>
-          </a:p>
-          <a:p>
-            <a:endParaRPr lang="en-US" dirty="0"/>
-          </a:p>
-          <a:p>
-            <a:r>
-              <a:rPr lang="en-US" dirty="0" err="1"/>
-              <a:t>modelOutput</a:t>
-            </a:r>
-            <a:r>
-              <a:rPr lang="en-US" dirty="0"/>
-              <a:t> = </a:t>
-            </a:r>
-            <a:r>
-              <a:rPr lang="en-US" dirty="0" err="1"/>
-              <a:t>tf.argmax</a:t>
-            </a:r>
-            <a:r>
-              <a:rPr lang="en-US" dirty="0"/>
-              <a:t>(</a:t>
-            </a:r>
-            <a:r>
-              <a:rPr lang="en-US" dirty="0" err="1"/>
-              <a:t>session.run</a:t>
-            </a:r>
-            <a:r>
-              <a:rPr lang="en-US" dirty="0"/>
-              <a:t>(</a:t>
-            </a:r>
-            <a:r>
-              <a:rPr lang="en-US" dirty="0" err="1"/>
-              <a:t>predictedLabels</a:t>
-            </a:r>
-            <a:r>
-              <a:rPr lang="en-US" dirty="0"/>
-              <a:t>, </a:t>
-            </a:r>
-            <a:r>
-              <a:rPr lang="en-US" dirty="0" err="1"/>
-              <a:t>feed_dictionary</a:t>
-            </a:r>
-            <a:r>
-              <a:rPr lang="en-US" dirty="0"/>
-              <a:t>), 1).</a:t>
-            </a:r>
-            <a:r>
-              <a:rPr lang="en-US" dirty="0" err="1"/>
-              <a:t>eval</a:t>
+              <a:t>session.close</a:t>
             </a:r>
             <a:r>
               <a:rPr lang="en-US" dirty="0"/>
@@ -16075,7 +16144,7 @@
     </p:spTree>
     <p:extLst>
       <p:ext uri="{BB962C8B-B14F-4D97-AF65-F5344CB8AC3E}">
-        <p14:creationId xmlns:p14="http://schemas.microsoft.com/office/powerpoint/2010/main" val="988246771"/>
+        <p14:creationId xmlns:p14="http://schemas.microsoft.com/office/powerpoint/2010/main" val="4008254515"/>
       </p:ext>
     </p:extLst>
   </p:cSld>
@@ -16211,6 +16280,415 @@
     <p:extLst>
       <p:ext uri="{BB962C8B-B14F-4D97-AF65-F5344CB8AC3E}">
         <p14:creationId xmlns:p14="http://schemas.microsoft.com/office/powerpoint/2010/main" val="1157315689"/>
+      </p:ext>
+    </p:extLst>
+  </p:cSld>
+  <p:clrMapOvr>
+    <a:masterClrMapping/>
+  </p:clrMapOvr>
+</p:sld>
+</file>
+
+<file path=ppt/slides/slide20.xml><?xml version="1.0" encoding="utf-8"?>
+<p:sld xmlns:a="http://schemas.openxmlformats.org/drawingml/2006/main" xmlns:r="http://schemas.openxmlformats.org/officeDocument/2006/relationships" xmlns:p="http://schemas.openxmlformats.org/presentationml/2006/main">
+  <p:cSld>
+    <p:spTree>
+      <p:nvGrpSpPr>
+        <p:cNvPr id="1" name=""/>
+        <p:cNvGrpSpPr/>
+        <p:nvPr/>
+      </p:nvGrpSpPr>
+      <p:grpSpPr>
+        <a:xfrm>
+          <a:off x="0" y="0"/>
+          <a:ext cx="0" cy="0"/>
+          <a:chOff x="0" y="0"/>
+          <a:chExt cx="0" cy="0"/>
+        </a:xfrm>
+      </p:grpSpPr>
+      <p:sp>
+        <p:nvSpPr>
+          <p:cNvPr id="2" name="Title 1">
+            <a:extLst>
+              <a:ext uri="{FF2B5EF4-FFF2-40B4-BE49-F238E27FC236}">
+                <a16:creationId xmlns:a16="http://schemas.microsoft.com/office/drawing/2014/main" id="{AA243B50-4CCD-456E-8D60-A64C77C89BAC}"/>
+              </a:ext>
+            </a:extLst>
+          </p:cNvPr>
+          <p:cNvSpPr>
+            <a:spLocks noGrp="1"/>
+          </p:cNvSpPr>
+          <p:nvPr>
+            <p:ph type="title"/>
+          </p:nvPr>
+        </p:nvSpPr>
+        <p:spPr>
+          <a:xfrm>
+            <a:off x="1141413" y="618518"/>
+            <a:ext cx="9905998" cy="1478570"/>
+          </a:xfrm>
+        </p:spPr>
+        <p:txBody>
+          <a:bodyPr/>
+          <a:lstStyle/>
+          <a:p>
+            <a:r>
+              <a:rPr lang="en-US" b="1" dirty="0"/>
+              <a:t>phase 5</a:t>
+            </a:r>
+            <a:r>
+              <a:rPr lang="en-US" dirty="0"/>
+              <a:t>: test </a:t>
+            </a:r>
+            <a:r>
+              <a:rPr lang="en-US" dirty="0" err="1"/>
+              <a:t>tensorflow</a:t>
+            </a:r>
+            <a:r>
+              <a:rPr lang="en-US" dirty="0"/>
+              <a:t> model</a:t>
+            </a:r>
+            <a:br>
+              <a:rPr lang="en-US" dirty="0"/>
+            </a:br>
+            <a:r>
+              <a:rPr lang="en-US" sz="1600" dirty="0"/>
+              <a:t>use the model</a:t>
+            </a:r>
+          </a:p>
+        </p:txBody>
+      </p:sp>
+      <p:sp>
+        <p:nvSpPr>
+          <p:cNvPr id="101" name="TextBox 100">
+            <a:extLst>
+              <a:ext uri="{FF2B5EF4-FFF2-40B4-BE49-F238E27FC236}">
+                <a16:creationId xmlns:a16="http://schemas.microsoft.com/office/drawing/2014/main" id="{7E5FA93A-E4F5-4DBF-90F7-C99F40568C42}"/>
+              </a:ext>
+            </a:extLst>
+          </p:cNvPr>
+          <p:cNvSpPr txBox="1"/>
+          <p:nvPr/>
+        </p:nvSpPr>
+        <p:spPr>
+          <a:xfrm>
+            <a:off x="1141412" y="1895711"/>
+            <a:ext cx="10901905" cy="3139321"/>
+          </a:xfrm>
+          <a:prstGeom prst="rect">
+            <a:avLst/>
+          </a:prstGeom>
+          <a:noFill/>
+        </p:spPr>
+        <p:txBody>
+          <a:bodyPr wrap="square" rtlCol="0">
+            <a:spAutoFit/>
+          </a:bodyPr>
+          <a:lstStyle/>
+          <a:p>
+            <a:r>
+              <a:rPr lang="en-US" dirty="0"/>
+              <a:t># get the model graph object</a:t>
+            </a:r>
+          </a:p>
+          <a:p>
+            <a:r>
+              <a:rPr lang="de-DE" dirty="0"/>
+              <a:t>graph = tf.get_default_graph()</a:t>
+            </a:r>
+          </a:p>
+          <a:p>
+            <a:endParaRPr lang="en-US" dirty="0"/>
+          </a:p>
+          <a:p>
+            <a:r>
+              <a:rPr lang="en-US" dirty="0"/>
+              <a:t># get some tensor handles</a:t>
+            </a:r>
+          </a:p>
+          <a:p>
+            <a:r>
+              <a:rPr lang="en-US" dirty="0"/>
+              <a:t>features = </a:t>
+            </a:r>
+            <a:r>
+              <a:rPr lang="en-US" dirty="0" err="1"/>
+              <a:t>graph.get_tensor_by_name</a:t>
+            </a:r>
+            <a:r>
+              <a:rPr lang="en-US" dirty="0"/>
+              <a:t>(</a:t>
+            </a:r>
+            <a:r>
+              <a:rPr lang="en-US" i="1" dirty="0"/>
+              <a:t>"features:0")</a:t>
+            </a:r>
+          </a:p>
+          <a:p>
+            <a:r>
+              <a:rPr lang="en-US" dirty="0" err="1"/>
+              <a:t>predictedLabels</a:t>
+            </a:r>
+            <a:r>
+              <a:rPr lang="en-US" dirty="0"/>
+              <a:t> = </a:t>
+            </a:r>
+            <a:r>
+              <a:rPr lang="en-US" dirty="0" err="1"/>
+              <a:t>graph.get_tensor_by_name</a:t>
+            </a:r>
+            <a:r>
+              <a:rPr lang="en-US" dirty="0"/>
+              <a:t>(</a:t>
+            </a:r>
+            <a:r>
+              <a:rPr lang="en-US" i="1" dirty="0"/>
+              <a:t>"</a:t>
+            </a:r>
+            <a:r>
+              <a:rPr lang="en-US" i="1" u="sng" dirty="0"/>
+              <a:t>Softmax:0")</a:t>
+            </a:r>
+          </a:p>
+          <a:p>
+            <a:endParaRPr lang="en-US" dirty="0"/>
+          </a:p>
+          <a:p>
+            <a:r>
+              <a:rPr lang="en-US" dirty="0"/>
+              <a:t># give test data to model</a:t>
+            </a:r>
+          </a:p>
+          <a:p>
+            <a:r>
+              <a:rPr lang="en-US" dirty="0" err="1"/>
+              <a:t>feed_dictionary</a:t>
+            </a:r>
+            <a:r>
+              <a:rPr lang="en-US" dirty="0"/>
+              <a:t> = {features: </a:t>
+            </a:r>
+            <a:r>
+              <a:rPr lang="en-US" dirty="0" err="1"/>
+              <a:t>testFeatures</a:t>
+            </a:r>
+            <a:r>
+              <a:rPr lang="en-US" dirty="0"/>
+              <a:t>}</a:t>
+            </a:r>
+          </a:p>
+          <a:p>
+            <a:endParaRPr lang="en-US" dirty="0"/>
+          </a:p>
+          <a:p>
+            <a:r>
+              <a:rPr lang="en-US" dirty="0" err="1"/>
+              <a:t>modelOutput</a:t>
+            </a:r>
+            <a:r>
+              <a:rPr lang="en-US" dirty="0"/>
+              <a:t> = </a:t>
+            </a:r>
+            <a:r>
+              <a:rPr lang="en-US" dirty="0" err="1"/>
+              <a:t>tf.argmax</a:t>
+            </a:r>
+            <a:r>
+              <a:rPr lang="en-US" dirty="0"/>
+              <a:t>(</a:t>
+            </a:r>
+            <a:r>
+              <a:rPr lang="en-US" dirty="0" err="1"/>
+              <a:t>session.run</a:t>
+            </a:r>
+            <a:r>
+              <a:rPr lang="en-US" dirty="0"/>
+              <a:t>(</a:t>
+            </a:r>
+            <a:r>
+              <a:rPr lang="en-US" dirty="0" err="1"/>
+              <a:t>predictedLabels</a:t>
+            </a:r>
+            <a:r>
+              <a:rPr lang="en-US" dirty="0"/>
+              <a:t>, </a:t>
+            </a:r>
+            <a:r>
+              <a:rPr lang="en-US" dirty="0" err="1"/>
+              <a:t>feed_dictionary</a:t>
+            </a:r>
+            <a:r>
+              <a:rPr lang="en-US" dirty="0"/>
+              <a:t>), 1).</a:t>
+            </a:r>
+            <a:r>
+              <a:rPr lang="en-US" dirty="0" err="1"/>
+              <a:t>eval</a:t>
+            </a:r>
+            <a:r>
+              <a:rPr lang="en-US" dirty="0"/>
+              <a:t>()</a:t>
+            </a:r>
+          </a:p>
+        </p:txBody>
+      </p:sp>
+    </p:spTree>
+    <p:extLst>
+      <p:ext uri="{BB962C8B-B14F-4D97-AF65-F5344CB8AC3E}">
+        <p14:creationId xmlns:p14="http://schemas.microsoft.com/office/powerpoint/2010/main" val="988246771"/>
+      </p:ext>
+    </p:extLst>
+  </p:cSld>
+  <p:clrMapOvr>
+    <a:masterClrMapping/>
+  </p:clrMapOvr>
+</p:sld>
+</file>
+
+<file path=ppt/slides/slide21.xml><?xml version="1.0" encoding="utf-8"?>
+<p:sld xmlns:a="http://schemas.openxmlformats.org/drawingml/2006/main" xmlns:r="http://schemas.openxmlformats.org/officeDocument/2006/relationships" xmlns:p="http://schemas.openxmlformats.org/presentationml/2006/main">
+  <p:cSld>
+    <p:spTree>
+      <p:nvGrpSpPr>
+        <p:cNvPr id="1" name=""/>
+        <p:cNvGrpSpPr/>
+        <p:nvPr/>
+      </p:nvGrpSpPr>
+      <p:grpSpPr>
+        <a:xfrm>
+          <a:off x="0" y="0"/>
+          <a:ext cx="0" cy="0"/>
+          <a:chOff x="0" y="0"/>
+          <a:chExt cx="0" cy="0"/>
+        </a:xfrm>
+      </p:grpSpPr>
+      <p:sp>
+        <p:nvSpPr>
+          <p:cNvPr id="2" name="Title 1">
+            <a:extLst>
+              <a:ext uri="{FF2B5EF4-FFF2-40B4-BE49-F238E27FC236}">
+                <a16:creationId xmlns:a16="http://schemas.microsoft.com/office/drawing/2014/main" id="{AA243B50-4CCD-456E-8D60-A64C77C89BAC}"/>
+              </a:ext>
+            </a:extLst>
+          </p:cNvPr>
+          <p:cNvSpPr>
+            <a:spLocks noGrp="1"/>
+          </p:cNvSpPr>
+          <p:nvPr>
+            <p:ph type="title"/>
+          </p:nvPr>
+        </p:nvSpPr>
+        <p:spPr>
+          <a:xfrm>
+            <a:off x="1141413" y="618518"/>
+            <a:ext cx="9905998" cy="1478570"/>
+          </a:xfrm>
+        </p:spPr>
+        <p:txBody>
+          <a:bodyPr/>
+          <a:lstStyle/>
+          <a:p>
+            <a:r>
+              <a:rPr lang="en-US" b="1" dirty="0"/>
+              <a:t>phase 5</a:t>
+            </a:r>
+            <a:r>
+              <a:rPr lang="en-US" dirty="0"/>
+              <a:t>: test </a:t>
+            </a:r>
+            <a:r>
+              <a:rPr lang="en-US" dirty="0" err="1"/>
+              <a:t>tensorflow</a:t>
+            </a:r>
+            <a:r>
+              <a:rPr lang="en-US" dirty="0"/>
+              <a:t> model</a:t>
+            </a:r>
+            <a:br>
+              <a:rPr lang="en-US" dirty="0"/>
+            </a:br>
+            <a:r>
+              <a:rPr lang="en-US" sz="2000" cap="none" dirty="0"/>
+              <a:t>executing useModel.py</a:t>
+            </a:r>
+          </a:p>
+        </p:txBody>
+      </p:sp>
+      <p:sp>
+        <p:nvSpPr>
+          <p:cNvPr id="4" name="Content Placeholder 2">
+            <a:extLst>
+              <a:ext uri="{FF2B5EF4-FFF2-40B4-BE49-F238E27FC236}">
+                <a16:creationId xmlns:a16="http://schemas.microsoft.com/office/drawing/2014/main" id="{422D7E85-A6D0-4E2A-AA71-5C0C2683CFBF}"/>
+              </a:ext>
+            </a:extLst>
+          </p:cNvPr>
+          <p:cNvSpPr>
+            <a:spLocks noGrp="1"/>
+          </p:cNvSpPr>
+          <p:nvPr>
+            <p:ph idx="1"/>
+          </p:nvPr>
+        </p:nvSpPr>
+        <p:spPr>
+          <a:xfrm>
+            <a:off x="1141412" y="2249487"/>
+            <a:ext cx="9905999" cy="3541714"/>
+          </a:xfrm>
+        </p:spPr>
+        <p:txBody>
+          <a:bodyPr vert="horz" lIns="91440" tIns="45720" rIns="91440" bIns="45720" rtlCol="0" anchor="t">
+            <a:normAutofit/>
+          </a:bodyPr>
+          <a:lstStyle/>
+          <a:p>
+            <a:r>
+              <a:rPr lang="en-US" dirty="0"/>
+              <a:t>Fetch processed dataset (training only) from disk file</a:t>
+            </a:r>
+          </a:p>
+          <a:p>
+            <a:r>
+              <a:rPr lang="en-US" dirty="0"/>
+              <a:t>Randomize testing dataset order</a:t>
+            </a:r>
+          </a:p>
+          <a:p>
+            <a:r>
+              <a:rPr lang="en-US" dirty="0"/>
+              <a:t>Fetch trained model from disk files(s)</a:t>
+            </a:r>
+          </a:p>
+          <a:p>
+            <a:r>
+              <a:rPr lang="en-US" dirty="0"/>
+              <a:t>Perform predictions on test dataset</a:t>
+            </a:r>
+          </a:p>
+          <a:p>
+            <a:r>
+              <a:rPr lang="en-US" dirty="0"/>
+              <a:t>Render test dataset images and corresponding predictions</a:t>
+            </a:r>
+          </a:p>
+          <a:p>
+            <a:endParaRPr lang="en-US" dirty="0"/>
+          </a:p>
+          <a:p>
+            <a:endParaRPr lang="en-US" dirty="0"/>
+          </a:p>
+          <a:p>
+            <a:endParaRPr lang="en-US" dirty="0"/>
+          </a:p>
+          <a:p>
+            <a:endParaRPr lang="en-US" dirty="0"/>
+          </a:p>
+        </p:txBody>
+      </p:sp>
+    </p:spTree>
+    <p:extLst>
+      <p:ext uri="{BB962C8B-B14F-4D97-AF65-F5344CB8AC3E}">
+        <p14:creationId xmlns:p14="http://schemas.microsoft.com/office/powerpoint/2010/main" val="1549592023"/>
       </p:ext>
     </p:extLst>
   </p:cSld>

</xml_diff>

<commit_message>
enable Internet dataset download, Powerpoint changes
</commit_message>
<xml_diff>
--- a/MNIST with Tensorflow.pptx
+++ b/MNIST with Tensorflow.pptx
@@ -1353,30 +1353,6 @@
     </pc:docChg>
   </pc:docChgLst>
   <pc:docChgLst>
-    <pc:chgData name="gene olafsen" userId="e5f59384b4ca89d9" providerId="Windows Live" clId="Web-{69C08D9D-4C46-41E4-8825-4676C20D2C0C}"/>
-    <pc:docChg chg="modSld">
-      <pc:chgData name="gene olafsen" userId="e5f59384b4ca89d9" providerId="Windows Live" clId="Web-{69C08D9D-4C46-41E4-8825-4676C20D2C0C}" dt="2017-12-12T02:26:30.655" v="7"/>
-      <pc:docMkLst>
-        <pc:docMk/>
-      </pc:docMkLst>
-      <pc:sldChg chg="modSp">
-        <pc:chgData name="gene olafsen" userId="e5f59384b4ca89d9" providerId="Windows Live" clId="Web-{69C08D9D-4C46-41E4-8825-4676C20D2C0C}" dt="2017-12-12T02:26:30.640" v="6"/>
-        <pc:sldMkLst>
-          <pc:docMk/>
-          <pc:sldMk cId="205511767" sldId="280"/>
-        </pc:sldMkLst>
-        <pc:spChg chg="mod">
-          <ac:chgData name="gene olafsen" userId="e5f59384b4ca89d9" providerId="Windows Live" clId="Web-{69C08D9D-4C46-41E4-8825-4676C20D2C0C}" dt="2017-12-12T02:26:30.640" v="6"/>
-          <ac:spMkLst>
-            <pc:docMk/>
-            <pc:sldMk cId="205511767" sldId="280"/>
-            <ac:spMk id="3" creationId="{CA3F276F-9B78-4D09-99B2-452FB454DBC2}"/>
-          </ac:spMkLst>
-        </pc:spChg>
-      </pc:sldChg>
-    </pc:docChg>
-  </pc:docChgLst>
-  <pc:docChgLst>
     <pc:chgData name="gene olafsen" userId="e5f59384b4ca89d9" providerId="Windows Live" clId="Web-{012F0C47-D9DC-4623-B635-F171F43D9473}"/>
     <pc:docChg chg="addSld delSld modSld modSection">
       <pc:chgData name="gene olafsen" userId="e5f59384b4ca89d9" providerId="Windows Live" clId="Web-{012F0C47-D9DC-4623-B635-F171F43D9473}" dt="2017-12-12T02:17:27.518" v="157"/>
@@ -1445,6 +1421,30 @@
       </pc:sldChg>
     </pc:docChg>
   </pc:docChgLst>
+  <pc:docChgLst>
+    <pc:chgData name="gene olafsen" userId="e5f59384b4ca89d9" providerId="Windows Live" clId="Web-{69C08D9D-4C46-41E4-8825-4676C20D2C0C}"/>
+    <pc:docChg chg="modSld">
+      <pc:chgData name="gene olafsen" userId="e5f59384b4ca89d9" providerId="Windows Live" clId="Web-{69C08D9D-4C46-41E4-8825-4676C20D2C0C}" dt="2017-12-12T02:26:30.655" v="7"/>
+      <pc:docMkLst>
+        <pc:docMk/>
+      </pc:docMkLst>
+      <pc:sldChg chg="modSp">
+        <pc:chgData name="gene olafsen" userId="e5f59384b4ca89d9" providerId="Windows Live" clId="Web-{69C08D9D-4C46-41E4-8825-4676C20D2C0C}" dt="2017-12-12T02:26:30.640" v="6"/>
+        <pc:sldMkLst>
+          <pc:docMk/>
+          <pc:sldMk cId="205511767" sldId="280"/>
+        </pc:sldMkLst>
+        <pc:spChg chg="mod">
+          <ac:chgData name="gene olafsen" userId="e5f59384b4ca89d9" providerId="Windows Live" clId="Web-{69C08D9D-4C46-41E4-8825-4676C20D2C0C}" dt="2017-12-12T02:26:30.640" v="6"/>
+          <ac:spMkLst>
+            <pc:docMk/>
+            <pc:sldMk cId="205511767" sldId="280"/>
+            <ac:spMk id="3" creationId="{CA3F276F-9B78-4D09-99B2-452FB454DBC2}"/>
+          </ac:spMkLst>
+        </pc:spChg>
+      </pc:sldChg>
+    </pc:docChg>
+  </pc:docChgLst>
 </pc:chgInfo>
 </file>
 
@@ -1498,7 +1498,7 @@
           <a:noFill/>
           <a:extLst>
             <a:ext uri="{909E8E84-426E-40dd-AFC4-6F175D3DCCD1}">
-              <a14:hiddenFill xmlns="" xmlns:a14="http://schemas.microsoft.com/office/drawing/2010/main">
+              <a14:hiddenFill xmlns:a14="http://schemas.microsoft.com/office/drawing/2010/main" xmlns="">
                 <a:solidFill>
                   <a:srgbClr val="FFFFFF"/>
                 </a:solidFill>
@@ -1558,7 +1558,7 @@
             </a:ln>
             <a:extLst>
               <a:ext uri="{91240B29-F687-4f45-9708-019B960494DF}">
-                <a14:hiddenLine xmlns="" xmlns:a14="http://schemas.microsoft.com/office/drawing/2010/main" w="9525">
+                <a14:hiddenLine xmlns:a14="http://schemas.microsoft.com/office/drawing/2010/main" xmlns="" w="9525">
                   <a:solidFill>
                     <a:srgbClr val="000000"/>
                   </a:solidFill>
@@ -1648,7 +1648,7 @@
             </a:ln>
             <a:extLst>
               <a:ext uri="{91240B29-F687-4f45-9708-019B960494DF}">
-                <a14:hiddenLine xmlns="" xmlns:a14="http://schemas.microsoft.com/office/drawing/2010/main" w="9525">
+                <a14:hiddenLine xmlns:a14="http://schemas.microsoft.com/office/drawing/2010/main" xmlns="" w="9525">
                   <a:solidFill>
                     <a:srgbClr val="000000"/>
                   </a:solidFill>
@@ -1738,7 +1738,7 @@
             </a:ln>
             <a:extLst>
               <a:ext uri="{91240B29-F687-4f45-9708-019B960494DF}">
-                <a14:hiddenLine xmlns="" xmlns:a14="http://schemas.microsoft.com/office/drawing/2010/main" w="9525">
+                <a14:hiddenLine xmlns:a14="http://schemas.microsoft.com/office/drawing/2010/main" xmlns="" w="9525">
                   <a:solidFill>
                     <a:srgbClr val="000000"/>
                   </a:solidFill>
@@ -1772,7 +1772,7 @@
             </a:ln>
             <a:extLst>
               <a:ext uri="{91240B29-F687-4f45-9708-019B960494DF}">
-                <a14:hiddenLine xmlns="" xmlns:a14="http://schemas.microsoft.com/office/drawing/2010/main" w="9525">
+                <a14:hiddenLine xmlns:a14="http://schemas.microsoft.com/office/drawing/2010/main" xmlns="" w="9525">
                   <a:solidFill>
                     <a:srgbClr val="000000"/>
                   </a:solidFill>
@@ -1862,7 +1862,7 @@
             </a:ln>
             <a:extLst>
               <a:ext uri="{91240B29-F687-4f45-9708-019B960494DF}">
-                <a14:hiddenLine xmlns="" xmlns:a14="http://schemas.microsoft.com/office/drawing/2010/main" w="9525">
+                <a14:hiddenLine xmlns:a14="http://schemas.microsoft.com/office/drawing/2010/main" xmlns="" w="9525">
                   <a:solidFill>
                     <a:srgbClr val="000000"/>
                   </a:solidFill>
@@ -1924,7 +1924,7 @@
             </a:ln>
             <a:extLst>
               <a:ext uri="{91240B29-F687-4f45-9708-019B960494DF}">
-                <a14:hiddenLine xmlns="" xmlns:a14="http://schemas.microsoft.com/office/drawing/2010/main" w="9525">
+                <a14:hiddenLine xmlns:a14="http://schemas.microsoft.com/office/drawing/2010/main" xmlns="" w="9525">
                   <a:solidFill>
                     <a:srgbClr val="000000"/>
                   </a:solidFill>
@@ -1986,7 +1986,7 @@
             </a:ln>
             <a:extLst>
               <a:ext uri="{91240B29-F687-4f45-9708-019B960494DF}">
-                <a14:hiddenLine xmlns="" xmlns:a14="http://schemas.microsoft.com/office/drawing/2010/main" w="9525">
+                <a14:hiddenLine xmlns:a14="http://schemas.microsoft.com/office/drawing/2010/main" xmlns="" w="9525">
                   <a:solidFill>
                     <a:srgbClr val="000000"/>
                   </a:solidFill>
@@ -2076,7 +2076,7 @@
             </a:ln>
             <a:extLst>
               <a:ext uri="{91240B29-F687-4f45-9708-019B960494DF}">
-                <a14:hiddenLine xmlns="" xmlns:a14="http://schemas.microsoft.com/office/drawing/2010/main" w="9525">
+                <a14:hiddenLine xmlns:a14="http://schemas.microsoft.com/office/drawing/2010/main" xmlns="" w="9525">
                   <a:solidFill>
                     <a:srgbClr val="000000"/>
                   </a:solidFill>
@@ -2138,7 +2138,7 @@
             </a:ln>
             <a:extLst>
               <a:ext uri="{91240B29-F687-4f45-9708-019B960494DF}">
-                <a14:hiddenLine xmlns="" xmlns:a14="http://schemas.microsoft.com/office/drawing/2010/main" w="9525">
+                <a14:hiddenLine xmlns:a14="http://schemas.microsoft.com/office/drawing/2010/main" xmlns="" w="9525">
                   <a:solidFill>
                     <a:srgbClr val="000000"/>
                   </a:solidFill>
@@ -2200,7 +2200,7 @@
             </a:ln>
             <a:extLst>
               <a:ext uri="{91240B29-F687-4f45-9708-019B960494DF}">
-                <a14:hiddenLine xmlns="" xmlns:a14="http://schemas.microsoft.com/office/drawing/2010/main" w="9525">
+                <a14:hiddenLine xmlns:a14="http://schemas.microsoft.com/office/drawing/2010/main" xmlns="" w="9525">
                   <a:solidFill>
                     <a:srgbClr val="000000"/>
                   </a:solidFill>
@@ -2290,7 +2290,7 @@
             </a:ln>
             <a:extLst>
               <a:ext uri="{91240B29-F687-4f45-9708-019B960494DF}">
-                <a14:hiddenLine xmlns="" xmlns:a14="http://schemas.microsoft.com/office/drawing/2010/main" w="9525">
+                <a14:hiddenLine xmlns:a14="http://schemas.microsoft.com/office/drawing/2010/main" xmlns="" w="9525">
                   <a:solidFill>
                     <a:srgbClr val="000000"/>
                   </a:solidFill>
@@ -2380,7 +2380,7 @@
             </a:ln>
             <a:extLst>
               <a:ext uri="{91240B29-F687-4f45-9708-019B960494DF}">
-                <a14:hiddenLine xmlns="" xmlns:a14="http://schemas.microsoft.com/office/drawing/2010/main" w="9525">
+                <a14:hiddenLine xmlns:a14="http://schemas.microsoft.com/office/drawing/2010/main" xmlns="" w="9525">
                   <a:solidFill>
                     <a:srgbClr val="000000"/>
                   </a:solidFill>
@@ -2442,7 +2442,7 @@
             </a:ln>
             <a:extLst>
               <a:ext uri="{91240B29-F687-4f45-9708-019B960494DF}">
-                <a14:hiddenLine xmlns="" xmlns:a14="http://schemas.microsoft.com/office/drawing/2010/main" w="9525">
+                <a14:hiddenLine xmlns:a14="http://schemas.microsoft.com/office/drawing/2010/main" xmlns="" w="9525">
                   <a:solidFill>
                     <a:srgbClr val="000000"/>
                   </a:solidFill>
@@ -2552,7 +2552,7 @@
             </a:ln>
             <a:extLst>
               <a:ext uri="{91240B29-F687-4f45-9708-019B960494DF}">
-                <a14:hiddenLine xmlns="" xmlns:a14="http://schemas.microsoft.com/office/drawing/2010/main" w="9525">
+                <a14:hiddenLine xmlns:a14="http://schemas.microsoft.com/office/drawing/2010/main" xmlns="" w="9525">
                   <a:solidFill>
                     <a:srgbClr val="000000"/>
                   </a:solidFill>
@@ -2614,7 +2614,7 @@
             </a:ln>
             <a:extLst>
               <a:ext uri="{91240B29-F687-4f45-9708-019B960494DF}">
-                <a14:hiddenLine xmlns="" xmlns:a14="http://schemas.microsoft.com/office/drawing/2010/main" w="9525">
+                <a14:hiddenLine xmlns:a14="http://schemas.microsoft.com/office/drawing/2010/main" xmlns="" w="9525">
                   <a:solidFill>
                     <a:srgbClr val="000000"/>
                   </a:solidFill>
@@ -2704,7 +2704,7 @@
             </a:ln>
             <a:extLst>
               <a:ext uri="{91240B29-F687-4f45-9708-019B960494DF}">
-                <a14:hiddenLine xmlns="" xmlns:a14="http://schemas.microsoft.com/office/drawing/2010/main" w="9525">
+                <a14:hiddenLine xmlns:a14="http://schemas.microsoft.com/office/drawing/2010/main" xmlns="" w="9525">
                   <a:solidFill>
                     <a:srgbClr val="000000"/>
                   </a:solidFill>
@@ -2794,7 +2794,7 @@
             </a:ln>
             <a:extLst>
               <a:ext uri="{91240B29-F687-4f45-9708-019B960494DF}">
-                <a14:hiddenLine xmlns="" xmlns:a14="http://schemas.microsoft.com/office/drawing/2010/main" w="9525">
+                <a14:hiddenLine xmlns:a14="http://schemas.microsoft.com/office/drawing/2010/main" xmlns="" w="9525">
                   <a:solidFill>
                     <a:srgbClr val="000000"/>
                   </a:solidFill>
@@ -2856,7 +2856,7 @@
             </a:ln>
             <a:extLst>
               <a:ext uri="{91240B29-F687-4f45-9708-019B960494DF}">
-                <a14:hiddenLine xmlns="" xmlns:a14="http://schemas.microsoft.com/office/drawing/2010/main" w="9525">
+                <a14:hiddenLine xmlns:a14="http://schemas.microsoft.com/office/drawing/2010/main" xmlns="" w="9525">
                   <a:solidFill>
                     <a:srgbClr val="000000"/>
                   </a:solidFill>
@@ -2946,7 +2946,7 @@
             </a:ln>
             <a:extLst>
               <a:ext uri="{91240B29-F687-4f45-9708-019B960494DF}">
-                <a14:hiddenLine xmlns="" xmlns:a14="http://schemas.microsoft.com/office/drawing/2010/main" w="9525">
+                <a14:hiddenLine xmlns:a14="http://schemas.microsoft.com/office/drawing/2010/main" xmlns="" w="9525">
                   <a:solidFill>
                     <a:srgbClr val="000000"/>
                   </a:solidFill>
@@ -3036,7 +3036,7 @@
             </a:ln>
             <a:extLst>
               <a:ext uri="{91240B29-F687-4f45-9708-019B960494DF}">
-                <a14:hiddenLine xmlns="" xmlns:a14="http://schemas.microsoft.com/office/drawing/2010/main" w="9525">
+                <a14:hiddenLine xmlns:a14="http://schemas.microsoft.com/office/drawing/2010/main" xmlns="" w="9525">
                   <a:solidFill>
                     <a:srgbClr val="000000"/>
                   </a:solidFill>
@@ -3092,7 +3092,7 @@
             </a:ln>
             <a:extLst>
               <a:ext uri="{91240B29-F687-4f45-9708-019B960494DF}">
-                <a14:hiddenLine xmlns="" xmlns:a14="http://schemas.microsoft.com/office/drawing/2010/main" w="9525">
+                <a14:hiddenLine xmlns:a14="http://schemas.microsoft.com/office/drawing/2010/main" xmlns="" w="9525">
                   <a:solidFill>
                     <a:srgbClr val="000000"/>
                   </a:solidFill>
@@ -3182,7 +3182,7 @@
             </a:ln>
             <a:extLst>
               <a:ext uri="{91240B29-F687-4f45-9708-019B960494DF}">
-                <a14:hiddenLine xmlns="" xmlns:a14="http://schemas.microsoft.com/office/drawing/2010/main" w="9525">
+                <a14:hiddenLine xmlns:a14="http://schemas.microsoft.com/office/drawing/2010/main" xmlns="" w="9525">
                   <a:solidFill>
                     <a:srgbClr val="000000"/>
                   </a:solidFill>
@@ -3238,7 +3238,7 @@
             </a:ln>
             <a:extLst>
               <a:ext uri="{91240B29-F687-4f45-9708-019B960494DF}">
-                <a14:hiddenLine xmlns="" xmlns:a14="http://schemas.microsoft.com/office/drawing/2010/main" w="9525">
+                <a14:hiddenLine xmlns:a14="http://schemas.microsoft.com/office/drawing/2010/main" xmlns="" w="9525">
                   <a:solidFill>
                     <a:srgbClr val="000000"/>
                   </a:solidFill>
@@ -3328,7 +3328,7 @@
             </a:ln>
             <a:extLst>
               <a:ext uri="{91240B29-F687-4f45-9708-019B960494DF}">
-                <a14:hiddenLine xmlns="" xmlns:a14="http://schemas.microsoft.com/office/drawing/2010/main" w="9525">
+                <a14:hiddenLine xmlns:a14="http://schemas.microsoft.com/office/drawing/2010/main" xmlns="" w="9525">
                   <a:solidFill>
                     <a:srgbClr val="000000"/>
                   </a:solidFill>
@@ -3396,7 +3396,7 @@
             </a:ln>
             <a:extLst>
               <a:ext uri="{91240B29-F687-4f45-9708-019B960494DF}">
-                <a14:hiddenLine xmlns="" xmlns:a14="http://schemas.microsoft.com/office/drawing/2010/main" w="9525">
+                <a14:hiddenLine xmlns:a14="http://schemas.microsoft.com/office/drawing/2010/main" xmlns="" w="9525">
                   <a:solidFill>
                     <a:srgbClr val="000000"/>
                   </a:solidFill>
@@ -3486,7 +3486,7 @@
             </a:ln>
             <a:extLst>
               <a:ext uri="{91240B29-F687-4f45-9708-019B960494DF}">
-                <a14:hiddenLine xmlns="" xmlns:a14="http://schemas.microsoft.com/office/drawing/2010/main" w="9525">
+                <a14:hiddenLine xmlns:a14="http://schemas.microsoft.com/office/drawing/2010/main" xmlns="" w="9525">
                   <a:solidFill>
                     <a:srgbClr val="000000"/>
                   </a:solidFill>
@@ -3554,7 +3554,7 @@
             </a:ln>
             <a:extLst>
               <a:ext uri="{91240B29-F687-4f45-9708-019B960494DF}">
-                <a14:hiddenLine xmlns="" xmlns:a14="http://schemas.microsoft.com/office/drawing/2010/main" w="9525">
+                <a14:hiddenLine xmlns:a14="http://schemas.microsoft.com/office/drawing/2010/main" xmlns="" w="9525">
                   <a:solidFill>
                     <a:srgbClr val="000000"/>
                   </a:solidFill>
@@ -3644,7 +3644,7 @@
             </a:ln>
             <a:extLst>
               <a:ext uri="{91240B29-F687-4f45-9708-019B960494DF}">
-                <a14:hiddenLine xmlns="" xmlns:a14="http://schemas.microsoft.com/office/drawing/2010/main" w="9525">
+                <a14:hiddenLine xmlns:a14="http://schemas.microsoft.com/office/drawing/2010/main" xmlns="" w="9525">
                   <a:solidFill>
                     <a:srgbClr val="000000"/>
                   </a:solidFill>
@@ -3678,7 +3678,7 @@
             </a:ln>
             <a:extLst>
               <a:ext uri="{91240B29-F687-4f45-9708-019B960494DF}">
-                <a14:hiddenLine xmlns="" xmlns:a14="http://schemas.microsoft.com/office/drawing/2010/main" w="9525">
+                <a14:hiddenLine xmlns:a14="http://schemas.microsoft.com/office/drawing/2010/main" xmlns="" w="9525">
                   <a:solidFill>
                     <a:srgbClr val="000000"/>
                   </a:solidFill>
@@ -3768,7 +3768,7 @@
             </a:ln>
             <a:extLst>
               <a:ext uri="{91240B29-F687-4f45-9708-019B960494DF}">
-                <a14:hiddenLine xmlns="" xmlns:a14="http://schemas.microsoft.com/office/drawing/2010/main" w="9525">
+                <a14:hiddenLine xmlns:a14="http://schemas.microsoft.com/office/drawing/2010/main" xmlns="" w="9525">
                   <a:solidFill>
                     <a:srgbClr val="000000"/>
                   </a:solidFill>
@@ -3830,7 +3830,7 @@
             </a:ln>
             <a:extLst>
               <a:ext uri="{91240B29-F687-4f45-9708-019B960494DF}">
-                <a14:hiddenLine xmlns="" xmlns:a14="http://schemas.microsoft.com/office/drawing/2010/main" w="9525">
+                <a14:hiddenLine xmlns:a14="http://schemas.microsoft.com/office/drawing/2010/main" xmlns="" w="9525">
                   <a:solidFill>
                     <a:srgbClr val="000000"/>
                   </a:solidFill>
@@ -3892,7 +3892,7 @@
             </a:ln>
             <a:extLst>
               <a:ext uri="{91240B29-F687-4f45-9708-019B960494DF}">
-                <a14:hiddenLine xmlns="" xmlns:a14="http://schemas.microsoft.com/office/drawing/2010/main" w="9525">
+                <a14:hiddenLine xmlns:a14="http://schemas.microsoft.com/office/drawing/2010/main" xmlns="" w="9525">
                   <a:solidFill>
                     <a:srgbClr val="000000"/>
                   </a:solidFill>
@@ -3982,7 +3982,7 @@
             </a:ln>
             <a:extLst>
               <a:ext uri="{91240B29-F687-4f45-9708-019B960494DF}">
-                <a14:hiddenLine xmlns="" xmlns:a14="http://schemas.microsoft.com/office/drawing/2010/main" w="9525">
+                <a14:hiddenLine xmlns:a14="http://schemas.microsoft.com/office/drawing/2010/main" xmlns="" w="9525">
                   <a:solidFill>
                     <a:srgbClr val="000000"/>
                   </a:solidFill>
@@ -4050,7 +4050,7 @@
             </a:ln>
             <a:extLst>
               <a:ext uri="{91240B29-F687-4f45-9708-019B960494DF}">
-                <a14:hiddenLine xmlns="" xmlns:a14="http://schemas.microsoft.com/office/drawing/2010/main" w="9525">
+                <a14:hiddenLine xmlns:a14="http://schemas.microsoft.com/office/drawing/2010/main" xmlns="" w="9525">
                   <a:solidFill>
                     <a:srgbClr val="000000"/>
                   </a:solidFill>
@@ -4112,7 +4112,7 @@
             </a:ln>
             <a:extLst>
               <a:ext uri="{91240B29-F687-4f45-9708-019B960494DF}">
-                <a14:hiddenLine xmlns="" xmlns:a14="http://schemas.microsoft.com/office/drawing/2010/main" w="9525">
+                <a14:hiddenLine xmlns:a14="http://schemas.microsoft.com/office/drawing/2010/main" xmlns="" w="9525">
                   <a:solidFill>
                     <a:srgbClr val="000000"/>
                   </a:solidFill>
@@ -4202,7 +4202,7 @@
             </a:ln>
             <a:extLst>
               <a:ext uri="{91240B29-F687-4f45-9708-019B960494DF}">
-                <a14:hiddenLine xmlns="" xmlns:a14="http://schemas.microsoft.com/office/drawing/2010/main" w="9525">
+                <a14:hiddenLine xmlns:a14="http://schemas.microsoft.com/office/drawing/2010/main" xmlns="" w="9525">
                   <a:solidFill>
                     <a:srgbClr val="000000"/>
                   </a:solidFill>
@@ -4264,7 +4264,7 @@
             </a:ln>
             <a:extLst>
               <a:ext uri="{91240B29-F687-4f45-9708-019B960494DF}">
-                <a14:hiddenLine xmlns="" xmlns:a14="http://schemas.microsoft.com/office/drawing/2010/main" w="9525">
+                <a14:hiddenLine xmlns:a14="http://schemas.microsoft.com/office/drawing/2010/main" xmlns="" w="9525">
                   <a:solidFill>
                     <a:srgbClr val="000000"/>
                   </a:solidFill>
@@ -4354,7 +4354,7 @@
             </a:ln>
             <a:extLst>
               <a:ext uri="{91240B29-F687-4f45-9708-019B960494DF}">
-                <a14:hiddenLine xmlns="" xmlns:a14="http://schemas.microsoft.com/office/drawing/2010/main" w="9525">
+                <a14:hiddenLine xmlns:a14="http://schemas.microsoft.com/office/drawing/2010/main" xmlns="" w="9525">
                   <a:solidFill>
                     <a:srgbClr val="000000"/>
                   </a:solidFill>
@@ -4416,7 +4416,7 @@
             </a:ln>
             <a:extLst>
               <a:ext uri="{91240B29-F687-4f45-9708-019B960494DF}">
-                <a14:hiddenLine xmlns="" xmlns:a14="http://schemas.microsoft.com/office/drawing/2010/main" w="9525">
+                <a14:hiddenLine xmlns:a14="http://schemas.microsoft.com/office/drawing/2010/main" xmlns="" w="9525">
                   <a:solidFill>
                     <a:srgbClr val="000000"/>
                   </a:solidFill>
@@ -4506,7 +4506,7 @@
             </a:ln>
             <a:extLst>
               <a:ext uri="{91240B29-F687-4f45-9708-019B960494DF}">
-                <a14:hiddenLine xmlns="" xmlns:a14="http://schemas.microsoft.com/office/drawing/2010/main" w="9525">
+                <a14:hiddenLine xmlns:a14="http://schemas.microsoft.com/office/drawing/2010/main" xmlns="" w="9525">
                   <a:solidFill>
                     <a:srgbClr val="000000"/>
                   </a:solidFill>
@@ -4540,7 +4540,7 @@
             </a:ln>
             <a:extLst>
               <a:ext uri="{91240B29-F687-4f45-9708-019B960494DF}">
-                <a14:hiddenLine xmlns="" xmlns:a14="http://schemas.microsoft.com/office/drawing/2010/main" w="9525">
+                <a14:hiddenLine xmlns:a14="http://schemas.microsoft.com/office/drawing/2010/main" xmlns="" w="9525">
                   <a:solidFill>
                     <a:srgbClr val="000000"/>
                   </a:solidFill>
@@ -4605,7 +4605,7 @@
             </a:ln>
             <a:extLst>
               <a:ext uri="{91240B29-F687-4f45-9708-019B960494DF}">
-                <a14:hiddenLine xmlns="" xmlns:a14="http://schemas.microsoft.com/office/drawing/2010/main" w="9525">
+                <a14:hiddenLine xmlns:a14="http://schemas.microsoft.com/office/drawing/2010/main" xmlns="" w="9525">
                   <a:solidFill>
                     <a:srgbClr val="000000"/>
                   </a:solidFill>
@@ -4695,7 +4695,7 @@
             </a:ln>
             <a:extLst>
               <a:ext uri="{91240B29-F687-4f45-9708-019B960494DF}">
-                <a14:hiddenLine xmlns="" xmlns:a14="http://schemas.microsoft.com/office/drawing/2010/main" w="9525">
+                <a14:hiddenLine xmlns:a14="http://schemas.microsoft.com/office/drawing/2010/main" xmlns="" w="9525">
                   <a:solidFill>
                     <a:srgbClr val="000000"/>
                   </a:solidFill>
@@ -4757,7 +4757,7 @@
             </a:ln>
             <a:extLst>
               <a:ext uri="{91240B29-F687-4f45-9708-019B960494DF}">
-                <a14:hiddenLine xmlns="" xmlns:a14="http://schemas.microsoft.com/office/drawing/2010/main" w="9525">
+                <a14:hiddenLine xmlns:a14="http://schemas.microsoft.com/office/drawing/2010/main" xmlns="" w="9525">
                   <a:solidFill>
                     <a:srgbClr val="000000"/>
                   </a:solidFill>
@@ -4847,7 +4847,7 @@
             </a:ln>
             <a:extLst>
               <a:ext uri="{91240B29-F687-4f45-9708-019B960494DF}">
-                <a14:hiddenLine xmlns="" xmlns:a14="http://schemas.microsoft.com/office/drawing/2010/main" w="9525">
+                <a14:hiddenLine xmlns:a14="http://schemas.microsoft.com/office/drawing/2010/main" xmlns="" w="9525">
                   <a:solidFill>
                     <a:srgbClr val="000000"/>
                   </a:solidFill>
@@ -4937,7 +4937,7 @@
             </a:ln>
             <a:extLst>
               <a:ext uri="{91240B29-F687-4f45-9708-019B960494DF}">
-                <a14:hiddenLine xmlns="" xmlns:a14="http://schemas.microsoft.com/office/drawing/2010/main" w="9525">
+                <a14:hiddenLine xmlns:a14="http://schemas.microsoft.com/office/drawing/2010/main" xmlns="" w="9525">
                   <a:solidFill>
                     <a:srgbClr val="000000"/>
                   </a:solidFill>
@@ -5002,7 +5002,7 @@
             </a:ln>
             <a:extLst>
               <a:ext uri="{91240B29-F687-4f45-9708-019B960494DF}">
-                <a14:hiddenLine xmlns="" xmlns:a14="http://schemas.microsoft.com/office/drawing/2010/main" w="9525">
+                <a14:hiddenLine xmlns:a14="http://schemas.microsoft.com/office/drawing/2010/main" xmlns="" w="9525">
                   <a:solidFill>
                     <a:srgbClr val="000000"/>
                   </a:solidFill>
@@ -5064,7 +5064,7 @@
             </a:ln>
             <a:extLst>
               <a:ext uri="{91240B29-F687-4f45-9708-019B960494DF}">
-                <a14:hiddenLine xmlns="" xmlns:a14="http://schemas.microsoft.com/office/drawing/2010/main" w="9525">
+                <a14:hiddenLine xmlns:a14="http://schemas.microsoft.com/office/drawing/2010/main" xmlns="" w="9525">
                   <a:solidFill>
                     <a:srgbClr val="000000"/>
                   </a:solidFill>
@@ -5154,7 +5154,7 @@
             </a:ln>
             <a:extLst>
               <a:ext uri="{91240B29-F687-4f45-9708-019B960494DF}">
-                <a14:hiddenLine xmlns="" xmlns:a14="http://schemas.microsoft.com/office/drawing/2010/main" w="9525">
+                <a14:hiddenLine xmlns:a14="http://schemas.microsoft.com/office/drawing/2010/main" xmlns="" w="9525">
                   <a:solidFill>
                     <a:srgbClr val="000000"/>
                   </a:solidFill>
@@ -5244,7 +5244,7 @@
             </a:ln>
             <a:extLst>
               <a:ext uri="{91240B29-F687-4f45-9708-019B960494DF}">
-                <a14:hiddenLine xmlns="" xmlns:a14="http://schemas.microsoft.com/office/drawing/2010/main" w="9525">
+                <a14:hiddenLine xmlns:a14="http://schemas.microsoft.com/office/drawing/2010/main" xmlns="" w="9525">
                   <a:solidFill>
                     <a:srgbClr val="000000"/>
                   </a:solidFill>
@@ -5306,7 +5306,7 @@
             </a:ln>
             <a:extLst>
               <a:ext uri="{91240B29-F687-4f45-9708-019B960494DF}">
-                <a14:hiddenLine xmlns="" xmlns:a14="http://schemas.microsoft.com/office/drawing/2010/main" w="9525">
+                <a14:hiddenLine xmlns:a14="http://schemas.microsoft.com/office/drawing/2010/main" xmlns="" w="9525">
                   <a:solidFill>
                     <a:srgbClr val="000000"/>
                   </a:solidFill>
@@ -5426,7 +5426,7 @@
             </a:ln>
             <a:extLst>
               <a:ext uri="{91240B29-F687-4f45-9708-019B960494DF}">
-                <a14:hiddenLine xmlns="" xmlns:a14="http://schemas.microsoft.com/office/drawing/2010/main" w="9525">
+                <a14:hiddenLine xmlns:a14="http://schemas.microsoft.com/office/drawing/2010/main" xmlns="" w="9525">
                   <a:solidFill>
                     <a:srgbClr val="000000"/>
                   </a:solidFill>
@@ -5494,7 +5494,7 @@
             </a:ln>
             <a:extLst>
               <a:ext uri="{91240B29-F687-4f45-9708-019B960494DF}">
-                <a14:hiddenLine xmlns="" xmlns:a14="http://schemas.microsoft.com/office/drawing/2010/main" w="9525">
+                <a14:hiddenLine xmlns:a14="http://schemas.microsoft.com/office/drawing/2010/main" xmlns="" w="9525">
                   <a:solidFill>
                     <a:srgbClr val="000000"/>
                   </a:solidFill>
@@ -5584,7 +5584,7 @@
             </a:ln>
             <a:extLst>
               <a:ext uri="{91240B29-F687-4f45-9708-019B960494DF}">
-                <a14:hiddenLine xmlns="" xmlns:a14="http://schemas.microsoft.com/office/drawing/2010/main" w="9525">
+                <a14:hiddenLine xmlns:a14="http://schemas.microsoft.com/office/drawing/2010/main" xmlns="" w="9525">
                   <a:solidFill>
                     <a:srgbClr val="000000"/>
                   </a:solidFill>
@@ -10306,7 +10306,7 @@
           <a:noFill/>
           <a:extLst>
             <a:ext uri="{909E8E84-426E-40dd-AFC4-6F175D3DCCD1}">
-              <a14:hiddenFill xmlns="" xmlns:a14="http://schemas.microsoft.com/office/drawing/2010/main">
+              <a14:hiddenFill xmlns:a14="http://schemas.microsoft.com/office/drawing/2010/main" xmlns="">
                 <a:solidFill>
                   <a:srgbClr val="FFFFFF"/>
                 </a:solidFill>
@@ -10380,7 +10380,7 @@
               </a:ln>
               <a:extLst>
                 <a:ext uri="{91240B29-F687-4f45-9708-019B960494DF}">
-                  <a14:hiddenLine xmlns="" xmlns:a14="http://schemas.microsoft.com/office/drawing/2010/main" w="9525">
+                  <a14:hiddenLine xmlns:a14="http://schemas.microsoft.com/office/drawing/2010/main" xmlns="" w="9525">
                     <a:solidFill>
                       <a:srgbClr val="000000"/>
                     </a:solidFill>
@@ -10470,7 +10470,7 @@
               </a:ln>
               <a:extLst>
                 <a:ext uri="{91240B29-F687-4f45-9708-019B960494DF}">
-                  <a14:hiddenLine xmlns="" xmlns:a14="http://schemas.microsoft.com/office/drawing/2010/main" w="9525">
+                  <a14:hiddenLine xmlns:a14="http://schemas.microsoft.com/office/drawing/2010/main" xmlns="" w="9525">
                     <a:solidFill>
                       <a:srgbClr val="000000"/>
                     </a:solidFill>
@@ -10560,7 +10560,7 @@
               </a:ln>
               <a:extLst>
                 <a:ext uri="{91240B29-F687-4f45-9708-019B960494DF}">
-                  <a14:hiddenLine xmlns="" xmlns:a14="http://schemas.microsoft.com/office/drawing/2010/main" w="9525">
+                  <a14:hiddenLine xmlns:a14="http://schemas.microsoft.com/office/drawing/2010/main" xmlns="" w="9525">
                     <a:solidFill>
                       <a:srgbClr val="000000"/>
                     </a:solidFill>
@@ -10622,7 +10622,7 @@
               </a:ln>
               <a:extLst>
                 <a:ext uri="{91240B29-F687-4f45-9708-019B960494DF}">
-                  <a14:hiddenLine xmlns="" xmlns:a14="http://schemas.microsoft.com/office/drawing/2010/main" w="9525">
+                  <a14:hiddenLine xmlns:a14="http://schemas.microsoft.com/office/drawing/2010/main" xmlns="" w="9525">
                     <a:solidFill>
                       <a:srgbClr val="000000"/>
                     </a:solidFill>
@@ -10712,7 +10712,7 @@
               </a:ln>
               <a:extLst>
                 <a:ext uri="{91240B29-F687-4f45-9708-019B960494DF}">
-                  <a14:hiddenLine xmlns="" xmlns:a14="http://schemas.microsoft.com/office/drawing/2010/main" w="9525">
+                  <a14:hiddenLine xmlns:a14="http://schemas.microsoft.com/office/drawing/2010/main" xmlns="" w="9525">
                     <a:solidFill>
                       <a:srgbClr val="000000"/>
                     </a:solidFill>
@@ -10774,7 +10774,7 @@
               </a:ln>
               <a:extLst>
                 <a:ext uri="{91240B29-F687-4f45-9708-019B960494DF}">
-                  <a14:hiddenLine xmlns="" xmlns:a14="http://schemas.microsoft.com/office/drawing/2010/main" w="9525">
+                  <a14:hiddenLine xmlns:a14="http://schemas.microsoft.com/office/drawing/2010/main" xmlns="" w="9525">
                     <a:solidFill>
                       <a:srgbClr val="000000"/>
                     </a:solidFill>
@@ -10836,7 +10836,7 @@
               </a:ln>
               <a:extLst>
                 <a:ext uri="{91240B29-F687-4f45-9708-019B960494DF}">
-                  <a14:hiddenLine xmlns="" xmlns:a14="http://schemas.microsoft.com/office/drawing/2010/main" w="9525">
+                  <a14:hiddenLine xmlns:a14="http://schemas.microsoft.com/office/drawing/2010/main" xmlns="" w="9525">
                     <a:solidFill>
                       <a:srgbClr val="000000"/>
                     </a:solidFill>
@@ -10926,7 +10926,7 @@
               </a:ln>
               <a:extLst>
                 <a:ext uri="{91240B29-F687-4f45-9708-019B960494DF}">
-                  <a14:hiddenLine xmlns="" xmlns:a14="http://schemas.microsoft.com/office/drawing/2010/main" w="9525">
+                  <a14:hiddenLine xmlns:a14="http://schemas.microsoft.com/office/drawing/2010/main" xmlns="" w="9525">
                     <a:solidFill>
                       <a:srgbClr val="000000"/>
                     </a:solidFill>
@@ -11016,7 +11016,7 @@
               </a:ln>
               <a:extLst>
                 <a:ext uri="{91240B29-F687-4f45-9708-019B960494DF}">
-                  <a14:hiddenLine xmlns="" xmlns:a14="http://schemas.microsoft.com/office/drawing/2010/main" w="9525">
+                  <a14:hiddenLine xmlns:a14="http://schemas.microsoft.com/office/drawing/2010/main" xmlns="" w="9525">
                     <a:solidFill>
                       <a:srgbClr val="000000"/>
                     </a:solidFill>
@@ -11078,7 +11078,7 @@
               </a:ln>
               <a:extLst>
                 <a:ext uri="{91240B29-F687-4f45-9708-019B960494DF}">
-                  <a14:hiddenLine xmlns="" xmlns:a14="http://schemas.microsoft.com/office/drawing/2010/main" w="9525">
+                  <a14:hiddenLine xmlns:a14="http://schemas.microsoft.com/office/drawing/2010/main" xmlns="" w="9525">
                     <a:solidFill>
                       <a:srgbClr val="000000"/>
                     </a:solidFill>
@@ -11188,7 +11188,7 @@
               </a:ln>
               <a:extLst>
                 <a:ext uri="{91240B29-F687-4f45-9708-019B960494DF}">
-                  <a14:hiddenLine xmlns="" xmlns:a14="http://schemas.microsoft.com/office/drawing/2010/main" w="9525">
+                  <a14:hiddenLine xmlns:a14="http://schemas.microsoft.com/office/drawing/2010/main" xmlns="" w="9525">
                     <a:solidFill>
                       <a:srgbClr val="000000"/>
                     </a:solidFill>
@@ -11272,7 +11272,7 @@
               </a:ln>
               <a:extLst>
                 <a:ext uri="{91240B29-F687-4f45-9708-019B960494DF}">
-                  <a14:hiddenLine xmlns="" xmlns:a14="http://schemas.microsoft.com/office/drawing/2010/main" w="9525">
+                  <a14:hiddenLine xmlns:a14="http://schemas.microsoft.com/office/drawing/2010/main" xmlns="" w="9525">
                     <a:solidFill>
                       <a:srgbClr val="000000"/>
                     </a:solidFill>
@@ -11334,7 +11334,7 @@
               </a:ln>
               <a:extLst>
                 <a:ext uri="{91240B29-F687-4f45-9708-019B960494DF}">
-                  <a14:hiddenLine xmlns="" xmlns:a14="http://schemas.microsoft.com/office/drawing/2010/main" w="9525">
+                  <a14:hiddenLine xmlns:a14="http://schemas.microsoft.com/office/drawing/2010/main" xmlns="" w="9525">
                     <a:solidFill>
                       <a:srgbClr val="000000"/>
                     </a:solidFill>
@@ -11396,7 +11396,7 @@
               </a:ln>
               <a:extLst>
                 <a:ext uri="{91240B29-F687-4f45-9708-019B960494DF}">
-                  <a14:hiddenLine xmlns="" xmlns:a14="http://schemas.microsoft.com/office/drawing/2010/main" w="9525">
+                  <a14:hiddenLine xmlns:a14="http://schemas.microsoft.com/office/drawing/2010/main" xmlns="" w="9525">
                     <a:solidFill>
                       <a:srgbClr val="000000"/>
                     </a:solidFill>
@@ -11486,7 +11486,7 @@
               </a:ln>
               <a:extLst>
                 <a:ext uri="{91240B29-F687-4f45-9708-019B960494DF}">
-                  <a14:hiddenLine xmlns="" xmlns:a14="http://schemas.microsoft.com/office/drawing/2010/main" w="9525">
+                  <a14:hiddenLine xmlns:a14="http://schemas.microsoft.com/office/drawing/2010/main" xmlns="" w="9525">
                     <a:solidFill>
                       <a:srgbClr val="000000"/>
                     </a:solidFill>
@@ -11520,7 +11520,7 @@
               </a:ln>
               <a:extLst>
                 <a:ext uri="{91240B29-F687-4f45-9708-019B960494DF}">
-                  <a14:hiddenLine xmlns="" xmlns:a14="http://schemas.microsoft.com/office/drawing/2010/main" w="9525">
+                  <a14:hiddenLine xmlns:a14="http://schemas.microsoft.com/office/drawing/2010/main" xmlns="" w="9525">
                     <a:solidFill>
                       <a:srgbClr val="000000"/>
                     </a:solidFill>
@@ -11585,7 +11585,7 @@
               </a:ln>
               <a:extLst>
                 <a:ext uri="{91240B29-F687-4f45-9708-019B960494DF}">
-                  <a14:hiddenLine xmlns="" xmlns:a14="http://schemas.microsoft.com/office/drawing/2010/main" w="9525">
+                  <a14:hiddenLine xmlns:a14="http://schemas.microsoft.com/office/drawing/2010/main" xmlns="" w="9525">
                     <a:solidFill>
                       <a:srgbClr val="000000"/>
                     </a:solidFill>
@@ -11675,7 +11675,7 @@
               </a:ln>
               <a:extLst>
                 <a:ext uri="{91240B29-F687-4f45-9708-019B960494DF}">
-                  <a14:hiddenLine xmlns="" xmlns:a14="http://schemas.microsoft.com/office/drawing/2010/main" w="9525">
+                  <a14:hiddenLine xmlns:a14="http://schemas.microsoft.com/office/drawing/2010/main" xmlns="" w="9525">
                     <a:solidFill>
                       <a:srgbClr val="000000"/>
                     </a:solidFill>
@@ -11737,7 +11737,7 @@
               </a:ln>
               <a:extLst>
                 <a:ext uri="{91240B29-F687-4f45-9708-019B960494DF}">
-                  <a14:hiddenLine xmlns="" xmlns:a14="http://schemas.microsoft.com/office/drawing/2010/main" w="9525">
+                  <a14:hiddenLine xmlns:a14="http://schemas.microsoft.com/office/drawing/2010/main" xmlns="" w="9525">
                     <a:solidFill>
                       <a:srgbClr val="000000"/>
                     </a:solidFill>
@@ -11827,7 +11827,7 @@
               </a:ln>
               <a:extLst>
                 <a:ext uri="{91240B29-F687-4f45-9708-019B960494DF}">
-                  <a14:hiddenLine xmlns="" xmlns:a14="http://schemas.microsoft.com/office/drawing/2010/main" w="9525">
+                  <a14:hiddenLine xmlns:a14="http://schemas.microsoft.com/office/drawing/2010/main" xmlns="" w="9525">
                     <a:solidFill>
                       <a:srgbClr val="000000"/>
                     </a:solidFill>
@@ -11892,7 +11892,7 @@
               </a:ln>
               <a:extLst>
                 <a:ext uri="{91240B29-F687-4f45-9708-019B960494DF}">
-                  <a14:hiddenLine xmlns="" xmlns:a14="http://schemas.microsoft.com/office/drawing/2010/main" w="9525">
+                  <a14:hiddenLine xmlns:a14="http://schemas.microsoft.com/office/drawing/2010/main" xmlns="" w="9525">
                     <a:solidFill>
                       <a:srgbClr val="000000"/>
                     </a:solidFill>
@@ -11954,7 +11954,7 @@
               </a:ln>
               <a:extLst>
                 <a:ext uri="{91240B29-F687-4f45-9708-019B960494DF}">
-                  <a14:hiddenLine xmlns="" xmlns:a14="http://schemas.microsoft.com/office/drawing/2010/main" w="9525">
+                  <a14:hiddenLine xmlns:a14="http://schemas.microsoft.com/office/drawing/2010/main" xmlns="" w="9525">
                     <a:solidFill>
                       <a:srgbClr val="000000"/>
                     </a:solidFill>
@@ -12044,7 +12044,7 @@
               </a:ln>
               <a:extLst>
                 <a:ext uri="{91240B29-F687-4f45-9708-019B960494DF}">
-                  <a14:hiddenLine xmlns="" xmlns:a14="http://schemas.microsoft.com/office/drawing/2010/main" w="9525">
+                  <a14:hiddenLine xmlns:a14="http://schemas.microsoft.com/office/drawing/2010/main" xmlns="" w="9525">
                     <a:solidFill>
                       <a:srgbClr val="000000"/>
                     </a:solidFill>
@@ -12134,7 +12134,7 @@
               </a:ln>
               <a:extLst>
                 <a:ext uri="{91240B29-F687-4f45-9708-019B960494DF}">
-                  <a14:hiddenLine xmlns="" xmlns:a14="http://schemas.microsoft.com/office/drawing/2010/main" w="9525">
+                  <a14:hiddenLine xmlns:a14="http://schemas.microsoft.com/office/drawing/2010/main" xmlns="" w="9525">
                     <a:solidFill>
                       <a:srgbClr val="000000"/>
                     </a:solidFill>
@@ -12199,7 +12199,7 @@
               </a:ln>
               <a:extLst>
                 <a:ext uri="{91240B29-F687-4f45-9708-019B960494DF}">
-                  <a14:hiddenLine xmlns="" xmlns:a14="http://schemas.microsoft.com/office/drawing/2010/main" w="9525">
+                  <a14:hiddenLine xmlns:a14="http://schemas.microsoft.com/office/drawing/2010/main" xmlns="" w="9525">
                     <a:solidFill>
                       <a:srgbClr val="000000"/>
                     </a:solidFill>
@@ -12319,7 +12319,7 @@
               </a:ln>
               <a:extLst>
                 <a:ext uri="{91240B29-F687-4f45-9708-019B960494DF}">
-                  <a14:hiddenLine xmlns="" xmlns:a14="http://schemas.microsoft.com/office/drawing/2010/main" w="9525">
+                  <a14:hiddenLine xmlns:a14="http://schemas.microsoft.com/office/drawing/2010/main" xmlns="" w="9525">
                     <a:solidFill>
                       <a:srgbClr val="000000"/>
                     </a:solidFill>
@@ -12417,7 +12417,7 @@
               </a:ln>
               <a:extLst>
                 <a:ext uri="{91240B29-F687-4f45-9708-019B960494DF}">
-                  <a14:hiddenLine xmlns="" xmlns:a14="http://schemas.microsoft.com/office/drawing/2010/main" w="9525">
+                  <a14:hiddenLine xmlns:a14="http://schemas.microsoft.com/office/drawing/2010/main" xmlns="" w="9525">
                     <a:solidFill>
                       <a:srgbClr val="000000"/>
                     </a:solidFill>
@@ -12532,7 +12532,7 @@
               </a:ln>
               <a:extLst>
                 <a:ext uri="{91240B29-F687-4f45-9708-019B960494DF}">
-                  <a14:hiddenLine xmlns="" xmlns:a14="http://schemas.microsoft.com/office/drawing/2010/main" w="9525">
+                  <a14:hiddenLine xmlns:a14="http://schemas.microsoft.com/office/drawing/2010/main" xmlns="" w="9525">
                     <a:solidFill>
                       <a:srgbClr val="000000"/>
                     </a:solidFill>
@@ -12622,7 +12622,7 @@
               </a:ln>
               <a:extLst>
                 <a:ext uri="{91240B29-F687-4f45-9708-019B960494DF}">
-                  <a14:hiddenLine xmlns="" xmlns:a14="http://schemas.microsoft.com/office/drawing/2010/main" w="9525">
+                  <a14:hiddenLine xmlns:a14="http://schemas.microsoft.com/office/drawing/2010/main" xmlns="" w="9525">
                     <a:solidFill>
                       <a:srgbClr val="000000"/>
                     </a:solidFill>
@@ -12687,7 +12687,7 @@
               </a:ln>
               <a:extLst>
                 <a:ext uri="{91240B29-F687-4f45-9708-019B960494DF}">
-                  <a14:hiddenLine xmlns="" xmlns:a14="http://schemas.microsoft.com/office/drawing/2010/main" w="9525">
+                  <a14:hiddenLine xmlns:a14="http://schemas.microsoft.com/office/drawing/2010/main" xmlns="" w="9525">
                     <a:solidFill>
                       <a:srgbClr val="000000"/>
                     </a:solidFill>
@@ -12777,7 +12777,7 @@
               </a:ln>
               <a:extLst>
                 <a:ext uri="{91240B29-F687-4f45-9708-019B960494DF}">
-                  <a14:hiddenLine xmlns="" xmlns:a14="http://schemas.microsoft.com/office/drawing/2010/main" w="9525">
+                  <a14:hiddenLine xmlns:a14="http://schemas.microsoft.com/office/drawing/2010/main" xmlns="" w="9525">
                     <a:solidFill>
                       <a:srgbClr val="000000"/>
                     </a:solidFill>
@@ -12845,7 +12845,7 @@
               </a:ln>
               <a:extLst>
                 <a:ext uri="{91240B29-F687-4f45-9708-019B960494DF}">
-                  <a14:hiddenLine xmlns="" xmlns:a14="http://schemas.microsoft.com/office/drawing/2010/main" w="9525">
+                  <a14:hiddenLine xmlns:a14="http://schemas.microsoft.com/office/drawing/2010/main" xmlns="" w="9525">
                     <a:solidFill>
                       <a:srgbClr val="000000"/>
                     </a:solidFill>
@@ -12935,7 +12935,7 @@
               </a:ln>
               <a:extLst>
                 <a:ext uri="{91240B29-F687-4f45-9708-019B960494DF}">
-                  <a14:hiddenLine xmlns="" xmlns:a14="http://schemas.microsoft.com/office/drawing/2010/main" w="9525">
+                  <a14:hiddenLine xmlns:a14="http://schemas.microsoft.com/office/drawing/2010/main" xmlns="" w="9525">
                     <a:solidFill>
                       <a:srgbClr val="000000"/>
                     </a:solidFill>
@@ -13003,7 +13003,7 @@
               </a:ln>
               <a:extLst>
                 <a:ext uri="{91240B29-F687-4f45-9708-019B960494DF}">
-                  <a14:hiddenLine xmlns="" xmlns:a14="http://schemas.microsoft.com/office/drawing/2010/main" w="9525">
+                  <a14:hiddenLine xmlns:a14="http://schemas.microsoft.com/office/drawing/2010/main" xmlns="" w="9525">
                     <a:solidFill>
                       <a:srgbClr val="000000"/>
                     </a:solidFill>
@@ -13093,7 +13093,7 @@
               </a:ln>
               <a:extLst>
                 <a:ext uri="{91240B29-F687-4f45-9708-019B960494DF}">
-                  <a14:hiddenLine xmlns="" xmlns:a14="http://schemas.microsoft.com/office/drawing/2010/main" w="9525">
+                  <a14:hiddenLine xmlns:a14="http://schemas.microsoft.com/office/drawing/2010/main" xmlns="" w="9525">
                     <a:solidFill>
                       <a:srgbClr val="000000"/>
                     </a:solidFill>
@@ -13127,7 +13127,7 @@
               </a:ln>
               <a:extLst>
                 <a:ext uri="{91240B29-F687-4f45-9708-019B960494DF}">
-                  <a14:hiddenLine xmlns="" xmlns:a14="http://schemas.microsoft.com/office/drawing/2010/main" w="9525">
+                  <a14:hiddenLine xmlns:a14="http://schemas.microsoft.com/office/drawing/2010/main" xmlns="" w="9525">
                     <a:solidFill>
                       <a:srgbClr val="000000"/>
                     </a:solidFill>
@@ -14131,7 +14131,7 @@
           <a:p>
             <a:r>
               <a:rPr lang="en-US" dirty="0"/>
-              <a:t>Fetch raw dataset</a:t>
+              <a:t>Fetch raw dataset (from Internet or disk file)</a:t>
             </a:r>
           </a:p>
           <a:p>

</xml_diff>